<commit_message>
WIP: Sobreposição rodapé Geral - Incompleta
</commit_message>
<xml_diff>
--- a/backend/Templates/Template.pptx
+++ b/backend/Templates/Template.pptx
@@ -50,7 +50,7 @@
         <p:spPr>
           <a:xfrm>
             <a:off x="0" y="6213240"/>
-            <a:ext cx="12186720" cy="639360"/>
+            <a:ext cx="12185640" cy="638280"/>
           </a:xfrm>
           <a:prstGeom prst="rect">
             <a:avLst/>
@@ -109,7 +109,7 @@
         <p:spPr>
           <a:xfrm>
             <a:off x="211680" y="6397200"/>
-            <a:ext cx="5767560" cy="272880"/>
+            <a:ext cx="5766480" cy="271800"/>
           </a:xfrm>
           <a:prstGeom prst="rect">
             <a:avLst/>
@@ -212,7 +212,7 @@
         <p:spPr>
           <a:xfrm>
             <a:off x="11101680" y="6390000"/>
-            <a:ext cx="5400" cy="296280"/>
+            <a:ext cx="6480" cy="297360"/>
           </a:xfrm>
           <a:prstGeom prst="straightConnector1">
             <a:avLst/>
@@ -244,7 +244,7 @@
         <p:spPr>
           <a:xfrm>
             <a:off x="11286720" y="6387840"/>
-            <a:ext cx="714600" cy="289800"/>
+            <a:ext cx="713520" cy="288720"/>
           </a:xfrm>
           <a:prstGeom prst="rect">
             <a:avLst/>
@@ -268,7 +268,7 @@
         <p:spPr>
           <a:xfrm>
             <a:off x="8173440" y="6352920"/>
-            <a:ext cx="2737800" cy="359640"/>
+            <a:ext cx="2736720" cy="358560"/>
           </a:xfrm>
           <a:prstGeom prst="rect">
             <a:avLst/>
@@ -311,7 +311,7 @@
                 <a:tab algn="l" pos="0"/>
               </a:tabLst>
             </a:pPr>
-            <a:fld id="{4DACF57B-29CA-497E-A229-9FF7E1F4FF14}" type="slidenum">
+            <a:fld id="{55F31AA1-0B29-4DC0-A0B1-BEC1EDF234EA}" type="slidenum">
               <a:rPr b="0" lang="pt-BR" sz="1200" strike="noStrike" u="none">
                 <a:solidFill>
                   <a:srgbClr val="808080"/>
@@ -340,7 +340,7 @@
 
 <file path=ppt/slideLayouts/slideLayout2.xml><?xml version="1.0" encoding="utf-8"?>
 <p:sldLayout xmlns:a="http://schemas.openxmlformats.org/drawingml/2006/main" xmlns:p="http://schemas.openxmlformats.org/presentationml/2006/main" xmlns:r="http://schemas.openxmlformats.org/officeDocument/2006/relationships" xmlns:p14="http://schemas.microsoft.com/office/powerpoint/2010/main" xmlns:p15="http://schemas.microsoft.com/office/powerpoint/2012/main" xmlns:mc="http://schemas.openxmlformats.org/markup-compatibility/2006" type="title" preserve="1">
-  <p:cSld name="Padrão">
+  <p:cSld name="Padrão 5">
     <p:bg>
       <p:bgPr>
         <a:solidFill>
@@ -371,7 +371,7 @@
         <p:spPr>
           <a:xfrm>
             <a:off x="0" y="6213240"/>
-            <a:ext cx="12186720" cy="639360"/>
+            <a:ext cx="12185640" cy="638280"/>
           </a:xfrm>
           <a:prstGeom prst="rect">
             <a:avLst/>
@@ -430,7 +430,7 @@
         <p:spPr>
           <a:xfrm>
             <a:off x="211680" y="6397200"/>
-            <a:ext cx="5767560" cy="272880"/>
+            <a:ext cx="5766480" cy="271800"/>
           </a:xfrm>
           <a:prstGeom prst="rect">
             <a:avLst/>
@@ -533,7 +533,7 @@
         <p:spPr>
           <a:xfrm>
             <a:off x="11101680" y="6390000"/>
-            <a:ext cx="5400" cy="296280"/>
+            <a:ext cx="6480" cy="297360"/>
           </a:xfrm>
           <a:prstGeom prst="straightConnector1">
             <a:avLst/>
@@ -565,7 +565,7 @@
         <p:spPr>
           <a:xfrm>
             <a:off x="11286720" y="6387840"/>
-            <a:ext cx="714600" cy="289800"/>
+            <a:ext cx="713520" cy="288720"/>
           </a:xfrm>
           <a:prstGeom prst="rect">
             <a:avLst/>
@@ -589,7 +589,7 @@
         <p:spPr>
           <a:xfrm>
             <a:off x="609480" y="708480"/>
-            <a:ext cx="10972080" cy="274680"/>
+            <a:ext cx="10971000" cy="274680"/>
           </a:xfrm>
           <a:prstGeom prst="rect">
             <a:avLst/>
@@ -605,7 +605,13 @@
           </a:bodyPr>
           <a:p>
             <a:pPr indent="0">
+              <a:lnSpc>
+                <a:spcPct val="100000"/>
+              </a:lnSpc>
               <a:buNone/>
+              <a:tabLst>
+                <a:tab algn="l" pos="0"/>
+              </a:tabLst>
             </a:pPr>
             <a:r>
               <a:rPr b="0" lang="pt-BR" sz="1800" strike="noStrike" u="none">
@@ -642,7 +648,7 @@
         <p:spPr>
           <a:xfrm>
             <a:off x="8173440" y="6352920"/>
-            <a:ext cx="2737800" cy="359640"/>
+            <a:ext cx="2736720" cy="358560"/>
           </a:xfrm>
           <a:prstGeom prst="rect">
             <a:avLst/>
@@ -685,7 +691,7 @@
                 <a:tab algn="l" pos="0"/>
               </a:tabLst>
             </a:pPr>
-            <a:fld id="{5FF97E55-2BC5-4FAF-86F8-A393C3F3AAA4}" type="slidenum">
+            <a:fld id="{BFBB8816-905D-4B39-952A-18646E1BB2D6}" type="slidenum">
               <a:rPr b="0" lang="pt-BR" sz="1200" strike="noStrike" u="none">
                 <a:solidFill>
                   <a:srgbClr val="808080"/>
@@ -720,7 +726,7 @@
         <p:spPr>
           <a:xfrm>
             <a:off x="609480" y="1604520"/>
-            <a:ext cx="10972440" cy="3977280"/>
+            <a:ext cx="10971360" cy="3976200"/>
           </a:xfrm>
           <a:prstGeom prst="rect">
             <a:avLst/>
@@ -736,6 +742,9 @@
           </a:bodyPr>
           <a:p>
             <a:pPr marL="432000" indent="-324000">
+              <a:lnSpc>
+                <a:spcPct val="100000"/>
+              </a:lnSpc>
               <a:spcBef>
                 <a:spcPts val="1417"/>
               </a:spcBef>
@@ -768,6 +777,9 @@
           </a:p>
           <a:p>
             <a:pPr lvl="1" marL="864000" indent="-324000">
+              <a:lnSpc>
+                <a:spcPct val="100000"/>
+              </a:lnSpc>
               <a:spcBef>
                 <a:spcPts val="1134"/>
               </a:spcBef>
@@ -800,6 +812,9 @@
           </a:p>
           <a:p>
             <a:pPr lvl="2" marL="1296000" indent="-288000">
+              <a:lnSpc>
+                <a:spcPct val="100000"/>
+              </a:lnSpc>
               <a:spcBef>
                 <a:spcPts val="850"/>
               </a:spcBef>
@@ -832,6 +847,9 @@
           </a:p>
           <a:p>
             <a:pPr lvl="3" marL="1728000" indent="-216000">
+              <a:lnSpc>
+                <a:spcPct val="100000"/>
+              </a:lnSpc>
               <a:spcBef>
                 <a:spcPts val="567"/>
               </a:spcBef>
@@ -864,6 +882,9 @@
           </a:p>
           <a:p>
             <a:pPr lvl="4" marL="2160000" indent="-216000">
+              <a:lnSpc>
+                <a:spcPct val="100000"/>
+              </a:lnSpc>
               <a:spcBef>
                 <a:spcPts val="283"/>
               </a:spcBef>
@@ -896,6 +917,9 @@
           </a:p>
           <a:p>
             <a:pPr lvl="5" marL="2592000" indent="-216000">
+              <a:lnSpc>
+                <a:spcPct val="100000"/>
+              </a:lnSpc>
               <a:spcBef>
                 <a:spcPts val="283"/>
               </a:spcBef>
@@ -928,6 +952,9 @@
           </a:p>
           <a:p>
             <a:pPr lvl="6" marL="3024000" indent="-216000">
+              <a:lnSpc>
+                <a:spcPct val="100000"/>
+              </a:lnSpc>
               <a:spcBef>
                 <a:spcPts val="283"/>
               </a:spcBef>
@@ -967,7 +994,7 @@
 
 <file path=ppt/slideLayouts/slideLayout3.xml><?xml version="1.0" encoding="utf-8"?>
 <p:sldLayout xmlns:a="http://schemas.openxmlformats.org/drawingml/2006/main" xmlns:p="http://schemas.openxmlformats.org/presentationml/2006/main" xmlns:r="http://schemas.openxmlformats.org/officeDocument/2006/relationships" xmlns:p14="http://schemas.microsoft.com/office/powerpoint/2010/main" xmlns:p15="http://schemas.microsoft.com/office/powerpoint/2012/main" xmlns:mc="http://schemas.openxmlformats.org/markup-compatibility/2006" type="obj" preserve="1">
-  <p:cSld name="Padrão 4">
+  <p:cSld name="Padrão 6">
     <p:spTree>
       <p:nvGrpSpPr>
         <p:cNvPr id="1" name=""/>
@@ -995,7 +1022,7 @@
         <p:spPr>
           <a:xfrm>
             <a:off x="609480" y="533160"/>
-            <a:ext cx="10972080" cy="625320"/>
+            <a:ext cx="10971000" cy="625320"/>
           </a:xfrm>
           <a:prstGeom prst="rect">
             <a:avLst/>
@@ -1037,7 +1064,7 @@
         <p:spPr>
           <a:xfrm>
             <a:off x="609480" y="1604520"/>
-            <a:ext cx="10972440" cy="3977280"/>
+            <a:ext cx="10971360" cy="3976200"/>
           </a:xfrm>
           <a:prstGeom prst="rect">
             <a:avLst/>
@@ -1105,7 +1132,7 @@
         <p:txBody>
           <a:bodyPr/>
           <a:p>
-            <a:fld id="{03811815-0908-4E2A-8C44-958F3D07D26F}" type="slidenum">
+            <a:fld id="{B251D928-D1F5-4035-8510-53EB9FE2420C}" type="slidenum">
               <a:t>&lt;#&gt;</a:t>
             </a:fld>
           </a:p>
@@ -1176,7 +1203,7 @@
         <p:spPr>
           <a:xfrm>
             <a:off x="0" y="6213240"/>
-            <a:ext cx="12186720" cy="639360"/>
+            <a:ext cx="12185640" cy="638280"/>
           </a:xfrm>
           <a:prstGeom prst="rect">
             <a:avLst/>
@@ -1235,7 +1262,7 @@
         <p:spPr>
           <a:xfrm>
             <a:off x="211680" y="6397200"/>
-            <a:ext cx="5767560" cy="272880"/>
+            <a:ext cx="5766480" cy="271800"/>
           </a:xfrm>
           <a:prstGeom prst="rect">
             <a:avLst/>
@@ -1338,7 +1365,7 @@
         <p:spPr>
           <a:xfrm>
             <a:off x="11101680" y="6390000"/>
-            <a:ext cx="5400" cy="296280"/>
+            <a:ext cx="6480" cy="297360"/>
           </a:xfrm>
           <a:prstGeom prst="straightConnector1">
             <a:avLst/>
@@ -1370,7 +1397,7 @@
         <p:spPr>
           <a:xfrm>
             <a:off x="11286720" y="6387840"/>
-            <a:ext cx="714600" cy="289800"/>
+            <a:ext cx="713520" cy="288720"/>
           </a:xfrm>
           <a:prstGeom prst="rect">
             <a:avLst/>
@@ -1390,7 +1417,7 @@
         <p:spPr>
           <a:xfrm>
             <a:off x="8173440" y="6352920"/>
-            <a:ext cx="2737800" cy="359640"/>
+            <a:ext cx="2736720" cy="358560"/>
           </a:xfrm>
           <a:prstGeom prst="rect">
             <a:avLst/>
@@ -1419,7 +1446,7 @@
                 <a:tab algn="l" pos="0"/>
               </a:tabLst>
             </a:pPr>
-            <a:fld id="{1C0FFFAA-9D7C-4AB4-989F-8938354EF311}" type="slidenum">
+            <a:fld id="{392F2FD3-E9D4-45B7-A371-A7C1E0B7DADF}" type="slidenum">
               <a:rPr b="0" lang="pt-BR" sz="1200" strike="noStrike" u="none">
                 <a:solidFill>
                   <a:srgbClr val="808080"/>
@@ -1453,8 +1480,8 @@
         </p:nvSpPr>
         <p:spPr>
           <a:xfrm>
-            <a:off x="609480" y="708480"/>
-            <a:ext cx="10972080" cy="274680"/>
+            <a:off x="609480" y="708120"/>
+            <a:ext cx="10971000" cy="274680"/>
           </a:xfrm>
           <a:prstGeom prst="rect">
             <a:avLst/>
@@ -1507,7 +1534,7 @@
         <p:spPr>
           <a:xfrm>
             <a:off x="609480" y="1604520"/>
-            <a:ext cx="10972080" cy="3976920"/>
+            <a:ext cx="10971360" cy="4515480"/>
           </a:xfrm>
           <a:prstGeom prst="rect">
             <a:avLst/>
@@ -1789,7 +1816,7 @@
         <p:spPr>
           <a:xfrm>
             <a:off x="0" y="6213240"/>
-            <a:ext cx="12186720" cy="639360"/>
+            <a:ext cx="12185640" cy="638280"/>
           </a:xfrm>
           <a:prstGeom prst="rect">
             <a:avLst/>
@@ -1848,7 +1875,7 @@
         <p:spPr>
           <a:xfrm>
             <a:off x="211680" y="6397200"/>
-            <a:ext cx="5767560" cy="272880"/>
+            <a:ext cx="5766480" cy="271800"/>
           </a:xfrm>
           <a:prstGeom prst="rect">
             <a:avLst/>
@@ -1951,7 +1978,7 @@
         <p:spPr>
           <a:xfrm>
             <a:off x="11101680" y="6390000"/>
-            <a:ext cx="5400" cy="296280"/>
+            <a:ext cx="6480" cy="297360"/>
           </a:xfrm>
           <a:prstGeom prst="straightConnector1">
             <a:avLst/>
@@ -1983,7 +2010,7 @@
         <p:spPr>
           <a:xfrm>
             <a:off x="11286720" y="6387840"/>
-            <a:ext cx="714600" cy="289800"/>
+            <a:ext cx="713520" cy="288720"/>
           </a:xfrm>
           <a:prstGeom prst="rect">
             <a:avLst/>
@@ -2003,7 +2030,7 @@
         <p:spPr>
           <a:xfrm>
             <a:off x="0" y="0"/>
-            <a:ext cx="12186720" cy="6852600"/>
+            <a:ext cx="12185640" cy="6851520"/>
           </a:xfrm>
           <a:prstGeom prst="rect">
             <a:avLst/>
@@ -2059,7 +2086,7 @@
         <p:spPr>
           <a:xfrm>
             <a:off x="4025880" y="2707920"/>
-            <a:ext cx="534600" cy="534600"/>
+            <a:ext cx="533520" cy="533520"/>
           </a:xfrm>
           <a:prstGeom prst="rect">
             <a:avLst/>
@@ -2115,7 +2142,7 @@
         <p:spPr>
           <a:xfrm>
             <a:off x="7625880" y="2707920"/>
-            <a:ext cx="534600" cy="534600"/>
+            <a:ext cx="533520" cy="533520"/>
           </a:xfrm>
           <a:prstGeom prst="rect">
             <a:avLst/>
@@ -2171,7 +2198,7 @@
         <p:spPr>
           <a:xfrm>
             <a:off x="5825880" y="2707920"/>
-            <a:ext cx="534600" cy="534600"/>
+            <a:ext cx="533520" cy="533520"/>
           </a:xfrm>
           <a:prstGeom prst="rect">
             <a:avLst/>
@@ -2227,7 +2254,7 @@
         <p:spPr>
           <a:xfrm>
             <a:off x="6725880" y="2707920"/>
-            <a:ext cx="534600" cy="534600"/>
+            <a:ext cx="533520" cy="533520"/>
           </a:xfrm>
           <a:prstGeom prst="rect">
             <a:avLst/>
@@ -2283,7 +2310,7 @@
         <p:spPr>
           <a:xfrm>
             <a:off x="4925880" y="2707920"/>
-            <a:ext cx="534600" cy="534600"/>
+            <a:ext cx="533520" cy="533520"/>
           </a:xfrm>
           <a:prstGeom prst="rect">
             <a:avLst/>
@@ -2339,7 +2366,7 @@
         <p:spPr>
           <a:xfrm>
             <a:off x="4025880" y="3610080"/>
-            <a:ext cx="534600" cy="534600"/>
+            <a:ext cx="533520" cy="533520"/>
           </a:xfrm>
           <a:prstGeom prst="rect">
             <a:avLst/>
@@ -2395,7 +2422,7 @@
         <p:spPr>
           <a:xfrm>
             <a:off x="7625880" y="3610080"/>
-            <a:ext cx="534600" cy="534600"/>
+            <a:ext cx="533520" cy="533520"/>
           </a:xfrm>
           <a:prstGeom prst="rect">
             <a:avLst/>
@@ -2451,7 +2478,7 @@
         <p:spPr>
           <a:xfrm>
             <a:off x="5825880" y="3610080"/>
-            <a:ext cx="534600" cy="534600"/>
+            <a:ext cx="533520" cy="533520"/>
           </a:xfrm>
           <a:prstGeom prst="rect">
             <a:avLst/>
@@ -2507,7 +2534,7 @@
         <p:spPr>
           <a:xfrm>
             <a:off x="6725880" y="3610080"/>
-            <a:ext cx="534600" cy="534600"/>
+            <a:ext cx="533520" cy="533520"/>
           </a:xfrm>
           <a:prstGeom prst="rect">
             <a:avLst/>
@@ -2563,7 +2590,7 @@
         <p:spPr>
           <a:xfrm>
             <a:off x="4925880" y="3610080"/>
-            <a:ext cx="534600" cy="534600"/>
+            <a:ext cx="533520" cy="533520"/>
           </a:xfrm>
           <a:prstGeom prst="rect">
             <a:avLst/>
@@ -2619,7 +2646,7 @@
         <p:spPr>
           <a:xfrm>
             <a:off x="2045880" y="2707920"/>
-            <a:ext cx="534600" cy="534600"/>
+            <a:ext cx="533520" cy="533520"/>
           </a:xfrm>
           <a:prstGeom prst="rect">
             <a:avLst/>
@@ -2675,7 +2702,7 @@
         <p:spPr>
           <a:xfrm>
             <a:off x="2045880" y="3610080"/>
-            <a:ext cx="534600" cy="534600"/>
+            <a:ext cx="533520" cy="533520"/>
           </a:xfrm>
           <a:prstGeom prst="rect">
             <a:avLst/>
@@ -2733,7 +2760,7 @@
         <p:spPr>
           <a:xfrm>
             <a:off x="9605880" y="2707920"/>
-            <a:ext cx="534600" cy="534600"/>
+            <a:ext cx="533520" cy="533520"/>
           </a:xfrm>
           <a:prstGeom prst="rect">
             <a:avLst/>
@@ -2789,7 +2816,7 @@
         <p:spPr>
           <a:xfrm>
             <a:off x="9605880" y="3610080"/>
-            <a:ext cx="534600" cy="534600"/>
+            <a:ext cx="533520" cy="533520"/>
           </a:xfrm>
           <a:prstGeom prst="rect">
             <a:avLst/>
@@ -2849,7 +2876,7 @@
         <p:spPr>
           <a:xfrm>
             <a:off x="8173440" y="6352920"/>
-            <a:ext cx="2737800" cy="359640"/>
+            <a:ext cx="2736720" cy="358560"/>
           </a:xfrm>
           <a:prstGeom prst="rect">
             <a:avLst/>
@@ -2892,7 +2919,7 @@
                 <a:tab algn="l" pos="0"/>
               </a:tabLst>
             </a:pPr>
-            <a:fld id="{2EB9F7DB-A100-40D4-AE17-423E3DD66BA2}" type="slidenum">
+            <a:fld id="{4A149E28-9C16-48AD-A51D-21CA45E0CBD4}" type="slidenum">
               <a:rPr b="0" lang="pt-BR" sz="1200" strike="noStrike" u="none">
                 <a:solidFill>
                   <a:srgbClr val="808080"/>
@@ -2949,7 +2976,7 @@
         <p:spPr>
           <a:xfrm>
             <a:off x="1080" y="1080"/>
-            <a:ext cx="12189960" cy="6855840"/>
+            <a:ext cx="12185280" cy="6850080"/>
           </a:xfrm>
           <a:prstGeom prst="rect">
             <a:avLst/>
@@ -3015,7 +3042,7 @@
         <p:spPr>
           <a:xfrm>
             <a:off x="9852120" y="5367600"/>
-            <a:ext cx="1437840" cy="588240"/>
+            <a:ext cx="1436760" cy="587160"/>
           </a:xfrm>
           <a:prstGeom prst="rect">
             <a:avLst/>
@@ -3035,7 +3062,7 @@
         <p:spPr>
           <a:xfrm>
             <a:off x="6587280" y="2872080"/>
-            <a:ext cx="3777840" cy="974520"/>
+            <a:ext cx="3776760" cy="974520"/>
           </a:xfrm>
           <a:prstGeom prst="rect">
             <a:avLst/>
@@ -3142,7 +3169,7 @@
         <p:spPr>
           <a:xfrm>
             <a:off x="5867280" y="2734200"/>
-            <a:ext cx="2160" cy="1391400"/>
+            <a:ext cx="3240" cy="1392480"/>
           </a:xfrm>
           <a:prstGeom prst="straightConnector1">
             <a:avLst/>
@@ -3163,7 +3190,7 @@
         <p:spPr>
           <a:xfrm>
             <a:off x="1692000" y="2550600"/>
-            <a:ext cx="3887280" cy="1186920"/>
+            <a:ext cx="3886200" cy="1185840"/>
           </a:xfrm>
           <a:prstGeom prst="rect">
             <a:avLst/>
@@ -3271,8 +3298,8 @@
         </p:nvSpPr>
         <p:spPr>
           <a:xfrm>
-            <a:off x="2160" y="2520"/>
-            <a:ext cx="12186720" cy="6852600"/>
+            <a:off x="0" y="0"/>
+            <a:ext cx="12185640" cy="6851520"/>
           </a:xfrm>
           <a:prstGeom prst="rect">
             <a:avLst/>
@@ -3338,7 +3365,7 @@
         <p:spPr>
           <a:xfrm>
             <a:off x="9852120" y="5367600"/>
-            <a:ext cx="1434600" cy="585000"/>
+            <a:ext cx="1433520" cy="583920"/>
           </a:xfrm>
           <a:prstGeom prst="rect">
             <a:avLst/>
@@ -3358,7 +3385,7 @@
         <p:spPr>
           <a:xfrm>
             <a:off x="928440" y="2425680"/>
-            <a:ext cx="6441120" cy="1095120"/>
+            <a:ext cx="6440040" cy="1094040"/>
           </a:xfrm>
           <a:prstGeom prst="rect">
             <a:avLst/>
@@ -3507,7 +3534,7 @@
         <p:spPr>
           <a:xfrm>
             <a:off x="900000" y="4072320"/>
-            <a:ext cx="1472040" cy="354600"/>
+            <a:ext cx="1470960" cy="353520"/>
           </a:xfrm>
           <a:prstGeom prst="roundRect">
             <a:avLst>
@@ -3613,7 +3640,7 @@
         <p:spPr>
           <a:xfrm>
             <a:off x="540000" y="540000"/>
-            <a:ext cx="10741320" cy="474840"/>
+            <a:ext cx="10740240" cy="473760"/>
           </a:xfrm>
           <a:prstGeom prst="rect">
             <a:avLst/>
@@ -3655,7 +3682,7 @@
         <p:spPr>
           <a:xfrm>
             <a:off x="540000" y="1380240"/>
-            <a:ext cx="10741320" cy="2004480"/>
+            <a:ext cx="10740240" cy="2003400"/>
           </a:xfrm>
           <a:prstGeom prst="rect">
             <a:avLst/>
@@ -3726,7 +3753,7 @@
         <p:spPr>
           <a:xfrm>
             <a:off x="0" y="0"/>
-            <a:ext cx="12186720" cy="6852600"/>
+            <a:ext cx="12185640" cy="6851520"/>
           </a:xfrm>
           <a:prstGeom prst="rect">
             <a:avLst/>
@@ -3792,7 +3819,7 @@
         <p:spPr>
           <a:xfrm>
             <a:off x="5375880" y="5367600"/>
-            <a:ext cx="1434600" cy="585000"/>
+            <a:ext cx="1433520" cy="583920"/>
           </a:xfrm>
           <a:prstGeom prst="rect">
             <a:avLst/>
@@ -3872,7 +3899,7 @@
         <p:spPr>
           <a:xfrm>
             <a:off x="1314360" y="3474360"/>
-            <a:ext cx="9557640" cy="471960"/>
+            <a:ext cx="9556560" cy="470880"/>
           </a:xfrm>
           <a:prstGeom prst="roundRect">
             <a:avLst>

</xml_diff>

<commit_message>
WIP: Sobreposição rodapé Geral - Funcional - Falta placeholder numero
</commit_message>
<xml_diff>
--- a/backend/Templates/Template.pptx
+++ b/backend/Templates/Template.pptx
@@ -3,8 +3,8 @@
 <p:presentation xmlns:a="http://schemas.openxmlformats.org/drawingml/2006/main" xmlns:p="http://schemas.openxmlformats.org/presentationml/2006/main" xmlns:r="http://schemas.openxmlformats.org/officeDocument/2006/relationships" xmlns:p14="http://schemas.microsoft.com/office/powerpoint/2010/main" xmlns:p15="http://schemas.microsoft.com/office/powerpoint/2012/main" xmlns:mc="http://schemas.openxmlformats.org/markup-compatibility/2006">
   <p:sldMasterIdLst>
     <p:sldMasterId id="2147483648" r:id="rId2"/>
-    <p:sldMasterId id="2147483651" r:id="rId3"/>
-    <p:sldMasterId id="2147483653" r:id="rId4"/>
+    <p:sldMasterId id="2147483652" r:id="rId3"/>
+    <p:sldMasterId id="2147483654" r:id="rId4"/>
   </p:sldMasterIdLst>
   <p:sldIdLst>
     <p:sldId id="256" r:id="rId5"/>
@@ -20,6 +20,394 @@
 <file path=ppt/slideLayouts/slideLayout1.xml><?xml version="1.0" encoding="utf-8"?>
 <p:sldLayout xmlns:a="http://schemas.openxmlformats.org/drawingml/2006/main" xmlns:p="http://schemas.openxmlformats.org/presentationml/2006/main" xmlns:r="http://schemas.openxmlformats.org/officeDocument/2006/relationships" xmlns:p14="http://schemas.microsoft.com/office/powerpoint/2010/main" xmlns:p15="http://schemas.microsoft.com/office/powerpoint/2012/main" xmlns:mc="http://schemas.openxmlformats.org/markup-compatibility/2006" type="blank" preserve="1">
   <p:cSld name="Slide de Título">
+    <p:spTree>
+      <p:nvGrpSpPr>
+        <p:cNvPr id="1" name=""/>
+        <p:cNvGrpSpPr/>
+        <p:nvPr/>
+      </p:nvGrpSpPr>
+      <p:grpSpPr>
+        <a:xfrm>
+          <a:off x="0" y="0"/>
+          <a:ext cx="0" cy="0"/>
+          <a:chOff x="0" y="0"/>
+          <a:chExt cx="0" cy="0"/>
+        </a:xfrm>
+      </p:grpSpPr>
+    </p:spTree>
+  </p:cSld>
+</p:sldLayout>
+</file>
+
+<file path=ppt/slideLayouts/slideLayout2.xml><?xml version="1.0" encoding="utf-8"?>
+<p:sldLayout xmlns:a="http://schemas.openxmlformats.org/drawingml/2006/main" xmlns:p="http://schemas.openxmlformats.org/presentationml/2006/main" xmlns:r="http://schemas.openxmlformats.org/officeDocument/2006/relationships" xmlns:p14="http://schemas.microsoft.com/office/powerpoint/2010/main" xmlns:p15="http://schemas.microsoft.com/office/powerpoint/2012/main" xmlns:mc="http://schemas.openxmlformats.org/markup-compatibility/2006" type="tx" preserve="1">
+  <p:cSld name="Slide de Título">
+    <p:spTree>
+      <p:nvGrpSpPr>
+        <p:cNvPr id="1" name=""/>
+        <p:cNvGrpSpPr/>
+        <p:nvPr/>
+      </p:nvGrpSpPr>
+      <p:grpSpPr>
+        <a:xfrm>
+          <a:off x="0" y="0"/>
+          <a:ext cx="0" cy="0"/>
+          <a:chOff x="0" y="0"/>
+          <a:chExt cx="0" cy="0"/>
+        </a:xfrm>
+      </p:grpSpPr>
+      <p:sp>
+        <p:nvSpPr>
+          <p:cNvPr id="6" name="PlaceHolder 1"/>
+          <p:cNvSpPr>
+            <a:spLocks noGrp="1"/>
+          </p:cNvSpPr>
+          <p:nvPr>
+            <p:ph type="title"/>
+          </p:nvPr>
+        </p:nvSpPr>
+        <p:spPr>
+          <a:xfrm>
+            <a:off x="609480" y="273600"/>
+            <a:ext cx="10972440" cy="1144800"/>
+          </a:xfrm>
+          <a:prstGeom prst="rect">
+            <a:avLst/>
+          </a:prstGeom>
+          <a:noFill/>
+          <a:ln w="0">
+            <a:noFill/>
+          </a:ln>
+        </p:spPr>
+        <p:txBody>
+          <a:bodyPr lIns="0" rIns="0" tIns="0" bIns="0" anchor="ctr">
+            <a:spAutoFit/>
+          </a:bodyPr>
+          <a:p>
+            <a:pPr indent="0" algn="ctr">
+              <a:buNone/>
+            </a:pPr>
+            <a:endParaRPr b="0" lang="pt-BR" sz="4400" strike="noStrike" u="none">
+              <a:solidFill>
+                <a:srgbClr val="000000"/>
+              </a:solidFill>
+              <a:effectLst/>
+              <a:uFillTx/>
+              <a:latin typeface="Arial"/>
+            </a:endParaRPr>
+          </a:p>
+        </p:txBody>
+      </p:sp>
+      <p:sp>
+        <p:nvSpPr>
+          <p:cNvPr id="7" name="PlaceHolder 2"/>
+          <p:cNvSpPr>
+            <a:spLocks noGrp="1"/>
+          </p:cNvSpPr>
+          <p:nvPr>
+            <p:ph/>
+          </p:nvPr>
+        </p:nvSpPr>
+        <p:spPr>
+          <a:xfrm>
+            <a:off x="609480" y="1604520"/>
+            <a:ext cx="10972440" cy="3977280"/>
+          </a:xfrm>
+          <a:prstGeom prst="rect">
+            <a:avLst/>
+          </a:prstGeom>
+          <a:noFill/>
+          <a:ln w="0">
+            <a:noFill/>
+          </a:ln>
+        </p:spPr>
+        <p:txBody>
+          <a:bodyPr lIns="0" rIns="0" tIns="0" bIns="0" anchor="t">
+            <a:normAutofit/>
+          </a:bodyPr>
+          <a:p>
+            <a:pPr indent="0">
+              <a:spcBef>
+                <a:spcPts val="1417"/>
+              </a:spcBef>
+              <a:buNone/>
+            </a:pPr>
+            <a:endParaRPr b="0" lang="pt-BR" sz="3200" strike="noStrike" u="none">
+              <a:solidFill>
+                <a:srgbClr val="000000"/>
+              </a:solidFill>
+              <a:effectLst/>
+              <a:uFillTx/>
+              <a:latin typeface="Arial"/>
+            </a:endParaRPr>
+          </a:p>
+        </p:txBody>
+      </p:sp>
+    </p:spTree>
+  </p:cSld>
+</p:sldLayout>
+</file>
+
+<file path=ppt/slideLayouts/slideLayout3.xml><?xml version="1.0" encoding="utf-8"?>
+<p:sldLayout xmlns:a="http://schemas.openxmlformats.org/drawingml/2006/main" xmlns:p="http://schemas.openxmlformats.org/presentationml/2006/main" xmlns:r="http://schemas.openxmlformats.org/officeDocument/2006/relationships" xmlns:p14="http://schemas.microsoft.com/office/powerpoint/2010/main" xmlns:p15="http://schemas.microsoft.com/office/powerpoint/2012/main" xmlns:mc="http://schemas.openxmlformats.org/markup-compatibility/2006" type="title" preserve="1">
+  <p:cSld name="Slide de Título">
+    <p:spTree>
+      <p:nvGrpSpPr>
+        <p:cNvPr id="1" name=""/>
+        <p:cNvGrpSpPr/>
+        <p:nvPr/>
+      </p:nvGrpSpPr>
+      <p:grpSpPr>
+        <a:xfrm>
+          <a:off x="0" y="0"/>
+          <a:ext cx="0" cy="0"/>
+          <a:chOff x="0" y="0"/>
+          <a:chExt cx="0" cy="0"/>
+        </a:xfrm>
+      </p:grpSpPr>
+      <p:sp>
+        <p:nvSpPr>
+          <p:cNvPr id="8" name="PlaceHolder 1"/>
+          <p:cNvSpPr>
+            <a:spLocks noGrp="1"/>
+          </p:cNvSpPr>
+          <p:nvPr>
+            <p:ph type="title"/>
+          </p:nvPr>
+        </p:nvSpPr>
+        <p:spPr>
+          <a:xfrm>
+            <a:off x="609480" y="273600"/>
+            <a:ext cx="10972440" cy="1144800"/>
+          </a:xfrm>
+          <a:prstGeom prst="rect">
+            <a:avLst/>
+          </a:prstGeom>
+          <a:noFill/>
+          <a:ln w="0">
+            <a:noFill/>
+          </a:ln>
+        </p:spPr>
+        <p:txBody>
+          <a:bodyPr lIns="0" rIns="0" tIns="0" bIns="0" anchor="ctr">
+            <a:spAutoFit/>
+          </a:bodyPr>
+          <a:p>
+            <a:pPr indent="0" algn="ctr">
+              <a:buNone/>
+            </a:pPr>
+            <a:endParaRPr b="0" lang="pt-BR" sz="4400" strike="noStrike" u="none">
+              <a:solidFill>
+                <a:srgbClr val="000000"/>
+              </a:solidFill>
+              <a:effectLst/>
+              <a:uFillTx/>
+              <a:latin typeface="Arial"/>
+            </a:endParaRPr>
+          </a:p>
+        </p:txBody>
+      </p:sp>
+      <p:sp>
+        <p:nvSpPr>
+          <p:cNvPr id="9" name="PlaceHolder 2"/>
+          <p:cNvSpPr>
+            <a:spLocks noGrp="1"/>
+          </p:cNvSpPr>
+          <p:nvPr>
+            <p:ph type="subTitle"/>
+          </p:nvPr>
+        </p:nvSpPr>
+        <p:spPr>
+          <a:xfrm>
+            <a:off x="609480" y="1604520"/>
+            <a:ext cx="10972440" cy="3977280"/>
+          </a:xfrm>
+          <a:prstGeom prst="rect">
+            <a:avLst/>
+          </a:prstGeom>
+          <a:noFill/>
+          <a:ln w="0">
+            <a:noFill/>
+          </a:ln>
+        </p:spPr>
+        <p:txBody>
+          <a:bodyPr lIns="0" rIns="0" tIns="0" bIns="0" anchor="ctr">
+            <a:spAutoFit/>
+          </a:bodyPr>
+          <a:p>
+            <a:pPr indent="0" algn="ctr">
+              <a:buNone/>
+            </a:pPr>
+            <a:endParaRPr b="0" lang="pt-BR" sz="3200" strike="noStrike" u="none">
+              <a:solidFill>
+                <a:srgbClr val="000000"/>
+              </a:solidFill>
+              <a:effectLst/>
+              <a:uFillTx/>
+              <a:latin typeface="Arial"/>
+            </a:endParaRPr>
+          </a:p>
+        </p:txBody>
+      </p:sp>
+    </p:spTree>
+  </p:cSld>
+</p:sldLayout>
+</file>
+
+<file path=ppt/slideLayouts/slideLayout4.xml><?xml version="1.0" encoding="utf-8"?>
+<p:sldLayout xmlns:a="http://schemas.openxmlformats.org/drawingml/2006/main" xmlns:p="http://schemas.openxmlformats.org/presentationml/2006/main" xmlns:r="http://schemas.openxmlformats.org/officeDocument/2006/relationships" xmlns:p14="http://schemas.microsoft.com/office/powerpoint/2010/main" xmlns:p15="http://schemas.microsoft.com/office/powerpoint/2012/main" xmlns:mc="http://schemas.openxmlformats.org/markup-compatibility/2006" type="obj" preserve="1">
+  <p:cSld name="Padrão 6">
+    <p:spTree>
+      <p:nvGrpSpPr>
+        <p:cNvPr id="1" name=""/>
+        <p:cNvGrpSpPr/>
+        <p:nvPr/>
+      </p:nvGrpSpPr>
+      <p:grpSpPr>
+        <a:xfrm>
+          <a:off x="0" y="0"/>
+          <a:ext cx="0" cy="0"/>
+          <a:chOff x="0" y="0"/>
+          <a:chExt cx="0" cy="0"/>
+        </a:xfrm>
+      </p:grpSpPr>
+      <p:sp>
+        <p:nvSpPr>
+          <p:cNvPr id="19" name="PlaceHolder 1"/>
+          <p:cNvSpPr>
+            <a:spLocks noGrp="1"/>
+          </p:cNvSpPr>
+          <p:nvPr>
+            <p:ph type="title"/>
+          </p:nvPr>
+        </p:nvSpPr>
+        <p:spPr>
+          <a:xfrm>
+            <a:off x="609480" y="273600"/>
+            <a:ext cx="10972440" cy="1144800"/>
+          </a:xfrm>
+          <a:prstGeom prst="rect">
+            <a:avLst/>
+          </a:prstGeom>
+          <a:noFill/>
+          <a:ln w="0">
+            <a:noFill/>
+          </a:ln>
+        </p:spPr>
+        <p:txBody>
+          <a:bodyPr lIns="0" rIns="0" tIns="0" bIns="0" anchor="ctr">
+            <a:spAutoFit/>
+          </a:bodyPr>
+          <a:p>
+            <a:pPr indent="0" algn="ctr">
+              <a:buNone/>
+            </a:pPr>
+            <a:endParaRPr b="0" lang="pt-BR" sz="4400" strike="noStrike" u="none">
+              <a:solidFill>
+                <a:srgbClr val="000000"/>
+              </a:solidFill>
+              <a:effectLst/>
+              <a:uFillTx/>
+              <a:latin typeface="Arial"/>
+            </a:endParaRPr>
+          </a:p>
+        </p:txBody>
+      </p:sp>
+      <p:sp>
+        <p:nvSpPr>
+          <p:cNvPr id="20" name="PlaceHolder 2"/>
+          <p:cNvSpPr>
+            <a:spLocks noGrp="1"/>
+          </p:cNvSpPr>
+          <p:nvPr>
+            <p:ph/>
+          </p:nvPr>
+        </p:nvSpPr>
+        <p:spPr>
+          <a:xfrm>
+            <a:off x="609480" y="1604520"/>
+            <a:ext cx="10972440" cy="3977280"/>
+          </a:xfrm>
+          <a:prstGeom prst="rect">
+            <a:avLst/>
+          </a:prstGeom>
+          <a:noFill/>
+          <a:ln w="0">
+            <a:noFill/>
+          </a:ln>
+        </p:spPr>
+        <p:txBody>
+          <a:bodyPr lIns="0" rIns="0" tIns="0" bIns="0" anchor="t">
+            <a:normAutofit/>
+          </a:bodyPr>
+          <a:p>
+            <a:pPr indent="0">
+              <a:spcBef>
+                <a:spcPts val="1417"/>
+              </a:spcBef>
+              <a:buNone/>
+            </a:pPr>
+            <a:endParaRPr b="0" lang="pt-BR" sz="3200" strike="noStrike" u="none">
+              <a:solidFill>
+                <a:srgbClr val="000000"/>
+              </a:solidFill>
+              <a:effectLst/>
+              <a:uFillTx/>
+              <a:latin typeface="Arial"/>
+            </a:endParaRPr>
+          </a:p>
+        </p:txBody>
+      </p:sp>
+    </p:spTree>
+  </p:cSld>
+</p:sldLayout>
+</file>
+
+<file path=ppt/slideLayouts/slideLayout5.xml><?xml version="1.0" encoding="utf-8"?>
+<p:sldLayout xmlns:a="http://schemas.openxmlformats.org/drawingml/2006/main" xmlns:p="http://schemas.openxmlformats.org/presentationml/2006/main" xmlns:r="http://schemas.openxmlformats.org/officeDocument/2006/relationships" xmlns:p14="http://schemas.microsoft.com/office/powerpoint/2010/main" xmlns:p15="http://schemas.microsoft.com/office/powerpoint/2012/main" xmlns:mc="http://schemas.openxmlformats.org/markup-compatibility/2006" type="blank" preserve="1">
+  <p:cSld name="Esquema de Cores MBX">
+    <p:spTree>
+      <p:nvGrpSpPr>
+        <p:cNvPr id="1" name=""/>
+        <p:cNvGrpSpPr/>
+        <p:nvPr/>
+      </p:nvGrpSpPr>
+      <p:grpSpPr>
+        <a:xfrm>
+          <a:off x="0" y="0"/>
+          <a:ext cx="0" cy="0"/>
+          <a:chOff x="0" y="0"/>
+          <a:chExt cx="0" cy="0"/>
+        </a:xfrm>
+      </p:grpSpPr>
+      <p:sp>
+        <p:nvSpPr>
+          <p:cNvPr id="2" name="PlaceHolder 1"/>
+          <p:cNvSpPr>
+            <a:spLocks noGrp="1"/>
+          </p:cNvSpPr>
+          <p:nvPr>
+            <p:ph type="sldNum" idx="1"/>
+          </p:nvPr>
+        </p:nvSpPr>
+        <p:spPr/>
+        <p:txBody>
+          <a:bodyPr/>
+          <a:p>
+            <a:fld id="{8BA4D690-AD61-437B-85BA-A144E59F51C6}" type="slidenum">
+              <a:t>&lt;#&gt;</a:t>
+            </a:fld>
+          </a:p>
+        </p:txBody>
+      </p:sp>
+    </p:spTree>
+  </p:cSld>
+</p:sldLayout>
+</file>
+
+<file path=ppt/slideMasters/slideMaster1.xml><?xml version="1.0" encoding="utf-8"?>
+<p:sldMaster xmlns:a="http://schemas.openxmlformats.org/drawingml/2006/main" xmlns:p="http://schemas.openxmlformats.org/presentationml/2006/main" xmlns:r="http://schemas.openxmlformats.org/officeDocument/2006/relationships" xmlns:p14="http://schemas.microsoft.com/office/powerpoint/2010/main" xmlns:p15="http://schemas.microsoft.com/office/powerpoint/2012/main" xmlns:mc="http://schemas.openxmlformats.org/markup-compatibility/2006">
+  <p:cSld>
     <p:bg>
       <p:bgPr>
         <a:solidFill>
@@ -50,7 +438,7 @@
         <p:spPr>
           <a:xfrm>
             <a:off x="0" y="6213240"/>
-            <a:ext cx="12185640" cy="638280"/>
+            <a:ext cx="12184560" cy="637200"/>
           </a:xfrm>
           <a:prstGeom prst="rect">
             <a:avLst/>
@@ -109,7 +497,7 @@
         <p:spPr>
           <a:xfrm>
             <a:off x="211680" y="6397200"/>
-            <a:ext cx="5766480" cy="271800"/>
+            <a:ext cx="5770080" cy="274680"/>
           </a:xfrm>
           <a:prstGeom prst="rect">
             <a:avLst/>
@@ -212,7 +600,7 @@
         <p:spPr>
           <a:xfrm>
             <a:off x="11101680" y="6390000"/>
-            <a:ext cx="6480" cy="297360"/>
+            <a:ext cx="7560" cy="298440"/>
           </a:xfrm>
           <a:prstGeom prst="straightConnector1">
             <a:avLst/>
@@ -244,7 +632,7 @@
         <p:spPr>
           <a:xfrm>
             <a:off x="11286720" y="6387840"/>
-            <a:ext cx="713520" cy="288720"/>
+            <a:ext cx="712440" cy="287640"/>
           </a:xfrm>
           <a:prstGeom prst="rect">
             <a:avLst/>
@@ -262,13 +650,13 @@
             <a:spLocks noGrp="1"/>
           </p:cNvSpPr>
           <p:nvPr>
-            <p:ph type="sldNum" idx="1"/>
+            <p:ph type="title"/>
           </p:nvPr>
         </p:nvSpPr>
         <p:spPr>
           <a:xfrm>
-            <a:off x="8173440" y="6352920"/>
-            <a:ext cx="2736720" cy="358560"/>
+            <a:off x="609480" y="273600"/>
+            <a:ext cx="10972440" cy="1144800"/>
           </a:xfrm>
           <a:prstGeom prst="rect">
             <a:avLst/>
@@ -279,68 +667,302 @@
           </a:ln>
         </p:spPr>
         <p:txBody>
-          <a:bodyPr lIns="91440" rIns="91440" tIns="45720" bIns="45720" anchor="ctr">
+          <a:bodyPr lIns="0" rIns="0" tIns="0" bIns="0" anchor="ctr">
             <a:noAutofit/>
           </a:bodyPr>
-          <a:lstStyle>
-            <a:lvl1pPr indent="0" algn="r" defTabSz="914400">
-              <a:lnSpc>
-                <a:spcPct val="100000"/>
-              </a:lnSpc>
+          <a:p>
+            <a:pPr indent="0" algn="ctr">
               <a:buNone/>
-              <a:tabLst>
-                <a:tab algn="l" pos="0"/>
-              </a:tabLst>
-              <a:defRPr b="0" lang="pt-BR" sz="1200" strike="noStrike" u="none">
+            </a:pPr>
+            <a:r>
+              <a:rPr b="0" lang="pt-BR" sz="4400" strike="noStrike" u="none">
                 <a:solidFill>
-                  <a:srgbClr val="808080"/>
-                </a:solidFill>
-                <a:effectLst/>
-                <a:uFillTx/>
-                <a:latin typeface="Arial"/>
-              </a:defRPr>
-            </a:lvl1pPr>
-          </a:lstStyle>
-          <a:p>
-            <a:pPr indent="0" algn="r" defTabSz="914400">
-              <a:lnSpc>
-                <a:spcPct val="100000"/>
-              </a:lnSpc>
-              <a:buNone/>
-              <a:tabLst>
-                <a:tab algn="l" pos="0"/>
-              </a:tabLst>
-            </a:pPr>
-            <a:fld id="{55F31AA1-0B29-4DC0-A0B1-BEC1EDF234EA}" type="slidenum">
-              <a:rPr b="0" lang="pt-BR" sz="1200" strike="noStrike" u="none">
-                <a:solidFill>
-                  <a:srgbClr val="808080"/>
+                  <a:srgbClr val="000000"/>
                 </a:solidFill>
                 <a:effectLst/>
                 <a:uFillTx/>
                 <a:latin typeface="Arial"/>
               </a:rPr>
-              <a:t>&lt;número&gt;</a:t>
-            </a:fld>
-            <a:endParaRPr b="0" lang="pt-BR" sz="1200" strike="noStrike" u="none">
-              <a:solidFill>
-                <a:srgbClr val="000000"/>
-              </a:solidFill>
-              <a:effectLst/>
-              <a:uFillTx/>
-              <a:latin typeface="Times New Roman"/>
+              <a:t>Clique para editar o formato do texto do título</a:t>
+            </a:r>
+            <a:endParaRPr b="0" lang="pt-BR" sz="4400" strike="noStrike" u="none">
+              <a:solidFill>
+                <a:srgbClr val="000000"/>
+              </a:solidFill>
+              <a:effectLst/>
+              <a:uFillTx/>
+              <a:latin typeface="Arial"/>
+            </a:endParaRPr>
+          </a:p>
+        </p:txBody>
+      </p:sp>
+      <p:sp>
+        <p:nvSpPr>
+          <p:cNvPr id="5" name="PlaceHolder 2"/>
+          <p:cNvSpPr>
+            <a:spLocks noGrp="1"/>
+          </p:cNvSpPr>
+          <p:nvPr>
+            <p:ph type="body"/>
+          </p:nvPr>
+        </p:nvSpPr>
+        <p:spPr>
+          <a:xfrm>
+            <a:off x="609480" y="1604520"/>
+            <a:ext cx="10972440" cy="3977280"/>
+          </a:xfrm>
+          <a:prstGeom prst="rect">
+            <a:avLst/>
+          </a:prstGeom>
+          <a:noFill/>
+          <a:ln w="0">
+            <a:noFill/>
+          </a:ln>
+        </p:spPr>
+        <p:txBody>
+          <a:bodyPr lIns="0" rIns="0" tIns="0" bIns="0" anchor="t">
+            <a:normAutofit/>
+          </a:bodyPr>
+          <a:p>
+            <a:pPr marL="432000" indent="-324000">
+              <a:spcBef>
+                <a:spcPts val="1417"/>
+              </a:spcBef>
+              <a:buClr>
+                <a:srgbClr val="000000"/>
+              </a:buClr>
+              <a:buSzPct val="45000"/>
+              <a:buFont typeface="Wingdings" charset="2"/>
+              <a:buChar char=""/>
+            </a:pPr>
+            <a:r>
+              <a:rPr b="0" lang="pt-BR" sz="3200" strike="noStrike" u="none">
+                <a:solidFill>
+                  <a:srgbClr val="000000"/>
+                </a:solidFill>
+                <a:effectLst/>
+                <a:uFillTx/>
+                <a:latin typeface="Arial"/>
+              </a:rPr>
+              <a:t>Clique para editar o formato de texto dos tópicos</a:t>
+            </a:r>
+            <a:endParaRPr b="0" lang="pt-BR" sz="3200" strike="noStrike" u="none">
+              <a:solidFill>
+                <a:srgbClr val="000000"/>
+              </a:solidFill>
+              <a:effectLst/>
+              <a:uFillTx/>
+              <a:latin typeface="Arial"/>
+            </a:endParaRPr>
+          </a:p>
+          <a:p>
+            <a:pPr lvl="1" marL="864000" indent="-324000">
+              <a:spcBef>
+                <a:spcPts val="1134"/>
+              </a:spcBef>
+              <a:buClr>
+                <a:srgbClr val="000000"/>
+              </a:buClr>
+              <a:buSzPct val="75000"/>
+              <a:buFont typeface="Symbol" charset="2"/>
+              <a:buChar char=""/>
+            </a:pPr>
+            <a:r>
+              <a:rPr b="0" lang="pt-BR" sz="2800" strike="noStrike" u="none">
+                <a:solidFill>
+                  <a:srgbClr val="000000"/>
+                </a:solidFill>
+                <a:effectLst/>
+                <a:uFillTx/>
+                <a:latin typeface="Arial"/>
+              </a:rPr>
+              <a:t>2.º nível de tópicos</a:t>
+            </a:r>
+            <a:endParaRPr b="0" lang="pt-BR" sz="2800" strike="noStrike" u="none">
+              <a:solidFill>
+                <a:srgbClr val="000000"/>
+              </a:solidFill>
+              <a:effectLst/>
+              <a:uFillTx/>
+              <a:latin typeface="Arial"/>
+            </a:endParaRPr>
+          </a:p>
+          <a:p>
+            <a:pPr lvl="2" marL="1296000" indent="-288000">
+              <a:spcBef>
+                <a:spcPts val="850"/>
+              </a:spcBef>
+              <a:buClr>
+                <a:srgbClr val="000000"/>
+              </a:buClr>
+              <a:buSzPct val="45000"/>
+              <a:buFont typeface="Wingdings" charset="2"/>
+              <a:buChar char=""/>
+            </a:pPr>
+            <a:r>
+              <a:rPr b="0" lang="pt-BR" sz="2400" strike="noStrike" u="none">
+                <a:solidFill>
+                  <a:srgbClr val="000000"/>
+                </a:solidFill>
+                <a:effectLst/>
+                <a:uFillTx/>
+                <a:latin typeface="Arial"/>
+              </a:rPr>
+              <a:t>3.º nível de tópicos</a:t>
+            </a:r>
+            <a:endParaRPr b="0" lang="pt-BR" sz="2400" strike="noStrike" u="none">
+              <a:solidFill>
+                <a:srgbClr val="000000"/>
+              </a:solidFill>
+              <a:effectLst/>
+              <a:uFillTx/>
+              <a:latin typeface="Arial"/>
+            </a:endParaRPr>
+          </a:p>
+          <a:p>
+            <a:pPr lvl="3" marL="1728000" indent="-216000">
+              <a:spcBef>
+                <a:spcPts val="567"/>
+              </a:spcBef>
+              <a:buClr>
+                <a:srgbClr val="000000"/>
+              </a:buClr>
+              <a:buSzPct val="75000"/>
+              <a:buFont typeface="Symbol" charset="2"/>
+              <a:buChar char=""/>
+            </a:pPr>
+            <a:r>
+              <a:rPr b="0" lang="pt-BR" sz="2000" strike="noStrike" u="none">
+                <a:solidFill>
+                  <a:srgbClr val="000000"/>
+                </a:solidFill>
+                <a:effectLst/>
+                <a:uFillTx/>
+                <a:latin typeface="Arial"/>
+              </a:rPr>
+              <a:t>4.º nível de tópicos</a:t>
+            </a:r>
+            <a:endParaRPr b="0" lang="pt-BR" sz="2000" strike="noStrike" u="none">
+              <a:solidFill>
+                <a:srgbClr val="000000"/>
+              </a:solidFill>
+              <a:effectLst/>
+              <a:uFillTx/>
+              <a:latin typeface="Arial"/>
+            </a:endParaRPr>
+          </a:p>
+          <a:p>
+            <a:pPr lvl="4" marL="2160000" indent="-216000">
+              <a:spcBef>
+                <a:spcPts val="283"/>
+              </a:spcBef>
+              <a:buClr>
+                <a:srgbClr val="000000"/>
+              </a:buClr>
+              <a:buSzPct val="45000"/>
+              <a:buFont typeface="Wingdings" charset="2"/>
+              <a:buChar char=""/>
+            </a:pPr>
+            <a:r>
+              <a:rPr b="0" lang="pt-BR" sz="2000" strike="noStrike" u="none">
+                <a:solidFill>
+                  <a:srgbClr val="000000"/>
+                </a:solidFill>
+                <a:effectLst/>
+                <a:uFillTx/>
+                <a:latin typeface="Arial"/>
+              </a:rPr>
+              <a:t>5.º nível de tópicos</a:t>
+            </a:r>
+            <a:endParaRPr b="0" lang="pt-BR" sz="2000" strike="noStrike" u="none">
+              <a:solidFill>
+                <a:srgbClr val="000000"/>
+              </a:solidFill>
+              <a:effectLst/>
+              <a:uFillTx/>
+              <a:latin typeface="Arial"/>
+            </a:endParaRPr>
+          </a:p>
+          <a:p>
+            <a:pPr lvl="5" marL="2592000" indent="-216000">
+              <a:spcBef>
+                <a:spcPts val="283"/>
+              </a:spcBef>
+              <a:buClr>
+                <a:srgbClr val="000000"/>
+              </a:buClr>
+              <a:buSzPct val="45000"/>
+              <a:buFont typeface="Wingdings" charset="2"/>
+              <a:buChar char=""/>
+            </a:pPr>
+            <a:r>
+              <a:rPr b="0" lang="pt-BR" sz="2000" strike="noStrike" u="none">
+                <a:solidFill>
+                  <a:srgbClr val="000000"/>
+                </a:solidFill>
+                <a:effectLst/>
+                <a:uFillTx/>
+                <a:latin typeface="Arial"/>
+              </a:rPr>
+              <a:t>6.º nível de tópicos</a:t>
+            </a:r>
+            <a:endParaRPr b="0" lang="pt-BR" sz="2000" strike="noStrike" u="none">
+              <a:solidFill>
+                <a:srgbClr val="000000"/>
+              </a:solidFill>
+              <a:effectLst/>
+              <a:uFillTx/>
+              <a:latin typeface="Arial"/>
+            </a:endParaRPr>
+          </a:p>
+          <a:p>
+            <a:pPr lvl="6" marL="3024000" indent="-216000">
+              <a:spcBef>
+                <a:spcPts val="283"/>
+              </a:spcBef>
+              <a:buClr>
+                <a:srgbClr val="000000"/>
+              </a:buClr>
+              <a:buSzPct val="45000"/>
+              <a:buFont typeface="Wingdings" charset="2"/>
+              <a:buChar char=""/>
+            </a:pPr>
+            <a:r>
+              <a:rPr b="0" lang="pt-BR" sz="2000" strike="noStrike" u="none">
+                <a:solidFill>
+                  <a:srgbClr val="000000"/>
+                </a:solidFill>
+                <a:effectLst/>
+                <a:uFillTx/>
+                <a:latin typeface="Arial"/>
+              </a:rPr>
+              <a:t>7.º nível de tópicos</a:t>
+            </a:r>
+            <a:endParaRPr b="0" lang="pt-BR" sz="2000" strike="noStrike" u="none">
+              <a:solidFill>
+                <a:srgbClr val="000000"/>
+              </a:solidFill>
+              <a:effectLst/>
+              <a:uFillTx/>
+              <a:latin typeface="Arial"/>
             </a:endParaRPr>
           </a:p>
         </p:txBody>
       </p:sp>
     </p:spTree>
   </p:cSld>
-</p:sldLayout>
+  <p:clrMap bg1="lt1" tx1="dk1" bg2="lt2" tx2="dk2" accent1="accent1" accent2="accent2" accent3="accent3" accent4="accent4" accent5="accent5" accent6="accent6" hlink="hlink" folHlink="folHlink"/>
+  <p:sldLayoutIdLst>
+    <p:sldLayoutId id="2147483649" r:id="rId4"/>
+    <p:sldLayoutId id="2147483650" r:id="rId5"/>
+    <p:sldLayoutId id="2147483651" r:id="rId6"/>
+  </p:sldLayoutIdLst>
+</p:sldMaster>
 </file>
 
-<file path=ppt/slideLayouts/slideLayout2.xml><?xml version="1.0" encoding="utf-8"?>
-<p:sldLayout xmlns:a="http://schemas.openxmlformats.org/drawingml/2006/main" xmlns:p="http://schemas.openxmlformats.org/presentationml/2006/main" xmlns:r="http://schemas.openxmlformats.org/officeDocument/2006/relationships" xmlns:p14="http://schemas.microsoft.com/office/powerpoint/2010/main" xmlns:p15="http://schemas.microsoft.com/office/powerpoint/2012/main" xmlns:mc="http://schemas.openxmlformats.org/markup-compatibility/2006" type="title" preserve="1">
-  <p:cSld name="Padrão 5">
+<file path=ppt/slideMasters/slideMaster2.xml><?xml version="1.0" encoding="utf-8"?>
+<p:sldMaster xmlns:a="http://schemas.openxmlformats.org/drawingml/2006/main" xmlns:p="http://schemas.openxmlformats.org/presentationml/2006/main" xmlns:r="http://schemas.openxmlformats.org/officeDocument/2006/relationships" xmlns:p14="http://schemas.microsoft.com/office/powerpoint/2010/main" xmlns:p15="http://schemas.microsoft.com/office/powerpoint/2012/main" xmlns:mc="http://schemas.openxmlformats.org/markup-compatibility/2006">
+  <p:cSld>
     <p:bg>
       <p:bgPr>
         <a:solidFill>
@@ -364,37 +986,382 @@
       </p:grpSpPr>
       <p:sp>
         <p:nvSpPr>
-          <p:cNvPr id="5" name="Retângulo 11"/>
+          <p:cNvPr id="10" name="PlaceHolder 1"/>
+          <p:cNvSpPr>
+            <a:spLocks noGrp="1"/>
+          </p:cNvSpPr>
+          <p:nvPr>
+            <p:ph type="body"/>
+          </p:nvPr>
+        </p:nvSpPr>
+        <p:spPr>
+          <a:xfrm>
+            <a:off x="609480" y="1604520"/>
+            <a:ext cx="10972080" cy="3976920"/>
+          </a:xfrm>
+          <a:prstGeom prst="rect">
+            <a:avLst/>
+          </a:prstGeom>
+          <a:noFill/>
+          <a:ln w="0">
+            <a:noFill/>
+          </a:ln>
+        </p:spPr>
+        <p:txBody>
+          <a:bodyPr lIns="0" rIns="0" tIns="0" bIns="0" anchor="t">
+            <a:normAutofit/>
+          </a:bodyPr>
+          <a:p>
+            <a:pPr marL="266760" indent="-266760" defTabSz="914400">
+              <a:lnSpc>
+                <a:spcPct val="90000"/>
+              </a:lnSpc>
+              <a:spcAft>
+                <a:spcPts val="1199"/>
+              </a:spcAft>
+              <a:buClr>
+                <a:srgbClr val="393938"/>
+              </a:buClr>
+              <a:buFont typeface="Arial"/>
+              <a:buChar char="•"/>
+            </a:pPr>
+            <a:r>
+              <a:rPr b="0" lang="pt-BR" sz="1800" strike="noStrike" u="none">
+                <a:solidFill>
+                  <a:schemeClr val="dk1">
+                    <a:lumMod val="90000"/>
+                    <a:lumOff val="10000"/>
+                  </a:schemeClr>
+                </a:solidFill>
+                <a:effectLst/>
+                <a:uFillTx/>
+                <a:latin typeface="Arial"/>
+              </a:rPr>
+              <a:t>Clique para editar os estilos de texto Mestres</a:t>
+            </a:r>
+            <a:endParaRPr b="0" lang="pt-BR" sz="1800" strike="noStrike" u="none">
+              <a:solidFill>
+                <a:srgbClr val="000000"/>
+              </a:solidFill>
+              <a:effectLst/>
+              <a:uFillTx/>
+              <a:latin typeface="Arial"/>
+            </a:endParaRPr>
+          </a:p>
+          <a:p>
+            <a:pPr lvl="1" marL="622440" indent="-266760" defTabSz="914400">
+              <a:lnSpc>
+                <a:spcPct val="90000"/>
+              </a:lnSpc>
+              <a:spcBef>
+                <a:spcPts val="1134"/>
+              </a:spcBef>
+              <a:buClr>
+                <a:srgbClr val="393938"/>
+              </a:buClr>
+              <a:buFont typeface="Arial"/>
+              <a:buChar char="•"/>
+            </a:pPr>
+            <a:r>
+              <a:rPr b="0" lang="pt-BR" sz="1800" strike="noStrike" u="none">
+                <a:solidFill>
+                  <a:schemeClr val="dk1">
+                    <a:lumMod val="90000"/>
+                    <a:lumOff val="10000"/>
+                  </a:schemeClr>
+                </a:solidFill>
+                <a:effectLst/>
+                <a:uFillTx/>
+                <a:latin typeface="Arial"/>
+              </a:rPr>
+              <a:t>Segundo nível</a:t>
+            </a:r>
+            <a:endParaRPr b="0" lang="pt-BR" sz="1800" strike="noStrike" u="none">
+              <a:solidFill>
+                <a:srgbClr val="000000"/>
+              </a:solidFill>
+              <a:effectLst/>
+              <a:uFillTx/>
+              <a:latin typeface="Arial"/>
+            </a:endParaRPr>
+          </a:p>
+          <a:p>
+            <a:pPr lvl="2" marL="990720" indent="-266760" defTabSz="914400">
+              <a:lnSpc>
+                <a:spcPct val="90000"/>
+              </a:lnSpc>
+              <a:spcBef>
+                <a:spcPts val="850"/>
+              </a:spcBef>
+              <a:buClr>
+                <a:srgbClr val="393938"/>
+              </a:buClr>
+              <a:buFont typeface="Arial"/>
+              <a:buChar char="•"/>
+            </a:pPr>
+            <a:r>
+              <a:rPr b="0" lang="pt-BR" sz="1800" strike="noStrike" u="none">
+                <a:solidFill>
+                  <a:schemeClr val="dk1">
+                    <a:lumMod val="90000"/>
+                    <a:lumOff val="10000"/>
+                  </a:schemeClr>
+                </a:solidFill>
+                <a:effectLst/>
+                <a:uFillTx/>
+                <a:latin typeface="Arial"/>
+              </a:rPr>
+              <a:t>Terceiro nível</a:t>
+            </a:r>
+            <a:endParaRPr b="0" lang="pt-BR" sz="1800" strike="noStrike" u="none">
+              <a:solidFill>
+                <a:srgbClr val="000000"/>
+              </a:solidFill>
+              <a:effectLst/>
+              <a:uFillTx/>
+              <a:latin typeface="Arial"/>
+            </a:endParaRPr>
+          </a:p>
+          <a:p>
+            <a:pPr lvl="3" marL="1346040" indent="-266760" defTabSz="914400">
+              <a:lnSpc>
+                <a:spcPct val="90000"/>
+              </a:lnSpc>
+              <a:spcBef>
+                <a:spcPts val="567"/>
+              </a:spcBef>
+              <a:buClr>
+                <a:srgbClr val="393938"/>
+              </a:buClr>
+              <a:buFont typeface="Arial"/>
+              <a:buChar char="•"/>
+            </a:pPr>
+            <a:r>
+              <a:rPr b="0" lang="pt-BR" sz="1800" strike="noStrike" u="none">
+                <a:solidFill>
+                  <a:schemeClr val="dk1">
+                    <a:lumMod val="90000"/>
+                    <a:lumOff val="10000"/>
+                  </a:schemeClr>
+                </a:solidFill>
+                <a:effectLst/>
+                <a:uFillTx/>
+                <a:latin typeface="Arial"/>
+              </a:rPr>
+              <a:t>Quarto nível</a:t>
+            </a:r>
+            <a:endParaRPr b="0" lang="pt-BR" sz="1800" strike="noStrike" u="none">
+              <a:solidFill>
+                <a:srgbClr val="000000"/>
+              </a:solidFill>
+              <a:effectLst/>
+              <a:uFillTx/>
+              <a:latin typeface="Arial"/>
+            </a:endParaRPr>
+          </a:p>
+          <a:p>
+            <a:pPr lvl="4" marL="1701720" indent="-266760" defTabSz="914400">
+              <a:lnSpc>
+                <a:spcPct val="90000"/>
+              </a:lnSpc>
+              <a:spcBef>
+                <a:spcPts val="283"/>
+              </a:spcBef>
+              <a:buClr>
+                <a:srgbClr val="393938"/>
+              </a:buClr>
+              <a:buFont typeface="Arial"/>
+              <a:buChar char="•"/>
+            </a:pPr>
+            <a:r>
+              <a:rPr b="0" lang="pt-BR" sz="1800" strike="noStrike" u="none">
+                <a:solidFill>
+                  <a:schemeClr val="dk1">
+                    <a:lumMod val="90000"/>
+                    <a:lumOff val="10000"/>
+                  </a:schemeClr>
+                </a:solidFill>
+                <a:effectLst/>
+                <a:uFillTx/>
+                <a:latin typeface="Arial"/>
+              </a:rPr>
+              <a:t>Quinto nível</a:t>
+            </a:r>
+            <a:endParaRPr b="0" lang="pt-BR" sz="1800" strike="noStrike" u="none">
+              <a:solidFill>
+                <a:srgbClr val="000000"/>
+              </a:solidFill>
+              <a:effectLst/>
+              <a:uFillTx/>
+              <a:latin typeface="Arial"/>
+            </a:endParaRPr>
+          </a:p>
+        </p:txBody>
+      </p:sp>
+      <p:grpSp>
+        <p:nvGrpSpPr>
+          <p:cNvPr id="11" name=""/>
+          <p:cNvGrpSpPr/>
+          <p:nvPr/>
+        </p:nvGrpSpPr>
+        <p:grpSpPr>
+          <a:xfrm>
+            <a:off x="0" y="6213240"/>
+            <a:ext cx="12184560" cy="637200"/>
+            <a:chOff x="0" y="6213240"/>
+            <a:chExt cx="12184560" cy="637200"/>
+          </a:xfrm>
+        </p:grpSpPr>
+        <p:sp>
+          <p:nvSpPr>
+            <p:cNvPr id="12" name="Retângulo 11"/>
+            <p:cNvSpPr/>
+            <p:nvPr/>
+          </p:nvSpPr>
+          <p:spPr>
+            <a:xfrm>
+              <a:off x="0" y="6213240"/>
+              <a:ext cx="12184560" cy="637200"/>
+            </a:xfrm>
+            <a:prstGeom prst="rect">
+              <a:avLst/>
+            </a:prstGeom>
+            <a:solidFill>
+              <a:srgbClr val="f8f7f6"/>
+            </a:solidFill>
+            <a:ln>
+              <a:noFill/>
+            </a:ln>
+          </p:spPr>
+          <p:style>
+            <a:lnRef idx="2">
+              <a:schemeClr val="accent1">
+                <a:shade val="15000"/>
+              </a:schemeClr>
+            </a:lnRef>
+            <a:fillRef idx="1">
+              <a:schemeClr val="accent1"/>
+            </a:fillRef>
+            <a:effectRef idx="0">
+              <a:schemeClr val="accent1"/>
+            </a:effectRef>
+            <a:fontRef idx="minor"/>
+          </p:style>
+          <p:txBody>
+            <a:bodyPr lIns="90000" rIns="90000" tIns="45000" bIns="45000" anchor="ctr">
+              <a:noAutofit/>
+            </a:bodyPr>
+            <a:p>
+              <a:pPr algn="ctr" defTabSz="914400">
+                <a:lnSpc>
+                  <a:spcPct val="100000"/>
+                </a:lnSpc>
+                <a:tabLst>
+                  <a:tab algn="l" pos="0"/>
+                </a:tabLst>
+              </a:pPr>
+              <a:endParaRPr b="0" lang="pt-BR" sz="1600" strike="noStrike" u="none">
+                <a:solidFill>
+                  <a:srgbClr val="ffffff"/>
+                </a:solidFill>
+                <a:effectLst/>
+                <a:uFillTx/>
+                <a:latin typeface="Aptos"/>
+              </a:endParaRPr>
+            </a:p>
+          </p:txBody>
+        </p:sp>
+        <p:grpSp>
+          <p:nvGrpSpPr>
+            <p:cNvPr id="13" name=""/>
+            <p:cNvGrpSpPr/>
+            <p:nvPr/>
+          </p:nvGrpSpPr>
+          <p:grpSpPr>
+            <a:xfrm>
+              <a:off x="11101680" y="6387840"/>
+              <a:ext cx="897480" cy="300240"/>
+              <a:chOff x="11101680" y="6387840"/>
+              <a:chExt cx="897480" cy="300240"/>
+            </a:xfrm>
+          </p:grpSpPr>
+          <p:cxnSp>
+            <p:nvCxnSpPr>
+              <p:cNvPr id="14" name="Conector reto 14"/>
+              <p:cNvCxnSpPr/>
+              <p:nvPr/>
+            </p:nvCxnSpPr>
+            <p:spPr>
+              <a:xfrm>
+                <a:off x="11101680" y="6390000"/>
+                <a:ext cx="7560" cy="298440"/>
+              </a:xfrm>
+              <a:prstGeom prst="straightConnector1">
+                <a:avLst/>
+              </a:prstGeom>
+              <a:ln w="12700">
+                <a:solidFill>
+                  <a:srgbClr val="808080"/>
+                </a:solidFill>
+                <a:round/>
+              </a:ln>
+            </p:spPr>
+          </p:cxnSp>
+          <p:pic>
+            <p:nvPicPr>
+              <p:cNvPr id="15" name="Gráfico 15" descr=""/>
+              <p:cNvPicPr/>
+              <p:nvPr/>
+            </p:nvPicPr>
+            <p:blipFill>
+              <a:blip r:embed="rId2">
+                <a:extLst>
+                  <a:ext uri="{96DAC541-7B7A-43D3-8B79-37D633B846F1}">
+                    <asvg:svgBlip xmlns:asvg="http://schemas.microsoft.com/office/drawing/2016/SVG/main" r:embed="rId3"/>
+                  </a:ext>
+                </a:extLst>
+              </a:blip>
+              <a:stretch/>
+            </p:blipFill>
+            <p:spPr>
+              <a:xfrm>
+                <a:off x="11286720" y="6387840"/>
+                <a:ext cx="712440" cy="287640"/>
+              </a:xfrm>
+              <a:prstGeom prst="rect">
+                <a:avLst/>
+              </a:prstGeom>
+              <a:noFill/>
+              <a:ln w="0">
+                <a:noFill/>
+              </a:ln>
+            </p:spPr>
+          </p:pic>
+        </p:grpSp>
+      </p:grpSp>
+      <p:sp>
+        <p:nvSpPr>
+          <p:cNvPr id="16" name="PlaceHolder 3"/>
           <p:cNvSpPr/>
           <p:nvPr/>
         </p:nvSpPr>
         <p:spPr>
           <a:xfrm>
-            <a:off x="0" y="6213240"/>
-            <a:ext cx="12185640" cy="638280"/>
-          </a:xfrm>
-          <a:prstGeom prst="rect">
-            <a:avLst/>
-          </a:prstGeom>
-          <a:solidFill>
-            <a:srgbClr val="f8f7f6"/>
-          </a:solidFill>
-          <a:ln>
+            <a:off x="8173440" y="6354000"/>
+            <a:ext cx="2735640" cy="357480"/>
+          </a:xfrm>
+          <a:prstGeom prst="rect">
+            <a:avLst/>
+          </a:prstGeom>
+          <a:noFill/>
+          <a:ln w="0">
             <a:noFill/>
           </a:ln>
         </p:spPr>
         <p:style>
-          <a:lnRef idx="2">
-            <a:schemeClr val="accent1">
-              <a:shade val="15000"/>
-            </a:schemeClr>
-          </a:lnRef>
-          <a:fillRef idx="1">
-            <a:schemeClr val="accent1"/>
-          </a:fillRef>
-          <a:effectRef idx="0">
-            <a:schemeClr val="accent1"/>
-          </a:effectRef>
+          <a:lnRef idx="0"/>
+          <a:fillRef idx="0"/>
+          <a:effectRef idx="0"/>
           <a:fontRef idx="minor"/>
         </p:style>
         <p:txBody>
@@ -402,7 +1369,7 @@
             <a:noAutofit/>
           </a:bodyPr>
           <a:p>
-            <a:pPr algn="ctr" defTabSz="914400">
+            <a:pPr algn="r" defTabSz="914400">
               <a:lnSpc>
                 <a:spcPct val="100000"/>
               </a:lnSpc>
@@ -410,27 +1377,38 @@
                 <a:tab algn="l" pos="0"/>
               </a:tabLst>
             </a:pPr>
-            <a:endParaRPr b="0" lang="pt-BR" sz="1600" strike="noStrike" u="none">
-              <a:solidFill>
-                <a:srgbClr val="ffffff"/>
-              </a:solidFill>
-              <a:effectLst/>
-              <a:uFillTx/>
-              <a:latin typeface="Aptos"/>
+            <a:fld id="{FE89BAB0-7C5E-4C9F-B597-66CE4FE9EEB8}" type="slidenum">
+              <a:rPr b="0" lang="pt-BR" sz="1200" strike="noStrike" u="none">
+                <a:solidFill>
+                  <a:srgbClr val="808080"/>
+                </a:solidFill>
+                <a:effectLst/>
+                <a:uFillTx/>
+                <a:latin typeface="Arial"/>
+              </a:rPr>
+              <a:t>&lt;número&gt;</a:t>
+            </a:fld>
+            <a:endParaRPr b="0" lang="pt-BR" sz="1200" strike="noStrike" u="none">
+              <a:solidFill>
+                <a:srgbClr val="000000"/>
+              </a:solidFill>
+              <a:effectLst/>
+              <a:uFillTx/>
+              <a:latin typeface="Arial"/>
             </a:endParaRPr>
           </a:p>
         </p:txBody>
       </p:sp>
       <p:sp>
         <p:nvSpPr>
-          <p:cNvPr id="6" name="CaixaDeTexto 13"/>
+          <p:cNvPr id="17" name="CaixaDeTexto 13"/>
           <p:cNvSpPr/>
           <p:nvPr/>
         </p:nvSpPr>
         <p:spPr>
           <a:xfrm>
             <a:off x="211680" y="6397200"/>
-            <a:ext cx="5766480" cy="271800"/>
+            <a:ext cx="5770080" cy="274680"/>
           </a:xfrm>
           <a:prstGeom prst="rect">
             <a:avLst/>
@@ -524,61 +1502,9 @@
           </a:p>
         </p:txBody>
       </p:sp>
-      <p:cxnSp>
-        <p:nvCxnSpPr>
-          <p:cNvPr id="7" name="Conector reto 14"/>
-          <p:cNvCxnSpPr/>
-          <p:nvPr/>
-        </p:nvCxnSpPr>
-        <p:spPr>
-          <a:xfrm>
-            <a:off x="11101680" y="6390000"/>
-            <a:ext cx="6480" cy="297360"/>
-          </a:xfrm>
-          <a:prstGeom prst="straightConnector1">
-            <a:avLst/>
-          </a:prstGeom>
-          <a:ln w="12700">
-            <a:solidFill>
-              <a:srgbClr val="808080"/>
-            </a:solidFill>
-            <a:round/>
-          </a:ln>
-        </p:spPr>
-      </p:cxnSp>
-      <p:pic>
-        <p:nvPicPr>
-          <p:cNvPr id="8" name="Gráfico 15" descr=""/>
-          <p:cNvPicPr/>
-          <p:nvPr/>
-        </p:nvPicPr>
-        <p:blipFill>
-          <a:blip r:embed="rId2">
-            <a:extLst>
-              <a:ext uri="{96DAC541-7B7A-43D3-8B79-37D633B846F1}">
-                <asvg:svgBlip xmlns:asvg="http://schemas.microsoft.com/office/drawing/2016/SVG/main" r:embed="rId3"/>
-              </a:ext>
-            </a:extLst>
-          </a:blip>
-          <a:stretch/>
-        </p:blipFill>
-        <p:spPr>
-          <a:xfrm>
-            <a:off x="11286720" y="6387840"/>
-            <a:ext cx="713520" cy="288720"/>
-          </a:xfrm>
-          <a:prstGeom prst="rect">
-            <a:avLst/>
-          </a:prstGeom>
-          <a:noFill/>
-          <a:ln w="0">
-            <a:noFill/>
-          </a:ln>
-        </p:spPr>
-      </p:pic>
       <p:sp>
         <p:nvSpPr>
-          <p:cNvPr id="9" name="PlaceHolder 1"/>
+          <p:cNvPr id="18" name="PlaceHolder 2"/>
           <p:cNvSpPr>
             <a:spLocks noGrp="1"/>
           </p:cNvSpPr>
@@ -588,8 +1514,8 @@
         </p:nvSpPr>
         <p:spPr>
           <a:xfrm>
-            <a:off x="609480" y="708480"/>
-            <a:ext cx="10971000" cy="274680"/>
+            <a:off x="609480" y="653760"/>
+            <a:ext cx="10972080" cy="384480"/>
           </a:xfrm>
           <a:prstGeom prst="rect">
             <a:avLst/>
@@ -604,379 +1530,24 @@
             <a:spAutoFit/>
           </a:bodyPr>
           <a:p>
-            <a:pPr indent="0">
-              <a:lnSpc>
-                <a:spcPct val="100000"/>
+            <a:pPr indent="0" defTabSz="914400">
+              <a:lnSpc>
+                <a:spcPct val="90000"/>
               </a:lnSpc>
               <a:buNone/>
-              <a:tabLst>
-                <a:tab algn="l" pos="0"/>
-              </a:tabLst>
             </a:pPr>
             <a:r>
-              <a:rPr b="0" lang="pt-BR" sz="1800" strike="noStrike" u="none">
+              <a:rPr b="1" lang="pt-BR" sz="2800" strike="noStrike" u="none">
                 <a:solidFill>
-                  <a:srgbClr val="000000"/>
+                  <a:srgbClr val="171717"/>
                 </a:solidFill>
                 <a:effectLst/>
                 <a:uFillTx/>
                 <a:latin typeface="Arial"/>
               </a:rPr>
-              <a:t>Clique para editar o formato do texto do título</a:t>
-            </a:r>
-            <a:endParaRPr b="0" lang="pt-BR" sz="1800" strike="noStrike" u="none">
-              <a:solidFill>
-                <a:srgbClr val="000000"/>
-              </a:solidFill>
-              <a:effectLst/>
-              <a:uFillTx/>
-              <a:latin typeface="Arial"/>
-            </a:endParaRPr>
-          </a:p>
-        </p:txBody>
-      </p:sp>
-      <p:sp>
-        <p:nvSpPr>
-          <p:cNvPr id="10" name="PlaceHolder 2"/>
-          <p:cNvSpPr>
-            <a:spLocks noGrp="1"/>
-          </p:cNvSpPr>
-          <p:nvPr>
-            <p:ph type="sldNum" idx="2"/>
-          </p:nvPr>
-        </p:nvSpPr>
-        <p:spPr>
-          <a:xfrm>
-            <a:off x="8173440" y="6352920"/>
-            <a:ext cx="2736720" cy="358560"/>
-          </a:xfrm>
-          <a:prstGeom prst="rect">
-            <a:avLst/>
-          </a:prstGeom>
-          <a:noFill/>
-          <a:ln w="0">
-            <a:noFill/>
-          </a:ln>
-        </p:spPr>
-        <p:txBody>
-          <a:bodyPr lIns="91440" rIns="91440" tIns="45720" bIns="45720" anchor="ctr">
-            <a:noAutofit/>
-          </a:bodyPr>
-          <a:lstStyle>
-            <a:lvl1pPr indent="0" algn="r" defTabSz="914400">
-              <a:lnSpc>
-                <a:spcPct val="100000"/>
-              </a:lnSpc>
-              <a:buNone/>
-              <a:tabLst>
-                <a:tab algn="l" pos="0"/>
-              </a:tabLst>
-              <a:defRPr b="0" lang="pt-BR" sz="1200" strike="noStrike" u="none">
-                <a:solidFill>
-                  <a:srgbClr val="808080"/>
-                </a:solidFill>
-                <a:effectLst/>
-                <a:uFillTx/>
-                <a:latin typeface="Arial"/>
-              </a:defRPr>
-            </a:lvl1pPr>
-          </a:lstStyle>
-          <a:p>
-            <a:pPr indent="0" algn="r" defTabSz="914400">
-              <a:lnSpc>
-                <a:spcPct val="100000"/>
-              </a:lnSpc>
-              <a:buNone/>
-              <a:tabLst>
-                <a:tab algn="l" pos="0"/>
-              </a:tabLst>
-            </a:pPr>
-            <a:fld id="{BFBB8816-905D-4B39-952A-18646E1BB2D6}" type="slidenum">
-              <a:rPr b="0" lang="pt-BR" sz="1200" strike="noStrike" u="none">
-                <a:solidFill>
-                  <a:srgbClr val="808080"/>
-                </a:solidFill>
-                <a:effectLst/>
-                <a:uFillTx/>
-                <a:latin typeface="Arial"/>
-              </a:rPr>
-              <a:t>&lt;número&gt;</a:t>
-            </a:fld>
-            <a:endParaRPr b="0" lang="pt-BR" sz="1200" strike="noStrike" u="none">
-              <a:solidFill>
-                <a:srgbClr val="000000"/>
-              </a:solidFill>
-              <a:effectLst/>
-              <a:uFillTx/>
-              <a:latin typeface="Times New Roman"/>
-            </a:endParaRPr>
-          </a:p>
-        </p:txBody>
-      </p:sp>
-      <p:sp>
-        <p:nvSpPr>
-          <p:cNvPr id="11" name="PlaceHolder 3"/>
-          <p:cNvSpPr>
-            <a:spLocks noGrp="1"/>
-          </p:cNvSpPr>
-          <p:nvPr>
-            <p:ph type="body"/>
-          </p:nvPr>
-        </p:nvSpPr>
-        <p:spPr>
-          <a:xfrm>
-            <a:off x="609480" y="1604520"/>
-            <a:ext cx="10971360" cy="3976200"/>
-          </a:xfrm>
-          <a:prstGeom prst="rect">
-            <a:avLst/>
-          </a:prstGeom>
-          <a:noFill/>
-          <a:ln w="0">
-            <a:noFill/>
-          </a:ln>
-        </p:spPr>
-        <p:txBody>
-          <a:bodyPr lIns="0" rIns="0" tIns="0" bIns="0" anchor="t">
-            <a:normAutofit/>
-          </a:bodyPr>
-          <a:p>
-            <a:pPr marL="432000" indent="-324000">
-              <a:lnSpc>
-                <a:spcPct val="100000"/>
-              </a:lnSpc>
-              <a:spcBef>
-                <a:spcPts val="1417"/>
-              </a:spcBef>
-              <a:buClr>
-                <a:srgbClr val="000000"/>
-              </a:buClr>
-              <a:buSzPct val="45000"/>
-              <a:buFont typeface="Wingdings" charset="2"/>
-              <a:buChar char=""/>
-            </a:pPr>
-            <a:r>
-              <a:rPr b="0" lang="pt-BR" sz="3200" strike="noStrike" u="none">
-                <a:solidFill>
-                  <a:srgbClr val="000000"/>
-                </a:solidFill>
-                <a:effectLst/>
-                <a:uFillTx/>
-                <a:latin typeface="Arial"/>
-              </a:rPr>
-              <a:t>Clique para editar o formato de texto dos tópicos</a:t>
-            </a:r>
-            <a:endParaRPr b="0" lang="pt-BR" sz="3200" strike="noStrike" u="none">
-              <a:solidFill>
-                <a:srgbClr val="000000"/>
-              </a:solidFill>
-              <a:effectLst/>
-              <a:uFillTx/>
-              <a:latin typeface="Arial"/>
-            </a:endParaRPr>
-          </a:p>
-          <a:p>
-            <a:pPr lvl="1" marL="864000" indent="-324000">
-              <a:lnSpc>
-                <a:spcPct val="100000"/>
-              </a:lnSpc>
-              <a:spcBef>
-                <a:spcPts val="1134"/>
-              </a:spcBef>
-              <a:buClr>
-                <a:srgbClr val="000000"/>
-              </a:buClr>
-              <a:buSzPct val="75000"/>
-              <a:buFont typeface="Symbol" charset="2"/>
-              <a:buChar char=""/>
-            </a:pPr>
-            <a:r>
-              <a:rPr b="0" lang="pt-BR" sz="2800" strike="noStrike" u="none">
-                <a:solidFill>
-                  <a:srgbClr val="000000"/>
-                </a:solidFill>
-                <a:effectLst/>
-                <a:uFillTx/>
-                <a:latin typeface="Arial"/>
-              </a:rPr>
-              <a:t>2.º nível de tópicos</a:t>
+              <a:t>Clique para editar o título Mestre</a:t>
             </a:r>
             <a:endParaRPr b="0" lang="pt-BR" sz="2800" strike="noStrike" u="none">
-              <a:solidFill>
-                <a:srgbClr val="000000"/>
-              </a:solidFill>
-              <a:effectLst/>
-              <a:uFillTx/>
-              <a:latin typeface="Arial"/>
-            </a:endParaRPr>
-          </a:p>
-          <a:p>
-            <a:pPr lvl="2" marL="1296000" indent="-288000">
-              <a:lnSpc>
-                <a:spcPct val="100000"/>
-              </a:lnSpc>
-              <a:spcBef>
-                <a:spcPts val="850"/>
-              </a:spcBef>
-              <a:buClr>
-                <a:srgbClr val="000000"/>
-              </a:buClr>
-              <a:buSzPct val="45000"/>
-              <a:buFont typeface="Wingdings" charset="2"/>
-              <a:buChar char=""/>
-            </a:pPr>
-            <a:r>
-              <a:rPr b="0" lang="pt-BR" sz="2400" strike="noStrike" u="none">
-                <a:solidFill>
-                  <a:srgbClr val="000000"/>
-                </a:solidFill>
-                <a:effectLst/>
-                <a:uFillTx/>
-                <a:latin typeface="Arial"/>
-              </a:rPr>
-              <a:t>3.º nível de tópicos</a:t>
-            </a:r>
-            <a:endParaRPr b="0" lang="pt-BR" sz="2400" strike="noStrike" u="none">
-              <a:solidFill>
-                <a:srgbClr val="000000"/>
-              </a:solidFill>
-              <a:effectLst/>
-              <a:uFillTx/>
-              <a:latin typeface="Arial"/>
-            </a:endParaRPr>
-          </a:p>
-          <a:p>
-            <a:pPr lvl="3" marL="1728000" indent="-216000">
-              <a:lnSpc>
-                <a:spcPct val="100000"/>
-              </a:lnSpc>
-              <a:spcBef>
-                <a:spcPts val="567"/>
-              </a:spcBef>
-              <a:buClr>
-                <a:srgbClr val="000000"/>
-              </a:buClr>
-              <a:buSzPct val="75000"/>
-              <a:buFont typeface="Symbol" charset="2"/>
-              <a:buChar char=""/>
-            </a:pPr>
-            <a:r>
-              <a:rPr b="0" lang="pt-BR" sz="2000" strike="noStrike" u="none">
-                <a:solidFill>
-                  <a:srgbClr val="000000"/>
-                </a:solidFill>
-                <a:effectLst/>
-                <a:uFillTx/>
-                <a:latin typeface="Arial"/>
-              </a:rPr>
-              <a:t>4.º nível de tópicos</a:t>
-            </a:r>
-            <a:endParaRPr b="0" lang="pt-BR" sz="2000" strike="noStrike" u="none">
-              <a:solidFill>
-                <a:srgbClr val="000000"/>
-              </a:solidFill>
-              <a:effectLst/>
-              <a:uFillTx/>
-              <a:latin typeface="Arial"/>
-            </a:endParaRPr>
-          </a:p>
-          <a:p>
-            <a:pPr lvl="4" marL="2160000" indent="-216000">
-              <a:lnSpc>
-                <a:spcPct val="100000"/>
-              </a:lnSpc>
-              <a:spcBef>
-                <a:spcPts val="283"/>
-              </a:spcBef>
-              <a:buClr>
-                <a:srgbClr val="000000"/>
-              </a:buClr>
-              <a:buSzPct val="45000"/>
-              <a:buFont typeface="Wingdings" charset="2"/>
-              <a:buChar char=""/>
-            </a:pPr>
-            <a:r>
-              <a:rPr b="0" lang="pt-BR" sz="2000" strike="noStrike" u="none">
-                <a:solidFill>
-                  <a:srgbClr val="000000"/>
-                </a:solidFill>
-                <a:effectLst/>
-                <a:uFillTx/>
-                <a:latin typeface="Arial"/>
-              </a:rPr>
-              <a:t>5.º nível de tópicos</a:t>
-            </a:r>
-            <a:endParaRPr b="0" lang="pt-BR" sz="2000" strike="noStrike" u="none">
-              <a:solidFill>
-                <a:srgbClr val="000000"/>
-              </a:solidFill>
-              <a:effectLst/>
-              <a:uFillTx/>
-              <a:latin typeface="Arial"/>
-            </a:endParaRPr>
-          </a:p>
-          <a:p>
-            <a:pPr lvl="5" marL="2592000" indent="-216000">
-              <a:lnSpc>
-                <a:spcPct val="100000"/>
-              </a:lnSpc>
-              <a:spcBef>
-                <a:spcPts val="283"/>
-              </a:spcBef>
-              <a:buClr>
-                <a:srgbClr val="000000"/>
-              </a:buClr>
-              <a:buSzPct val="45000"/>
-              <a:buFont typeface="Wingdings" charset="2"/>
-              <a:buChar char=""/>
-            </a:pPr>
-            <a:r>
-              <a:rPr b="0" lang="pt-BR" sz="2000" strike="noStrike" u="none">
-                <a:solidFill>
-                  <a:srgbClr val="000000"/>
-                </a:solidFill>
-                <a:effectLst/>
-                <a:uFillTx/>
-                <a:latin typeface="Arial"/>
-              </a:rPr>
-              <a:t>6.º nível de tópicos</a:t>
-            </a:r>
-            <a:endParaRPr b="0" lang="pt-BR" sz="2000" strike="noStrike" u="none">
-              <a:solidFill>
-                <a:srgbClr val="000000"/>
-              </a:solidFill>
-              <a:effectLst/>
-              <a:uFillTx/>
-              <a:latin typeface="Arial"/>
-            </a:endParaRPr>
-          </a:p>
-          <a:p>
-            <a:pPr lvl="6" marL="3024000" indent="-216000">
-              <a:lnSpc>
-                <a:spcPct val="100000"/>
-              </a:lnSpc>
-              <a:spcBef>
-                <a:spcPts val="283"/>
-              </a:spcBef>
-              <a:buClr>
-                <a:srgbClr val="000000"/>
-              </a:buClr>
-              <a:buSzPct val="45000"/>
-              <a:buFont typeface="Wingdings" charset="2"/>
-              <a:buChar char=""/>
-            </a:pPr>
-            <a:r>
-              <a:rPr b="0" lang="pt-BR" sz="2000" strike="noStrike" u="none">
-                <a:solidFill>
-                  <a:srgbClr val="000000"/>
-                </a:solidFill>
-                <a:effectLst/>
-                <a:uFillTx/>
-                <a:latin typeface="Arial"/>
-              </a:rPr>
-              <a:t>7.º nível de tópicos</a:t>
-            </a:r>
-            <a:endParaRPr b="0" lang="pt-BR" sz="2000" strike="noStrike" u="none">
               <a:solidFill>
                 <a:srgbClr val="000000"/>
               </a:solidFill>
@@ -989,183 +1560,9 @@
       </p:sp>
     </p:spTree>
   </p:cSld>
-</p:sldLayout>
-</file>
-
-<file path=ppt/slideLayouts/slideLayout3.xml><?xml version="1.0" encoding="utf-8"?>
-<p:sldLayout xmlns:a="http://schemas.openxmlformats.org/drawingml/2006/main" xmlns:p="http://schemas.openxmlformats.org/presentationml/2006/main" xmlns:r="http://schemas.openxmlformats.org/officeDocument/2006/relationships" xmlns:p14="http://schemas.microsoft.com/office/powerpoint/2010/main" xmlns:p15="http://schemas.microsoft.com/office/powerpoint/2012/main" xmlns:mc="http://schemas.openxmlformats.org/markup-compatibility/2006" type="obj" preserve="1">
-  <p:cSld name="Padrão 6">
-    <p:spTree>
-      <p:nvGrpSpPr>
-        <p:cNvPr id="1" name=""/>
-        <p:cNvGrpSpPr/>
-        <p:nvPr/>
-      </p:nvGrpSpPr>
-      <p:grpSpPr>
-        <a:xfrm>
-          <a:off x="0" y="0"/>
-          <a:ext cx="0" cy="0"/>
-          <a:chOff x="0" y="0"/>
-          <a:chExt cx="0" cy="0"/>
-        </a:xfrm>
-      </p:grpSpPr>
-      <p:sp>
-        <p:nvSpPr>
-          <p:cNvPr id="19" name="PlaceHolder 1"/>
-          <p:cNvSpPr>
-            <a:spLocks noGrp="1"/>
-          </p:cNvSpPr>
-          <p:nvPr>
-            <p:ph type="title"/>
-          </p:nvPr>
-        </p:nvSpPr>
-        <p:spPr>
-          <a:xfrm>
-            <a:off x="609480" y="533160"/>
-            <a:ext cx="10971000" cy="625320"/>
-          </a:xfrm>
-          <a:prstGeom prst="rect">
-            <a:avLst/>
-          </a:prstGeom>
-          <a:noFill/>
-          <a:ln w="0">
-            <a:noFill/>
-          </a:ln>
-        </p:spPr>
-        <p:txBody>
-          <a:bodyPr lIns="0" rIns="0" tIns="0" bIns="0" anchor="ctr">
-            <a:spAutoFit/>
-          </a:bodyPr>
-          <a:p>
-            <a:pPr indent="0" algn="ctr">
-              <a:buNone/>
-            </a:pPr>
-            <a:endParaRPr b="0" lang="pt-BR" sz="4400" strike="noStrike" u="none">
-              <a:solidFill>
-                <a:srgbClr val="000000"/>
-              </a:solidFill>
-              <a:effectLst/>
-              <a:uFillTx/>
-              <a:latin typeface="Arial"/>
-            </a:endParaRPr>
-          </a:p>
-        </p:txBody>
-      </p:sp>
-      <p:sp>
-        <p:nvSpPr>
-          <p:cNvPr id="20" name="PlaceHolder 2"/>
-          <p:cNvSpPr>
-            <a:spLocks noGrp="1"/>
-          </p:cNvSpPr>
-          <p:nvPr>
-            <p:ph/>
-          </p:nvPr>
-        </p:nvSpPr>
-        <p:spPr>
-          <a:xfrm>
-            <a:off x="609480" y="1604520"/>
-            <a:ext cx="10971360" cy="3976200"/>
-          </a:xfrm>
-          <a:prstGeom prst="rect">
-            <a:avLst/>
-          </a:prstGeom>
-          <a:noFill/>
-          <a:ln w="0">
-            <a:noFill/>
-          </a:ln>
-        </p:spPr>
-        <p:txBody>
-          <a:bodyPr lIns="0" rIns="0" tIns="0" bIns="0" anchor="t">
-            <a:normAutofit/>
-          </a:bodyPr>
-          <a:p>
-            <a:pPr indent="0">
-              <a:spcBef>
-                <a:spcPts val="1417"/>
-              </a:spcBef>
-              <a:buNone/>
-            </a:pPr>
-            <a:endParaRPr b="0" lang="pt-BR" sz="3200" strike="noStrike" u="none">
-              <a:solidFill>
-                <a:srgbClr val="000000"/>
-              </a:solidFill>
-              <a:effectLst/>
-              <a:uFillTx/>
-              <a:latin typeface="Arial"/>
-            </a:endParaRPr>
-          </a:p>
-        </p:txBody>
-      </p:sp>
-    </p:spTree>
-  </p:cSld>
-</p:sldLayout>
-</file>
-
-<file path=ppt/slideLayouts/slideLayout4.xml><?xml version="1.0" encoding="utf-8"?>
-<p:sldLayout xmlns:a="http://schemas.openxmlformats.org/drawingml/2006/main" xmlns:p="http://schemas.openxmlformats.org/presentationml/2006/main" xmlns:r="http://schemas.openxmlformats.org/officeDocument/2006/relationships" xmlns:p14="http://schemas.microsoft.com/office/powerpoint/2010/main" xmlns:p15="http://schemas.microsoft.com/office/powerpoint/2012/main" xmlns:mc="http://schemas.openxmlformats.org/markup-compatibility/2006" type="blank" preserve="1">
-  <p:cSld name="Esquema de Cores MBX">
-    <p:spTree>
-      <p:nvGrpSpPr>
-        <p:cNvPr id="1" name=""/>
-        <p:cNvGrpSpPr/>
-        <p:nvPr/>
-      </p:nvGrpSpPr>
-      <p:grpSpPr>
-        <a:xfrm>
-          <a:off x="0" y="0"/>
-          <a:ext cx="0" cy="0"/>
-          <a:chOff x="0" y="0"/>
-          <a:chExt cx="0" cy="0"/>
-        </a:xfrm>
-      </p:grpSpPr>
-      <p:sp>
-        <p:nvSpPr>
-          <p:cNvPr id="2" name="PlaceHolder 1"/>
-          <p:cNvSpPr>
-            <a:spLocks noGrp="1"/>
-          </p:cNvSpPr>
-          <p:nvPr>
-            <p:ph type="sldNum" idx="3"/>
-          </p:nvPr>
-        </p:nvSpPr>
-        <p:spPr/>
-        <p:txBody>
-          <a:bodyPr/>
-          <a:p>
-            <a:fld id="{B251D928-D1F5-4035-8510-53EB9FE2420C}" type="slidenum">
-              <a:t>&lt;#&gt;</a:t>
-            </a:fld>
-          </a:p>
-        </p:txBody>
-      </p:sp>
-    </p:spTree>
-  </p:cSld>
-</p:sldLayout>
-</file>
-
-<file path=ppt/slideMasters/slideMaster1.xml><?xml version="1.0" encoding="utf-8"?>
-<p:sldMaster xmlns:a="http://schemas.openxmlformats.org/drawingml/2006/main" xmlns:p="http://schemas.openxmlformats.org/presentationml/2006/main" xmlns:r="http://schemas.openxmlformats.org/officeDocument/2006/relationships" xmlns:p14="http://schemas.microsoft.com/office/powerpoint/2010/main" xmlns:p15="http://schemas.microsoft.com/office/powerpoint/2012/main" xmlns:mc="http://schemas.openxmlformats.org/markup-compatibility/2006">
-  <p:cSld>
-    <p:spTree>
-      <p:nvGrpSpPr>
-        <p:cNvPr id="1" name=""/>
-        <p:cNvGrpSpPr/>
-        <p:nvPr/>
-      </p:nvGrpSpPr>
-      <p:grpSpPr>
-        <a:xfrm>
-          <a:off x="0" y="0"/>
-          <a:ext cx="0" cy="0"/>
-          <a:chOff x="0" y="0"/>
-          <a:chExt cx="0" cy="0"/>
-        </a:xfrm>
-      </p:grpSpPr>
-    </p:spTree>
-  </p:cSld>
   <p:clrMap bg1="lt1" tx1="dk1" bg2="lt2" tx2="dk2" accent1="accent1" accent2="accent2" accent3="accent3" accent4="accent4" accent5="accent5" accent6="accent6" hlink="hlink" folHlink="folHlink"/>
   <p:sldLayoutIdLst>
-    <p:sldLayoutId id="2147483649" r:id="rId2"/>
-    <p:sldLayoutId id="2147483650" r:id="rId3"/>
+    <p:sldLayoutId id="2147483653" r:id="rId4"/>
   </p:sldLayoutIdLst>
 </p:sldMaster>
 </file>
@@ -1196,14 +1593,14 @@
       </p:grpSpPr>
       <p:sp>
         <p:nvSpPr>
-          <p:cNvPr id="12" name="Retângulo 11"/>
+          <p:cNvPr id="21" name="Retângulo 11"/>
           <p:cNvSpPr/>
           <p:nvPr/>
         </p:nvSpPr>
         <p:spPr>
           <a:xfrm>
             <a:off x="0" y="6213240"/>
-            <a:ext cx="12185640" cy="638280"/>
+            <a:ext cx="12184560" cy="637200"/>
           </a:xfrm>
           <a:prstGeom prst="rect">
             <a:avLst/>
@@ -1255,14 +1652,14 @@
       </p:sp>
       <p:sp>
         <p:nvSpPr>
-          <p:cNvPr id="13" name="CaixaDeTexto 13"/>
+          <p:cNvPr id="22" name="CaixaDeTexto 13"/>
           <p:cNvSpPr/>
           <p:nvPr/>
         </p:nvSpPr>
         <p:spPr>
           <a:xfrm>
             <a:off x="211680" y="6397200"/>
-            <a:ext cx="5766480" cy="271800"/>
+            <a:ext cx="5765400" cy="270720"/>
           </a:xfrm>
           <a:prstGeom prst="rect">
             <a:avLst/>
@@ -1358,619 +1755,6 @@
       </p:sp>
       <p:cxnSp>
         <p:nvCxnSpPr>
-          <p:cNvPr id="14" name="Conector reto 14"/>
-          <p:cNvCxnSpPr/>
-          <p:nvPr/>
-        </p:nvCxnSpPr>
-        <p:spPr>
-          <a:xfrm>
-            <a:off x="11101680" y="6390000"/>
-            <a:ext cx="6480" cy="297360"/>
-          </a:xfrm>
-          <a:prstGeom prst="straightConnector1">
-            <a:avLst/>
-          </a:prstGeom>
-          <a:ln w="12700">
-            <a:solidFill>
-              <a:srgbClr val="808080"/>
-            </a:solidFill>
-            <a:round/>
-          </a:ln>
-        </p:spPr>
-      </p:cxnSp>
-      <p:pic>
-        <p:nvPicPr>
-          <p:cNvPr id="15" name="Gráfico 15" descr=""/>
-          <p:cNvPicPr/>
-          <p:nvPr/>
-        </p:nvPicPr>
-        <p:blipFill>
-          <a:blip r:embed="rId2">
-            <a:extLst>
-              <a:ext uri="{96DAC541-7B7A-43D3-8B79-37D633B846F1}">
-                <asvg:svgBlip xmlns:asvg="http://schemas.microsoft.com/office/drawing/2016/SVG/main" r:embed="rId3"/>
-              </a:ext>
-            </a:extLst>
-          </a:blip>
-          <a:stretch/>
-        </p:blipFill>
-        <p:spPr>
-          <a:xfrm>
-            <a:off x="11286720" y="6387840"/>
-            <a:ext cx="713520" cy="288720"/>
-          </a:xfrm>
-          <a:prstGeom prst="rect">
-            <a:avLst/>
-          </a:prstGeom>
-          <a:noFill/>
-          <a:ln w="0">
-            <a:noFill/>
-          </a:ln>
-        </p:spPr>
-      </p:pic>
-      <p:sp>
-        <p:nvSpPr>
-          <p:cNvPr id="16" name="PlaceHolder 3"/>
-          <p:cNvSpPr/>
-          <p:nvPr/>
-        </p:nvSpPr>
-        <p:spPr>
-          <a:xfrm>
-            <a:off x="8173440" y="6352920"/>
-            <a:ext cx="2736720" cy="358560"/>
-          </a:xfrm>
-          <a:prstGeom prst="rect">
-            <a:avLst/>
-          </a:prstGeom>
-          <a:noFill/>
-          <a:ln w="0">
-            <a:noFill/>
-          </a:ln>
-        </p:spPr>
-        <p:style>
-          <a:lnRef idx="0"/>
-          <a:fillRef idx="0"/>
-          <a:effectRef idx="0"/>
-          <a:fontRef idx="minor"/>
-        </p:style>
-        <p:txBody>
-          <a:bodyPr lIns="90000" rIns="90000" tIns="45000" bIns="45000" anchor="ctr">
-            <a:noAutofit/>
-          </a:bodyPr>
-          <a:p>
-            <a:pPr algn="r" defTabSz="914400">
-              <a:lnSpc>
-                <a:spcPct val="100000"/>
-              </a:lnSpc>
-              <a:tabLst>
-                <a:tab algn="l" pos="0"/>
-              </a:tabLst>
-            </a:pPr>
-            <a:fld id="{392F2FD3-E9D4-45B7-A371-A7C1E0B7DADF}" type="slidenum">
-              <a:rPr b="0" lang="pt-BR" sz="1200" strike="noStrike" u="none">
-                <a:solidFill>
-                  <a:srgbClr val="808080"/>
-                </a:solidFill>
-                <a:effectLst/>
-                <a:uFillTx/>
-                <a:latin typeface="Arial"/>
-              </a:rPr>
-              <a:t>&lt;número&gt;</a:t>
-            </a:fld>
-            <a:endParaRPr b="0" lang="pt-BR" sz="1200" strike="noStrike" u="none">
-              <a:solidFill>
-                <a:srgbClr val="000000"/>
-              </a:solidFill>
-              <a:effectLst/>
-              <a:uFillTx/>
-              <a:latin typeface="Arial"/>
-            </a:endParaRPr>
-          </a:p>
-        </p:txBody>
-      </p:sp>
-      <p:sp>
-        <p:nvSpPr>
-          <p:cNvPr id="17" name="PlaceHolder 1"/>
-          <p:cNvSpPr>
-            <a:spLocks noGrp="1"/>
-          </p:cNvSpPr>
-          <p:nvPr>
-            <p:ph type="title"/>
-          </p:nvPr>
-        </p:nvSpPr>
-        <p:spPr>
-          <a:xfrm>
-            <a:off x="609480" y="708120"/>
-            <a:ext cx="10971000" cy="274680"/>
-          </a:xfrm>
-          <a:prstGeom prst="rect">
-            <a:avLst/>
-          </a:prstGeom>
-          <a:noFill/>
-          <a:ln w="0">
-            <a:noFill/>
-          </a:ln>
-        </p:spPr>
-        <p:txBody>
-          <a:bodyPr lIns="0" rIns="0" tIns="0" bIns="0" anchor="ctr">
-            <a:spAutoFit/>
-          </a:bodyPr>
-          <a:p>
-            <a:pPr indent="0">
-              <a:buNone/>
-            </a:pPr>
-            <a:r>
-              <a:rPr b="0" lang="pt-BR" sz="1800" strike="noStrike" u="none">
-                <a:solidFill>
-                  <a:srgbClr val="000000"/>
-                </a:solidFill>
-                <a:effectLst/>
-                <a:uFillTx/>
-                <a:latin typeface="Arial"/>
-              </a:rPr>
-              <a:t>Clique para editar o formato do texto do título</a:t>
-            </a:r>
-            <a:endParaRPr b="0" lang="pt-BR" sz="1800" strike="noStrike" u="none">
-              <a:solidFill>
-                <a:srgbClr val="000000"/>
-              </a:solidFill>
-              <a:effectLst/>
-              <a:uFillTx/>
-              <a:latin typeface="Arial"/>
-            </a:endParaRPr>
-          </a:p>
-        </p:txBody>
-      </p:sp>
-      <p:sp>
-        <p:nvSpPr>
-          <p:cNvPr id="18" name="PlaceHolder 2"/>
-          <p:cNvSpPr>
-            <a:spLocks noGrp="1"/>
-          </p:cNvSpPr>
-          <p:nvPr>
-            <p:ph type="body"/>
-          </p:nvPr>
-        </p:nvSpPr>
-        <p:spPr>
-          <a:xfrm>
-            <a:off x="609480" y="1604520"/>
-            <a:ext cx="10971360" cy="4515480"/>
-          </a:xfrm>
-          <a:prstGeom prst="rect">
-            <a:avLst/>
-          </a:prstGeom>
-          <a:noFill/>
-          <a:ln w="0">
-            <a:noFill/>
-          </a:ln>
-        </p:spPr>
-        <p:txBody>
-          <a:bodyPr lIns="0" rIns="0" tIns="0" bIns="0" anchor="t">
-            <a:normAutofit/>
-          </a:bodyPr>
-          <a:p>
-            <a:pPr marL="432000" indent="-324000">
-              <a:spcBef>
-                <a:spcPts val="1417"/>
-              </a:spcBef>
-              <a:buClr>
-                <a:srgbClr val="000000"/>
-              </a:buClr>
-              <a:buSzPct val="45000"/>
-              <a:buFont typeface="Wingdings" charset="2"/>
-              <a:buChar char=""/>
-            </a:pPr>
-            <a:r>
-              <a:rPr b="0" lang="pt-BR" sz="1800" strike="noStrike" u="none">
-                <a:solidFill>
-                  <a:srgbClr val="000000"/>
-                </a:solidFill>
-                <a:effectLst/>
-                <a:uFillTx/>
-                <a:latin typeface="Arial"/>
-              </a:rPr>
-              <a:t>Clique para editar o formato de texto dos tópicos</a:t>
-            </a:r>
-            <a:endParaRPr b="0" lang="pt-BR" sz="1800" strike="noStrike" u="none">
-              <a:solidFill>
-                <a:srgbClr val="000000"/>
-              </a:solidFill>
-              <a:effectLst/>
-              <a:uFillTx/>
-              <a:latin typeface="Arial"/>
-            </a:endParaRPr>
-          </a:p>
-          <a:p>
-            <a:pPr lvl="1" marL="864000" indent="-324000">
-              <a:spcBef>
-                <a:spcPts val="1134"/>
-              </a:spcBef>
-              <a:buClr>
-                <a:srgbClr val="000000"/>
-              </a:buClr>
-              <a:buSzPct val="75000"/>
-              <a:buFont typeface="Symbol" charset="2"/>
-              <a:buChar char=""/>
-            </a:pPr>
-            <a:r>
-              <a:rPr b="0" lang="pt-BR" sz="1800" strike="noStrike" u="none">
-                <a:solidFill>
-                  <a:srgbClr val="000000"/>
-                </a:solidFill>
-                <a:effectLst/>
-                <a:uFillTx/>
-                <a:latin typeface="Arial"/>
-              </a:rPr>
-              <a:t>2.º nível de tópicos</a:t>
-            </a:r>
-            <a:endParaRPr b="0" lang="pt-BR" sz="1800" strike="noStrike" u="none">
-              <a:solidFill>
-                <a:srgbClr val="000000"/>
-              </a:solidFill>
-              <a:effectLst/>
-              <a:uFillTx/>
-              <a:latin typeface="Arial"/>
-            </a:endParaRPr>
-          </a:p>
-          <a:p>
-            <a:pPr lvl="2" marL="1296000" indent="-288000">
-              <a:spcBef>
-                <a:spcPts val="850"/>
-              </a:spcBef>
-              <a:buClr>
-                <a:srgbClr val="000000"/>
-              </a:buClr>
-              <a:buSzPct val="45000"/>
-              <a:buFont typeface="Wingdings" charset="2"/>
-              <a:buChar char=""/>
-            </a:pPr>
-            <a:r>
-              <a:rPr b="0" lang="pt-BR" sz="1800" strike="noStrike" u="none">
-                <a:solidFill>
-                  <a:srgbClr val="000000"/>
-                </a:solidFill>
-                <a:effectLst/>
-                <a:uFillTx/>
-                <a:latin typeface="Arial"/>
-              </a:rPr>
-              <a:t>3.º nível de tópicos</a:t>
-            </a:r>
-            <a:endParaRPr b="0" lang="pt-BR" sz="1800" strike="noStrike" u="none">
-              <a:solidFill>
-                <a:srgbClr val="000000"/>
-              </a:solidFill>
-              <a:effectLst/>
-              <a:uFillTx/>
-              <a:latin typeface="Arial"/>
-            </a:endParaRPr>
-          </a:p>
-          <a:p>
-            <a:pPr lvl="3" marL="1728000" indent="-216000">
-              <a:spcBef>
-                <a:spcPts val="567"/>
-              </a:spcBef>
-              <a:buClr>
-                <a:srgbClr val="000000"/>
-              </a:buClr>
-              <a:buSzPct val="75000"/>
-              <a:buFont typeface="Symbol" charset="2"/>
-              <a:buChar char=""/>
-            </a:pPr>
-            <a:r>
-              <a:rPr b="0" lang="pt-BR" sz="1800" strike="noStrike" u="none">
-                <a:solidFill>
-                  <a:srgbClr val="000000"/>
-                </a:solidFill>
-                <a:effectLst/>
-                <a:uFillTx/>
-                <a:latin typeface="Arial"/>
-              </a:rPr>
-              <a:t>4.º nível de tópicos</a:t>
-            </a:r>
-            <a:endParaRPr b="0" lang="pt-BR" sz="1800" strike="noStrike" u="none">
-              <a:solidFill>
-                <a:srgbClr val="000000"/>
-              </a:solidFill>
-              <a:effectLst/>
-              <a:uFillTx/>
-              <a:latin typeface="Arial"/>
-            </a:endParaRPr>
-          </a:p>
-          <a:p>
-            <a:pPr lvl="4" marL="2160000" indent="-216000">
-              <a:spcBef>
-                <a:spcPts val="283"/>
-              </a:spcBef>
-              <a:buClr>
-                <a:srgbClr val="000000"/>
-              </a:buClr>
-              <a:buSzPct val="45000"/>
-              <a:buFont typeface="Wingdings" charset="2"/>
-              <a:buChar char=""/>
-            </a:pPr>
-            <a:r>
-              <a:rPr b="0" lang="pt-BR" sz="1800" strike="noStrike" u="none">
-                <a:solidFill>
-                  <a:srgbClr val="000000"/>
-                </a:solidFill>
-                <a:effectLst/>
-                <a:uFillTx/>
-                <a:latin typeface="Arial"/>
-              </a:rPr>
-              <a:t>5.º nível de tópicos</a:t>
-            </a:r>
-            <a:endParaRPr b="0" lang="pt-BR" sz="1800" strike="noStrike" u="none">
-              <a:solidFill>
-                <a:srgbClr val="000000"/>
-              </a:solidFill>
-              <a:effectLst/>
-              <a:uFillTx/>
-              <a:latin typeface="Arial"/>
-            </a:endParaRPr>
-          </a:p>
-          <a:p>
-            <a:pPr lvl="5" marL="2592000" indent="-216000">
-              <a:spcBef>
-                <a:spcPts val="283"/>
-              </a:spcBef>
-              <a:buClr>
-                <a:srgbClr val="000000"/>
-              </a:buClr>
-              <a:buSzPct val="45000"/>
-              <a:buFont typeface="Wingdings" charset="2"/>
-              <a:buChar char=""/>
-            </a:pPr>
-            <a:r>
-              <a:rPr b="0" lang="pt-BR" sz="1800" strike="noStrike" u="none">
-                <a:solidFill>
-                  <a:srgbClr val="000000"/>
-                </a:solidFill>
-                <a:effectLst/>
-                <a:uFillTx/>
-                <a:latin typeface="Arial"/>
-              </a:rPr>
-              <a:t>6.º nível de tópicos</a:t>
-            </a:r>
-            <a:endParaRPr b="0" lang="pt-BR" sz="1800" strike="noStrike" u="none">
-              <a:solidFill>
-                <a:srgbClr val="000000"/>
-              </a:solidFill>
-              <a:effectLst/>
-              <a:uFillTx/>
-              <a:latin typeface="Arial"/>
-            </a:endParaRPr>
-          </a:p>
-          <a:p>
-            <a:pPr lvl="6" marL="3024000" indent="-216000">
-              <a:spcBef>
-                <a:spcPts val="283"/>
-              </a:spcBef>
-              <a:buClr>
-                <a:srgbClr val="000000"/>
-              </a:buClr>
-              <a:buSzPct val="45000"/>
-              <a:buFont typeface="Wingdings" charset="2"/>
-              <a:buChar char=""/>
-            </a:pPr>
-            <a:r>
-              <a:rPr b="0" lang="pt-BR" sz="1800" strike="noStrike" u="none">
-                <a:solidFill>
-                  <a:srgbClr val="000000"/>
-                </a:solidFill>
-                <a:effectLst/>
-                <a:uFillTx/>
-                <a:latin typeface="Arial"/>
-              </a:rPr>
-              <a:t>7.º nível de tópicos</a:t>
-            </a:r>
-            <a:endParaRPr b="0" lang="pt-BR" sz="1800" strike="noStrike" u="none">
-              <a:solidFill>
-                <a:srgbClr val="000000"/>
-              </a:solidFill>
-              <a:effectLst/>
-              <a:uFillTx/>
-              <a:latin typeface="Arial"/>
-            </a:endParaRPr>
-          </a:p>
-        </p:txBody>
-      </p:sp>
-    </p:spTree>
-  </p:cSld>
-  <p:clrMap bg1="lt1" tx1="dk1" bg2="lt2" tx2="dk2" accent1="accent1" accent2="accent2" accent3="accent3" accent4="accent4" accent5="accent5" accent6="accent6" hlink="hlink" folHlink="folHlink"/>
-  <p:sldLayoutIdLst>
-    <p:sldLayoutId id="2147483652" r:id="rId4"/>
-  </p:sldLayoutIdLst>
-</p:sldMaster>
-</file>
-
-<file path=ppt/slideMasters/slideMaster4.xml><?xml version="1.0" encoding="utf-8"?>
-<p:sldMaster xmlns:a="http://schemas.openxmlformats.org/drawingml/2006/main" xmlns:p="http://schemas.openxmlformats.org/presentationml/2006/main" xmlns:r="http://schemas.openxmlformats.org/officeDocument/2006/relationships" xmlns:p14="http://schemas.microsoft.com/office/powerpoint/2010/main" xmlns:p15="http://schemas.microsoft.com/office/powerpoint/2012/main" xmlns:mc="http://schemas.openxmlformats.org/markup-compatibility/2006">
-  <p:cSld>
-    <p:bg>
-      <p:bgPr>
-        <a:solidFill>
-          <a:srgbClr val="fcfcfc"/>
-        </a:solidFill>
-      </p:bgPr>
-    </p:bg>
-    <p:spTree>
-      <p:nvGrpSpPr>
-        <p:cNvPr id="1" name=""/>
-        <p:cNvGrpSpPr/>
-        <p:nvPr/>
-      </p:nvGrpSpPr>
-      <p:grpSpPr>
-        <a:xfrm>
-          <a:off x="0" y="0"/>
-          <a:ext cx="0" cy="0"/>
-          <a:chOff x="0" y="0"/>
-          <a:chExt cx="0" cy="0"/>
-        </a:xfrm>
-      </p:grpSpPr>
-      <p:sp>
-        <p:nvSpPr>
-          <p:cNvPr id="21" name="Retângulo 11"/>
-          <p:cNvSpPr/>
-          <p:nvPr/>
-        </p:nvSpPr>
-        <p:spPr>
-          <a:xfrm>
-            <a:off x="0" y="6213240"/>
-            <a:ext cx="12185640" cy="638280"/>
-          </a:xfrm>
-          <a:prstGeom prst="rect">
-            <a:avLst/>
-          </a:prstGeom>
-          <a:solidFill>
-            <a:srgbClr val="f8f7f6"/>
-          </a:solidFill>
-          <a:ln>
-            <a:noFill/>
-          </a:ln>
-        </p:spPr>
-        <p:style>
-          <a:lnRef idx="2">
-            <a:schemeClr val="accent1">
-              <a:shade val="15000"/>
-            </a:schemeClr>
-          </a:lnRef>
-          <a:fillRef idx="1">
-            <a:schemeClr val="accent1"/>
-          </a:fillRef>
-          <a:effectRef idx="0">
-            <a:schemeClr val="accent1"/>
-          </a:effectRef>
-          <a:fontRef idx="minor"/>
-        </p:style>
-        <p:txBody>
-          <a:bodyPr lIns="90000" rIns="90000" tIns="45000" bIns="45000" anchor="ctr">
-            <a:noAutofit/>
-          </a:bodyPr>
-          <a:p>
-            <a:pPr algn="ctr" defTabSz="914400">
-              <a:lnSpc>
-                <a:spcPct val="100000"/>
-              </a:lnSpc>
-              <a:tabLst>
-                <a:tab algn="l" pos="0"/>
-              </a:tabLst>
-            </a:pPr>
-            <a:endParaRPr b="0" lang="pt-BR" sz="1600" strike="noStrike" u="none">
-              <a:solidFill>
-                <a:srgbClr val="ffffff"/>
-              </a:solidFill>
-              <a:effectLst/>
-              <a:uFillTx/>
-              <a:latin typeface="Aptos"/>
-            </a:endParaRPr>
-          </a:p>
-        </p:txBody>
-      </p:sp>
-      <p:sp>
-        <p:nvSpPr>
-          <p:cNvPr id="22" name="CaixaDeTexto 13"/>
-          <p:cNvSpPr/>
-          <p:nvPr/>
-        </p:nvSpPr>
-        <p:spPr>
-          <a:xfrm>
-            <a:off x="211680" y="6397200"/>
-            <a:ext cx="5766480" cy="271800"/>
-          </a:xfrm>
-          <a:prstGeom prst="rect">
-            <a:avLst/>
-          </a:prstGeom>
-          <a:noFill/>
-          <a:ln w="0">
-            <a:noFill/>
-          </a:ln>
-        </p:spPr>
-        <p:style>
-          <a:lnRef idx="0"/>
-          <a:fillRef idx="0"/>
-          <a:effectRef idx="0"/>
-          <a:fontRef idx="minor"/>
-        </p:style>
-        <p:txBody>
-          <a:bodyPr wrap="none" lIns="0" rIns="0" tIns="0" bIns="0" anchor="t">
-            <a:spAutoFit/>
-          </a:bodyPr>
-          <a:p>
-            <a:pPr defTabSz="914400">
-              <a:lnSpc>
-                <a:spcPct val="100000"/>
-              </a:lnSpc>
-            </a:pPr>
-            <a:r>
-              <a:rPr b="0" lang="pt-BR" sz="900" strike="noStrike" u="none">
-                <a:solidFill>
-                  <a:schemeClr val="dk1">
-                    <a:lumMod val="85000"/>
-                    <a:lumOff val="15000"/>
-                  </a:schemeClr>
-                </a:solidFill>
-                <a:effectLst/>
-                <a:uFillTx/>
-                <a:latin typeface="Arial"/>
-              </a:rPr>
-              <a:t>A responsabilidade pela idoneidade, originalidade e licitude dos conteúdos didáticos apresentados é do professor.</a:t>
-            </a:r>
-            <a:endParaRPr b="0" lang="pt-BR" sz="900" strike="noStrike" u="none">
-              <a:solidFill>
-                <a:srgbClr val="000000"/>
-              </a:solidFill>
-              <a:effectLst/>
-              <a:uFillTx/>
-              <a:latin typeface="Arial"/>
-            </a:endParaRPr>
-          </a:p>
-          <a:p>
-            <a:pPr defTabSz="914400">
-              <a:lnSpc>
-                <a:spcPct val="100000"/>
-              </a:lnSpc>
-            </a:pPr>
-            <a:r>
-              <a:rPr b="1" lang="pt-BR" sz="900" strike="noStrike" u="none">
-                <a:solidFill>
-                  <a:schemeClr val="dk1">
-                    <a:lumMod val="85000"/>
-                    <a:lumOff val="15000"/>
-                  </a:schemeClr>
-                </a:solidFill>
-                <a:effectLst/>
-                <a:uFillTx/>
-                <a:latin typeface="Arial"/>
-              </a:rPr>
-              <a:t>Proibida a reprodução</a:t>
-            </a:r>
-            <a:r>
-              <a:rPr b="0" lang="pt-BR" sz="900" strike="noStrike" u="none">
-                <a:solidFill>
-                  <a:schemeClr val="dk1">
-                    <a:lumMod val="85000"/>
-                    <a:lumOff val="15000"/>
-                  </a:schemeClr>
-                </a:solidFill>
-                <a:effectLst/>
-                <a:uFillTx/>
-                <a:latin typeface="Arial"/>
-              </a:rPr>
-              <a:t>, total ou parcial, sem autorização. Lei nº 9610/98</a:t>
-            </a:r>
-            <a:endParaRPr b="0" lang="pt-BR" sz="900" strike="noStrike" u="none">
-              <a:solidFill>
-                <a:srgbClr val="000000"/>
-              </a:solidFill>
-              <a:effectLst/>
-              <a:uFillTx/>
-              <a:latin typeface="Arial"/>
-            </a:endParaRPr>
-          </a:p>
-        </p:txBody>
-      </p:sp>
-      <p:cxnSp>
-        <p:nvCxnSpPr>
           <p:cNvPr id="23" name="Conector reto 14"/>
           <p:cNvCxnSpPr/>
           <p:nvPr/>
@@ -1978,7 +1762,7 @@
         <p:spPr>
           <a:xfrm>
             <a:off x="11101680" y="6390000"/>
-            <a:ext cx="6480" cy="297360"/>
+            <a:ext cx="7560" cy="298440"/>
           </a:xfrm>
           <a:prstGeom prst="straightConnector1">
             <a:avLst/>
@@ -2010,7 +1794,7 @@
         <p:spPr>
           <a:xfrm>
             <a:off x="11286720" y="6387840"/>
-            <a:ext cx="713520" cy="288720"/>
+            <a:ext cx="712440" cy="287640"/>
           </a:xfrm>
           <a:prstGeom prst="rect">
             <a:avLst/>
@@ -2030,7 +1814,7 @@
         <p:spPr>
           <a:xfrm>
             <a:off x="0" y="0"/>
-            <a:ext cx="12185640" cy="6851520"/>
+            <a:ext cx="12184560" cy="6850440"/>
           </a:xfrm>
           <a:prstGeom prst="rect">
             <a:avLst/>
@@ -2086,7 +1870,7 @@
         <p:spPr>
           <a:xfrm>
             <a:off x="4025880" y="2707920"/>
-            <a:ext cx="533520" cy="533520"/>
+            <a:ext cx="532440" cy="532440"/>
           </a:xfrm>
           <a:prstGeom prst="rect">
             <a:avLst/>
@@ -2142,7 +1926,7 @@
         <p:spPr>
           <a:xfrm>
             <a:off x="7625880" y="2707920"/>
-            <a:ext cx="533520" cy="533520"/>
+            <a:ext cx="532440" cy="532440"/>
           </a:xfrm>
           <a:prstGeom prst="rect">
             <a:avLst/>
@@ -2198,7 +1982,7 @@
         <p:spPr>
           <a:xfrm>
             <a:off x="5825880" y="2707920"/>
-            <a:ext cx="533520" cy="533520"/>
+            <a:ext cx="532440" cy="532440"/>
           </a:xfrm>
           <a:prstGeom prst="rect">
             <a:avLst/>
@@ -2254,7 +2038,7 @@
         <p:spPr>
           <a:xfrm>
             <a:off x="6725880" y="2707920"/>
-            <a:ext cx="533520" cy="533520"/>
+            <a:ext cx="532440" cy="532440"/>
           </a:xfrm>
           <a:prstGeom prst="rect">
             <a:avLst/>
@@ -2310,7 +2094,7 @@
         <p:spPr>
           <a:xfrm>
             <a:off x="4925880" y="2707920"/>
-            <a:ext cx="533520" cy="533520"/>
+            <a:ext cx="532440" cy="532440"/>
           </a:xfrm>
           <a:prstGeom prst="rect">
             <a:avLst/>
@@ -2366,7 +2150,7 @@
         <p:spPr>
           <a:xfrm>
             <a:off x="4025880" y="3610080"/>
-            <a:ext cx="533520" cy="533520"/>
+            <a:ext cx="532440" cy="532440"/>
           </a:xfrm>
           <a:prstGeom prst="rect">
             <a:avLst/>
@@ -2422,7 +2206,7 @@
         <p:spPr>
           <a:xfrm>
             <a:off x="7625880" y="3610080"/>
-            <a:ext cx="533520" cy="533520"/>
+            <a:ext cx="532440" cy="532440"/>
           </a:xfrm>
           <a:prstGeom prst="rect">
             <a:avLst/>
@@ -2478,7 +2262,7 @@
         <p:spPr>
           <a:xfrm>
             <a:off x="5825880" y="3610080"/>
-            <a:ext cx="533520" cy="533520"/>
+            <a:ext cx="532440" cy="532440"/>
           </a:xfrm>
           <a:prstGeom prst="rect">
             <a:avLst/>
@@ -2534,7 +2318,7 @@
         <p:spPr>
           <a:xfrm>
             <a:off x="6725880" y="3610080"/>
-            <a:ext cx="533520" cy="533520"/>
+            <a:ext cx="532440" cy="532440"/>
           </a:xfrm>
           <a:prstGeom prst="rect">
             <a:avLst/>
@@ -2590,7 +2374,7 @@
         <p:spPr>
           <a:xfrm>
             <a:off x="4925880" y="3610080"/>
-            <a:ext cx="533520" cy="533520"/>
+            <a:ext cx="532440" cy="532440"/>
           </a:xfrm>
           <a:prstGeom prst="rect">
             <a:avLst/>
@@ -2646,7 +2430,7 @@
         <p:spPr>
           <a:xfrm>
             <a:off x="2045880" y="2707920"/>
-            <a:ext cx="533520" cy="533520"/>
+            <a:ext cx="532440" cy="532440"/>
           </a:xfrm>
           <a:prstGeom prst="rect">
             <a:avLst/>
@@ -2702,7 +2486,7 @@
         <p:spPr>
           <a:xfrm>
             <a:off x="2045880" y="3610080"/>
-            <a:ext cx="533520" cy="533520"/>
+            <a:ext cx="532440" cy="532440"/>
           </a:xfrm>
           <a:prstGeom prst="rect">
             <a:avLst/>
@@ -2760,7 +2544,7 @@
         <p:spPr>
           <a:xfrm>
             <a:off x="9605880" y="2707920"/>
-            <a:ext cx="533520" cy="533520"/>
+            <a:ext cx="532440" cy="532440"/>
           </a:xfrm>
           <a:prstGeom prst="rect">
             <a:avLst/>
@@ -2816,7 +2600,7 @@
         <p:spPr>
           <a:xfrm>
             <a:off x="9605880" y="3610080"/>
-            <a:ext cx="533520" cy="533520"/>
+            <a:ext cx="532440" cy="532440"/>
           </a:xfrm>
           <a:prstGeom prst="rect">
             <a:avLst/>
@@ -2870,13 +2654,13 @@
             <a:spLocks noGrp="1"/>
           </p:cNvSpPr>
           <p:nvPr>
-            <p:ph type="sldNum" idx="3"/>
+            <p:ph type="sldNum" idx="1"/>
           </p:nvPr>
         </p:nvSpPr>
         <p:spPr>
           <a:xfrm>
             <a:off x="8173440" y="6352920"/>
-            <a:ext cx="2736720" cy="358560"/>
+            <a:ext cx="2735640" cy="357480"/>
           </a:xfrm>
           <a:prstGeom prst="rect">
             <a:avLst/>
@@ -2919,7 +2703,7 @@
                 <a:tab algn="l" pos="0"/>
               </a:tabLst>
             </a:pPr>
-            <a:fld id="{4A149E28-9C16-48AD-A51D-21CA45E0CBD4}" type="slidenum">
+            <a:fld id="{A9C3B079-F836-458E-AC33-C92F68CBBFD3}" type="slidenum">
               <a:rPr b="0" lang="pt-BR" sz="1200" strike="noStrike" u="none">
                 <a:solidFill>
                   <a:srgbClr val="808080"/>
@@ -2945,7 +2729,7 @@
   </p:cSld>
   <p:clrMap bg1="lt1" tx1="dk1" bg2="lt2" tx2="dk2" accent1="accent1" accent2="accent2" accent3="accent3" accent4="accent4" accent5="accent5" accent6="accent6" hlink="hlink" folHlink="folHlink"/>
   <p:sldLayoutIdLst>
-    <p:sldLayoutId id="2147483654" r:id="rId4"/>
+    <p:sldLayoutId id="2147483655" r:id="rId4"/>
   </p:sldLayoutIdLst>
 </p:sldMaster>
 </file>
@@ -2976,7 +2760,7 @@
         <p:spPr>
           <a:xfrm>
             <a:off x="1080" y="1080"/>
-            <a:ext cx="12185280" cy="6850080"/>
+            <a:ext cx="12184200" cy="6849000"/>
           </a:xfrm>
           <a:prstGeom prst="rect">
             <a:avLst/>
@@ -3007,7 +2791,7 @@
             <a:noAutofit/>
           </a:bodyPr>
           <a:p>
-            <a:pPr>
+            <a:pPr defTabSz="914400">
               <a:lnSpc>
                 <a:spcPct val="100000"/>
               </a:lnSpc>
@@ -3042,7 +2826,7 @@
         <p:spPr>
           <a:xfrm>
             <a:off x="9852120" y="5367600"/>
-            <a:ext cx="1436760" cy="587160"/>
+            <a:ext cx="1435680" cy="586080"/>
           </a:xfrm>
           <a:prstGeom prst="rect">
             <a:avLst/>
@@ -3062,7 +2846,7 @@
         <p:spPr>
           <a:xfrm>
             <a:off x="6587280" y="2872080"/>
-            <a:ext cx="3776760" cy="974520"/>
+            <a:ext cx="3775680" cy="974520"/>
           </a:xfrm>
           <a:prstGeom prst="rect">
             <a:avLst/>
@@ -3169,7 +2953,7 @@
         <p:spPr>
           <a:xfrm>
             <a:off x="5867280" y="2734200"/>
-            <a:ext cx="3240" cy="1392480"/>
+            <a:ext cx="4320" cy="1393560"/>
           </a:xfrm>
           <a:prstGeom prst="straightConnector1">
             <a:avLst/>
@@ -3183,14 +2967,14 @@
       </p:cxnSp>
       <p:sp>
         <p:nvSpPr>
-          <p:cNvPr id="45" name=""/>
+          <p:cNvPr id="45" name="Retângulo 44"/>
           <p:cNvSpPr/>
           <p:nvPr/>
         </p:nvSpPr>
         <p:spPr>
           <a:xfrm>
             <a:off x="1692000" y="2550600"/>
-            <a:ext cx="3886200" cy="1185840"/>
+            <a:ext cx="3885120" cy="1184760"/>
           </a:xfrm>
           <a:prstGeom prst="rect">
             <a:avLst/>
@@ -3211,7 +2995,7 @@
             <a:noAutofit/>
           </a:bodyPr>
           <a:p>
-            <a:pPr>
+            <a:pPr defTabSz="914400">
               <a:lnSpc>
                 <a:spcPct val="100000"/>
               </a:lnSpc>
@@ -3299,7 +3083,7 @@
         <p:spPr>
           <a:xfrm>
             <a:off x="0" y="0"/>
-            <a:ext cx="12185640" cy="6851520"/>
+            <a:ext cx="12184560" cy="6850440"/>
           </a:xfrm>
           <a:prstGeom prst="rect">
             <a:avLst/>
@@ -3365,7 +3149,7 @@
         <p:spPr>
           <a:xfrm>
             <a:off x="9852120" y="5367600"/>
-            <a:ext cx="1433520" cy="583920"/>
+            <a:ext cx="1432440" cy="582840"/>
           </a:xfrm>
           <a:prstGeom prst="rect">
             <a:avLst/>
@@ -3385,7 +3169,7 @@
         <p:spPr>
           <a:xfrm>
             <a:off x="928440" y="2425680"/>
-            <a:ext cx="6440040" cy="1094040"/>
+            <a:ext cx="6438960" cy="1092960"/>
           </a:xfrm>
           <a:prstGeom prst="rect">
             <a:avLst/>
@@ -3534,7 +3318,7 @@
         <p:spPr>
           <a:xfrm>
             <a:off x="900000" y="4072320"/>
-            <a:ext cx="1470960" cy="353520"/>
+            <a:ext cx="1469880" cy="352440"/>
           </a:xfrm>
           <a:prstGeom prst="roundRect">
             <a:avLst>
@@ -3627,93 +3411,6 @@
           <a:chExt cx="0" cy="0"/>
         </a:xfrm>
       </p:grpSpPr>
-      <p:sp>
-        <p:nvSpPr>
-          <p:cNvPr id="50" name="PlaceHolder 1"/>
-          <p:cNvSpPr>
-            <a:spLocks noGrp="1"/>
-          </p:cNvSpPr>
-          <p:nvPr>
-            <p:ph type="title"/>
-          </p:nvPr>
-        </p:nvSpPr>
-        <p:spPr>
-          <a:xfrm>
-            <a:off x="540000" y="540000"/>
-            <a:ext cx="10740240" cy="473760"/>
-          </a:xfrm>
-          <a:prstGeom prst="rect">
-            <a:avLst/>
-          </a:prstGeom>
-          <a:noFill/>
-          <a:ln w="0">
-            <a:noFill/>
-          </a:ln>
-        </p:spPr>
-        <p:txBody>
-          <a:bodyPr lIns="91440" rIns="91440" tIns="45720" bIns="45720" anchor="ctr">
-            <a:noAutofit/>
-          </a:bodyPr>
-          <a:p>
-            <a:pPr indent="0" algn="ctr">
-              <a:buNone/>
-            </a:pPr>
-            <a:endParaRPr b="0" lang="pt-BR" sz="1800" strike="noStrike" u="none">
-              <a:solidFill>
-                <a:srgbClr val="000000"/>
-              </a:solidFill>
-              <a:effectLst/>
-              <a:uFillTx/>
-              <a:latin typeface="Arial"/>
-            </a:endParaRPr>
-          </a:p>
-        </p:txBody>
-      </p:sp>
-      <p:sp>
-        <p:nvSpPr>
-          <p:cNvPr id="51" name="PlaceHolder 2"/>
-          <p:cNvSpPr>
-            <a:spLocks noGrp="1"/>
-          </p:cNvSpPr>
-          <p:nvPr>
-            <p:ph/>
-          </p:nvPr>
-        </p:nvSpPr>
-        <p:spPr>
-          <a:xfrm>
-            <a:off x="540000" y="1380240"/>
-            <a:ext cx="10740240" cy="2003400"/>
-          </a:xfrm>
-          <a:prstGeom prst="rect">
-            <a:avLst/>
-          </a:prstGeom>
-          <a:noFill/>
-          <a:ln w="0">
-            <a:noFill/>
-          </a:ln>
-        </p:spPr>
-        <p:txBody>
-          <a:bodyPr lIns="91440" rIns="91440" tIns="45720" bIns="45720" anchor="t">
-            <a:noAutofit/>
-          </a:bodyPr>
-          <a:p>
-            <a:pPr indent="0">
-              <a:spcBef>
-                <a:spcPts val="1417"/>
-              </a:spcBef>
-              <a:buNone/>
-            </a:pPr>
-            <a:endParaRPr b="0" lang="pt-BR" sz="1800" strike="noStrike" u="none">
-              <a:solidFill>
-                <a:srgbClr val="000000"/>
-              </a:solidFill>
-              <a:effectLst/>
-              <a:uFillTx/>
-              <a:latin typeface="Arial"/>
-            </a:endParaRPr>
-          </a:p>
-        </p:txBody>
-      </p:sp>
     </p:spTree>
   </p:cSld>
   <mc:AlternateContent>
@@ -3746,14 +3443,14 @@
       </p:grpSpPr>
       <p:sp>
         <p:nvSpPr>
-          <p:cNvPr id="52" name="Retângulo 3"/>
+          <p:cNvPr id="50" name="Retângulo 3"/>
           <p:cNvSpPr/>
           <p:nvPr/>
         </p:nvSpPr>
         <p:spPr>
           <a:xfrm>
             <a:off x="0" y="0"/>
-            <a:ext cx="12185640" cy="6851520"/>
+            <a:ext cx="12184560" cy="6850440"/>
           </a:xfrm>
           <a:prstGeom prst="rect">
             <a:avLst/>
@@ -3802,7 +3499,7 @@
       </p:sp>
       <p:pic>
         <p:nvPicPr>
-          <p:cNvPr id="53" name="Gráfico 4" descr=""/>
+          <p:cNvPr id="51" name="Gráfico 4" descr=""/>
           <p:cNvPicPr/>
           <p:nvPr/>
         </p:nvPicPr>
@@ -3819,7 +3516,7 @@
         <p:spPr>
           <a:xfrm>
             <a:off x="5375880" y="5367600"/>
-            <a:ext cx="1433520" cy="583920"/>
+            <a:ext cx="1432440" cy="582840"/>
           </a:xfrm>
           <a:prstGeom prst="rect">
             <a:avLst/>
@@ -3832,7 +3529,7 @@
       </p:pic>
       <p:sp>
         <p:nvSpPr>
-          <p:cNvPr id="54" name="CaixaDeTexto 6"/>
+          <p:cNvPr id="52" name="CaixaDeTexto 6"/>
           <p:cNvSpPr/>
           <p:nvPr/>
         </p:nvSpPr>
@@ -3892,14 +3589,14 @@
       </p:sp>
       <p:sp>
         <p:nvSpPr>
-          <p:cNvPr id="55" name="Retângulo: Cantos Arredondados 7"/>
+          <p:cNvPr id="53" name="Retângulo: Cantos Arredondados 7"/>
           <p:cNvSpPr/>
           <p:nvPr/>
         </p:nvSpPr>
         <p:spPr>
           <a:xfrm>
             <a:off x="1314360" y="3474360"/>
-            <a:ext cx="9556560" cy="470880"/>
+            <a:ext cx="9555480" cy="469800"/>
           </a:xfrm>
           <a:prstGeom prst="roundRect">
             <a:avLst>
@@ -4498,303 +4195,4 @@
     </a:fmtScheme>
   </a:themeElements>
 </a:theme>
-</file>
-
-<file path=customXml/item1.xml><?xml version="1.0" encoding="utf-8"?>
-<p:properties xmlns:p="http://schemas.microsoft.com/office/2006/metadata/properties" xmlns:xsi="http://www.w3.org/2001/XMLSchema-instance" xmlns:pc="http://schemas.microsoft.com/office/infopath/2007/PartnerControls">
-  <documentManagement>
-    <lcf76f155ced4ddcb4097134ff3c332f xmlns="5e253ad8-99bc-4895-b377-eab5d2679348">
-      <Terms xmlns="http://schemas.microsoft.com/office/infopath/2007/PartnerControls"/>
-    </lcf76f155ced4ddcb4097134ff3c332f>
-    <TaxCatchAll xmlns="45bd9b4a-47bd-4c71-9096-100877aa1038" xsi:nil="true"/>
-  </documentManagement>
-</p:properties>
-</file>
-
-<file path=customXml/item2.xml><?xml version="1.0" encoding="utf-8"?>
-<ct:contentTypeSchema xmlns:ct="http://schemas.microsoft.com/office/2006/metadata/contentType" xmlns:ma="http://schemas.microsoft.com/office/2006/metadata/properties/metaAttributes" ct:_="" ma:_="" ma:contentTypeName="Documento" ma:contentTypeID="0x010100FD511CDFD32BAE4DB6984ACFD1117AAF" ma:contentTypeVersion="16" ma:contentTypeDescription="Crie um novo documento." ma:contentTypeScope="" ma:versionID="e5a9bbd63fbf262578ba03fd80405270">
-  <xsd:schema xmlns:xsd="http://www.w3.org/2001/XMLSchema" xmlns:xs="http://www.w3.org/2001/XMLSchema" xmlns:p="http://schemas.microsoft.com/office/2006/metadata/properties" xmlns:ns2="5e253ad8-99bc-4895-b377-eab5d2679348" xmlns:ns3="45bd9b4a-47bd-4c71-9096-100877aa1038" targetNamespace="http://schemas.microsoft.com/office/2006/metadata/properties" ma:root="true" ma:fieldsID="4b31c348399089d26e9ea4df2e2362e0" ns2:_="" ns3:_="">
-    <xsd:import namespace="5e253ad8-99bc-4895-b377-eab5d2679348"/>
-    <xsd:import namespace="45bd9b4a-47bd-4c71-9096-100877aa1038"/>
-    <xsd:element name="properties">
-      <xsd:complexType>
-        <xsd:sequence>
-          <xsd:element name="documentManagement">
-            <xsd:complexType>
-              <xsd:all>
-                <xsd:element ref="ns2:lcf76f155ced4ddcb4097134ff3c332f" minOccurs="0"/>
-                <xsd:element ref="ns3:TaxCatchAll" minOccurs="0"/>
-                <xsd:element ref="ns2:MediaServiceMetadata" minOccurs="0"/>
-                <xsd:element ref="ns2:MediaServiceFastMetadata" minOccurs="0"/>
-                <xsd:element ref="ns2:MediaServiceObjectDetectorVersions" minOccurs="0"/>
-                <xsd:element ref="ns2:MediaServiceOCR" minOccurs="0"/>
-                <xsd:element ref="ns2:MediaServiceGenerationTime" minOccurs="0"/>
-                <xsd:element ref="ns2:MediaServiceEventHashCode" minOccurs="0"/>
-                <xsd:element ref="ns2:MediaServiceDateTaken" minOccurs="0"/>
-                <xsd:element ref="ns2:MediaServiceLocation" minOccurs="0"/>
-                <xsd:element ref="ns2:MediaLengthInSeconds" minOccurs="0"/>
-                <xsd:element ref="ns3:SharedWithUsers" minOccurs="0"/>
-                <xsd:element ref="ns3:SharedWithDetails" minOccurs="0"/>
-                <xsd:element ref="ns2:MediaServiceSearchProperties" minOccurs="0"/>
-                <xsd:element ref="ns2:MediaServiceBillingMetadata" minOccurs="0"/>
-              </xsd:all>
-            </xsd:complexType>
-          </xsd:element>
-        </xsd:sequence>
-      </xsd:complexType>
-    </xsd:element>
-  </xsd:schema>
-  <xsd:schema xmlns:xsd="http://www.w3.org/2001/XMLSchema" xmlns:xs="http://www.w3.org/2001/XMLSchema" xmlns:dms="http://schemas.microsoft.com/office/2006/documentManagement/types" xmlns:pc="http://schemas.microsoft.com/office/infopath/2007/PartnerControls" targetNamespace="5e253ad8-99bc-4895-b377-eab5d2679348" elementFormDefault="qualified">
-    <xsd:import namespace="http://schemas.microsoft.com/office/2006/documentManagement/types"/>
-    <xsd:import namespace="http://schemas.microsoft.com/office/infopath/2007/PartnerControls"/>
-    <xsd:element name="lcf76f155ced4ddcb4097134ff3c332f" ma:index="9" nillable="true" ma:taxonomy="true" ma:internalName="lcf76f155ced4ddcb4097134ff3c332f" ma:taxonomyFieldName="MediaServiceImageTags" ma:displayName="Marcações de imagem" ma:readOnly="false" ma:fieldId="{5cf76f15-5ced-4ddc-b409-7134ff3c332f}" ma:taxonomyMulti="true" ma:sspId="cf329bc3-ce7e-4e75-9c56-962f8f350e4e" ma:termSetId="09814cd3-568e-fe90-9814-8d621ff8fb84" ma:anchorId="fba54fb3-c3e1-fe81-a776-ca4b69148c4d" ma:open="true" ma:isKeyword="false">
-      <xsd:complexType>
-        <xsd:sequence>
-          <xsd:element ref="pc:Terms" minOccurs="0" maxOccurs="1"/>
-        </xsd:sequence>
-      </xsd:complexType>
-    </xsd:element>
-    <xsd:element name="MediaServiceMetadata" ma:index="11" nillable="true" ma:displayName="MediaServiceMetadata" ma:hidden="true" ma:internalName="MediaServiceMetadata" ma:readOnly="true">
-      <xsd:simpleType>
-        <xsd:restriction base="dms:Note"/>
-      </xsd:simpleType>
-    </xsd:element>
-    <xsd:element name="MediaServiceFastMetadata" ma:index="12" nillable="true" ma:displayName="MediaServiceFastMetadata" ma:hidden="true" ma:internalName="MediaServiceFastMetadata" ma:readOnly="true">
-      <xsd:simpleType>
-        <xsd:restriction base="dms:Note"/>
-      </xsd:simpleType>
-    </xsd:element>
-    <xsd:element name="MediaServiceObjectDetectorVersions" ma:index="13" nillable="true" ma:displayName="MediaServiceObjectDetectorVersions" ma:hidden="true" ma:indexed="true" ma:internalName="MediaServiceObjectDetectorVersions" ma:readOnly="true">
-      <xsd:simpleType>
-        <xsd:restriction base="dms:Text"/>
-      </xsd:simpleType>
-    </xsd:element>
-    <xsd:element name="MediaServiceOCR" ma:index="14" nillable="true" ma:displayName="Extracted Text" ma:internalName="MediaServiceOCR" ma:readOnly="true">
-      <xsd:simpleType>
-        <xsd:restriction base="dms:Note">
-          <xsd:maxLength value="255"/>
-        </xsd:restriction>
-      </xsd:simpleType>
-    </xsd:element>
-    <xsd:element name="MediaServiceGenerationTime" ma:index="15" nillable="true" ma:displayName="MediaServiceGenerationTime" ma:hidden="true" ma:internalName="MediaServiceGenerationTime" ma:readOnly="true">
-      <xsd:simpleType>
-        <xsd:restriction base="dms:Text"/>
-      </xsd:simpleType>
-    </xsd:element>
-    <xsd:element name="MediaServiceEventHashCode" ma:index="16" nillable="true" ma:displayName="MediaServiceEventHashCode" ma:hidden="true" ma:internalName="MediaServiceEventHashCode" ma:readOnly="true">
-      <xsd:simpleType>
-        <xsd:restriction base="dms:Text"/>
-      </xsd:simpleType>
-    </xsd:element>
-    <xsd:element name="MediaServiceDateTaken" ma:index="17" nillable="true" ma:displayName="MediaServiceDateTaken" ma:hidden="true" ma:indexed="true" ma:internalName="MediaServiceDateTaken" ma:readOnly="true">
-      <xsd:simpleType>
-        <xsd:restriction base="dms:Text"/>
-      </xsd:simpleType>
-    </xsd:element>
-    <xsd:element name="MediaServiceLocation" ma:index="18" nillable="true" ma:displayName="Location" ma:indexed="true" ma:internalName="MediaServiceLocation" ma:readOnly="true">
-      <xsd:simpleType>
-        <xsd:restriction base="dms:Text"/>
-      </xsd:simpleType>
-    </xsd:element>
-    <xsd:element name="MediaLengthInSeconds" ma:index="19" nillable="true" ma:displayName="MediaLengthInSeconds" ma:hidden="true" ma:internalName="MediaLengthInSeconds" ma:readOnly="true">
-      <xsd:simpleType>
-        <xsd:restriction base="dms:Unknown"/>
-      </xsd:simpleType>
-    </xsd:element>
-    <xsd:element name="MediaServiceSearchProperties" ma:index="22" nillable="true" ma:displayName="MediaServiceSearchProperties" ma:hidden="true" ma:internalName="MediaServiceSearchProperties" ma:readOnly="true">
-      <xsd:simpleType>
-        <xsd:restriction base="dms:Note"/>
-      </xsd:simpleType>
-    </xsd:element>
-    <xsd:element name="MediaServiceBillingMetadata" ma:index="23" nillable="true" ma:displayName="MediaServiceBillingMetadata" ma:hidden="true" ma:internalName="MediaServiceBillingMetadata" ma:readOnly="true">
-      <xsd:simpleType>
-        <xsd:restriction base="dms:Note"/>
-      </xsd:simpleType>
-    </xsd:element>
-  </xsd:schema>
-  <xsd:schema xmlns:xsd="http://www.w3.org/2001/XMLSchema" xmlns:xs="http://www.w3.org/2001/XMLSchema" xmlns:dms="http://schemas.microsoft.com/office/2006/documentManagement/types" xmlns:pc="http://schemas.microsoft.com/office/infopath/2007/PartnerControls" targetNamespace="45bd9b4a-47bd-4c71-9096-100877aa1038" elementFormDefault="qualified">
-    <xsd:import namespace="http://schemas.microsoft.com/office/2006/documentManagement/types"/>
-    <xsd:import namespace="http://schemas.microsoft.com/office/infopath/2007/PartnerControls"/>
-    <xsd:element name="TaxCatchAll" ma:index="10" nillable="true" ma:displayName="Taxonomy Catch All Column" ma:hidden="true" ma:list="{d1c5c36c-1c45-4119-aa3b-41677bff21c6}" ma:internalName="TaxCatchAll" ma:showField="CatchAllData" ma:web="45bd9b4a-47bd-4c71-9096-100877aa1038">
-      <xsd:complexType>
-        <xsd:complexContent>
-          <xsd:extension base="dms:MultiChoiceLookup">
-            <xsd:sequence>
-              <xsd:element name="Value" type="dms:Lookup" maxOccurs="unbounded" minOccurs="0" nillable="true"/>
-            </xsd:sequence>
-          </xsd:extension>
-        </xsd:complexContent>
-      </xsd:complexType>
-    </xsd:element>
-    <xsd:element name="SharedWithUsers" ma:index="20" nillable="true" ma:displayName="Compartilhado com" ma:internalName="SharedWithUsers" ma:readOnly="true">
-      <xsd:complexType>
-        <xsd:complexContent>
-          <xsd:extension base="dms:UserMulti">
-            <xsd:sequence>
-              <xsd:element name="UserInfo" minOccurs="0" maxOccurs="unbounded">
-                <xsd:complexType>
-                  <xsd:sequence>
-                    <xsd:element name="DisplayName" type="xsd:string" minOccurs="0"/>
-                    <xsd:element name="AccountId" type="dms:UserId" minOccurs="0" nillable="true"/>
-                    <xsd:element name="AccountType" type="xsd:string" minOccurs="0"/>
-                  </xsd:sequence>
-                </xsd:complexType>
-              </xsd:element>
-            </xsd:sequence>
-          </xsd:extension>
-        </xsd:complexContent>
-      </xsd:complexType>
-    </xsd:element>
-    <xsd:element name="SharedWithDetails" ma:index="21" nillable="true" ma:displayName="Detalhes de Compartilhado Com" ma:internalName="SharedWithDetails" ma:readOnly="true">
-      <xsd:simpleType>
-        <xsd:restriction base="dms:Note">
-          <xsd:maxLength value="255"/>
-        </xsd:restriction>
-      </xsd:simpleType>
-    </xsd:element>
-  </xsd:schema>
-  <xsd:schema xmlns="http://schemas.openxmlformats.org/package/2006/metadata/core-properties" xmlns:xsd="http://www.w3.org/2001/XMLSchema" xmlns:xsi="http://www.w3.org/2001/XMLSchema-instance" xmlns:dc="http://purl.org/dc/elements/1.1/" xmlns:dcterms="http://purl.org/dc/terms/" xmlns:odoc="http://schemas.microsoft.com/internal/obd" targetNamespace="http://schemas.openxmlformats.org/package/2006/metadata/core-properties" elementFormDefault="qualified" attributeFormDefault="unqualified" blockDefault="#all">
-    <xsd:import namespace="http://purl.org/dc/elements/1.1/" schemaLocation="http://dublincore.org/schemas/xmls/qdc/2003/04/02/dc.xsd"/>
-    <xsd:import namespace="http://purl.org/dc/terms/" schemaLocation="http://dublincore.org/schemas/xmls/qdc/2003/04/02/dcterms.xsd"/>
-    <xsd:element name="coreProperties" type="CT_coreProperties"/>
-    <xsd:complexType name="CT_coreProperties">
-      <xsd:all>
-        <xsd:element ref="dc:creator" minOccurs="0" maxOccurs="1"/>
-        <xsd:element ref="dcterms:created" minOccurs="0" maxOccurs="1"/>
-        <xsd:element ref="dc:identifier" minOccurs="0" maxOccurs="1"/>
-        <xsd:element name="contentType" minOccurs="0" maxOccurs="1" type="xsd:string" ma:index="0" ma:displayName="Tipo de Conteúdo"/>
-        <xsd:element ref="dc:title" minOccurs="0" maxOccurs="1" ma:index="4" ma:displayName="Título"/>
-        <xsd:element ref="dc:subject" minOccurs="0" maxOccurs="1"/>
-        <xsd:element ref="dc:description" minOccurs="0" maxOccurs="1"/>
-        <xsd:element name="keywords" minOccurs="0" maxOccurs="1" type="xsd:string"/>
-        <xsd:element ref="dc:language" minOccurs="0" maxOccurs="1"/>
-        <xsd:element name="category" minOccurs="0" maxOccurs="1" type="xsd:string"/>
-        <xsd:element name="version" minOccurs="0" maxOccurs="1" type="xsd:string"/>
-        <xsd:element name="revision" minOccurs="0" maxOccurs="1" type="xsd:string">
-          <xsd:annotation>
-            <xsd:documentation>
-                        This value indicates the number of saves or revisions. The application is responsible for updating this value after each revision.
-                    </xsd:documentation>
-          </xsd:annotation>
-        </xsd:element>
-        <xsd:element name="lastModifiedBy" minOccurs="0" maxOccurs="1" type="xsd:string"/>
-        <xsd:element ref="dcterms:modified" minOccurs="0" maxOccurs="1"/>
-        <xsd:element name="contentStatus" minOccurs="0" maxOccurs="1" type="xsd:string"/>
-      </xsd:all>
-    </xsd:complexType>
-  </xsd:schema>
-  <xs:schema xmlns:pc="http://schemas.microsoft.com/office/infopath/2007/PartnerControls" xmlns:xs="http://www.w3.org/2001/XMLSchema" targetNamespace="http://schemas.microsoft.com/office/infopath/2007/PartnerControls" elementFormDefault="qualified" attributeFormDefault="unqualified">
-    <xs:element name="Person">
-      <xs:complexType>
-        <xs:sequence>
-          <xs:element ref="pc:DisplayName" minOccurs="0"/>
-          <xs:element ref="pc:AccountId" minOccurs="0"/>
-          <xs:element ref="pc:AccountType" minOccurs="0"/>
-        </xs:sequence>
-      </xs:complexType>
-    </xs:element>
-    <xs:element name="DisplayName" type="xs:string"/>
-    <xs:element name="AccountId" type="xs:string"/>
-    <xs:element name="AccountType" type="xs:string"/>
-    <xs:element name="BDCAssociatedEntity">
-      <xs:complexType>
-        <xs:sequence>
-          <xs:element ref="pc:BDCEntity" minOccurs="0" maxOccurs="unbounded"/>
-        </xs:sequence>
-        <xs:attribute ref="pc:EntityNamespace"/>
-        <xs:attribute ref="pc:EntityName"/>
-        <xs:attribute ref="pc:SystemInstanceName"/>
-        <xs:attribute ref="pc:AssociationName"/>
-      </xs:complexType>
-    </xs:element>
-    <xs:attribute name="EntityNamespace" type="xs:string"/>
-    <xs:attribute name="EntityName" type="xs:string"/>
-    <xs:attribute name="SystemInstanceName" type="xs:string"/>
-    <xs:attribute name="AssociationName" type="xs:string"/>
-    <xs:element name="BDCEntity">
-      <xs:complexType>
-        <xs:sequence>
-          <xs:element ref="pc:EntityDisplayName" minOccurs="0"/>
-          <xs:element ref="pc:EntityInstanceReference" minOccurs="0"/>
-          <xs:element ref="pc:EntityId1" minOccurs="0"/>
-          <xs:element ref="pc:EntityId2" minOccurs="0"/>
-          <xs:element ref="pc:EntityId3" minOccurs="0"/>
-          <xs:element ref="pc:EntityId4" minOccurs="0"/>
-          <xs:element ref="pc:EntityId5" minOccurs="0"/>
-        </xs:sequence>
-      </xs:complexType>
-    </xs:element>
-    <xs:element name="EntityDisplayName" type="xs:string"/>
-    <xs:element name="EntityInstanceReference" type="xs:string"/>
-    <xs:element name="EntityId1" type="xs:string"/>
-    <xs:element name="EntityId2" type="xs:string"/>
-    <xs:element name="EntityId3" type="xs:string"/>
-    <xs:element name="EntityId4" type="xs:string"/>
-    <xs:element name="EntityId5" type="xs:string"/>
-    <xs:element name="Terms">
-      <xs:complexType>
-        <xs:sequence>
-          <xs:element ref="pc:TermInfo" minOccurs="0" maxOccurs="unbounded"/>
-        </xs:sequence>
-      </xs:complexType>
-    </xs:element>
-    <xs:element name="TermInfo">
-      <xs:complexType>
-        <xs:sequence>
-          <xs:element ref="pc:TermName" minOccurs="0"/>
-          <xs:element ref="pc:TermId" minOccurs="0"/>
-        </xs:sequence>
-      </xs:complexType>
-    </xs:element>
-    <xs:element name="TermName" type="xs:string"/>
-    <xs:element name="TermId" type="xs:string"/>
-  </xs:schema>
-</ct:contentTypeSchema>
-</file>
-
-<file path=customXml/item3.xml><?xml version="1.0" encoding="utf-8"?>
-<?mso-contentType ?>
-<FormTemplates xmlns="http://schemas.microsoft.com/sharepoint/v3/contenttype/forms">
-  <Display>DocumentLibraryForm</Display>
-  <Edit>DocumentLibraryForm</Edit>
-  <New>DocumentLibraryForm</New>
-</FormTemplates>
-</file>
-
-<file path=customXml/itemProps1.xml><?xml version="1.0" encoding="utf-8"?>
-<ds:datastoreItem xmlns:ds="http://schemas.openxmlformats.org/officeDocument/2006/customXml" ds:itemID="{623143E8-4228-45BD-9E20-AF6C7187A19E}">
-  <ds:schemaRefs>
-    <ds:schemaRef ds:uri="http://schemas.microsoft.com/office/2006/metadata/properties"/>
-    <ds:schemaRef ds:uri="http://schemas.microsoft.com/office/infopath/2007/PartnerControls"/>
-    <ds:schemaRef ds:uri="5e253ad8-99bc-4895-b377-eab5d2679348"/>
-    <ds:schemaRef ds:uri="45bd9b4a-47bd-4c71-9096-100877aa1038"/>
-  </ds:schemaRefs>
-</ds:datastoreItem>
-</file>
-
-<file path=customXml/itemProps2.xml><?xml version="1.0" encoding="utf-8"?>
-<ds:datastoreItem xmlns:ds="http://schemas.openxmlformats.org/officeDocument/2006/customXml" ds:itemID="{7ADE90E7-C49A-4676-9202-D118151DD81F}">
-  <ds:schemaRefs>
-    <ds:schemaRef ds:uri="http://schemas.microsoft.com/office/2006/metadata/contentType"/>
-    <ds:schemaRef ds:uri="http://schemas.microsoft.com/office/2006/metadata/properties/metaAttributes"/>
-    <ds:schemaRef ds:uri="http://www.w3.org/2001/XMLSchema"/>
-    <ds:schemaRef ds:uri="http://schemas.microsoft.com/office/2006/metadata/properties"/>
-    <ds:schemaRef ds:uri="5e253ad8-99bc-4895-b377-eab5d2679348"/>
-    <ds:schemaRef ds:uri="45bd9b4a-47bd-4c71-9096-100877aa1038"/>
-    <ds:schemaRef ds:uri="http://schemas.microsoft.com/office/2006/documentManagement/types"/>
-    <ds:schemaRef ds:uri="http://schemas.microsoft.com/office/infopath/2007/PartnerControls"/>
-    <ds:schemaRef ds:uri="http://schemas.openxmlformats.org/package/2006/metadata/core-properties"/>
-    <ds:schemaRef ds:uri="http://purl.org/dc/elements/1.1/"/>
-    <ds:schemaRef ds:uri="http://purl.org/dc/terms/"/>
-    <ds:schemaRef ds:uri="http://schemas.microsoft.com/internal/obd"/>
-  </ds:schemaRefs>
-</ds:datastoreItem>
-</file>
-
-<file path=customXml/itemProps3.xml><?xml version="1.0" encoding="utf-8"?>
-<ds:datastoreItem xmlns:ds="http://schemas.openxmlformats.org/officeDocument/2006/customXml" ds:itemID="{14225917-8034-4096-A1CA-A8061DC9092D}">
-  <ds:schemaRefs>
-    <ds:schemaRef ds:uri="http://schemas.microsoft.com/sharepoint/v3/contenttype/forms"/>
-  </ds:schemaRefs>
-</ds:datastoreItem>
 </file>
</xml_diff>

<commit_message>
Trocando Pagina Inicial, Lei e Agradecimento pelo novo Formato
</commit_message>
<xml_diff>
--- a/backend/Templates/Template.pptx
+++ b/backend/Templates/Template.pptx
@@ -51,7 +51,7 @@
         <p:spPr>
           <a:xfrm>
             <a:off x="0" y="6213240"/>
-            <a:ext cx="12183840" cy="636480"/>
+            <a:ext cx="12183480" cy="636120"/>
           </a:xfrm>
           <a:prstGeom prst="rect">
             <a:avLst/>
@@ -213,7 +213,7 @@
         <p:spPr>
           <a:xfrm>
             <a:off x="11101680" y="6390000"/>
-            <a:ext cx="8280" cy="299160"/>
+            <a:ext cx="8640" cy="299520"/>
           </a:xfrm>
           <a:prstGeom prst="straightConnector1">
             <a:avLst/>
@@ -245,7 +245,7 @@
         <p:spPr>
           <a:xfrm>
             <a:off x="11286720" y="6387840"/>
-            <a:ext cx="711720" cy="286920"/>
+            <a:ext cx="711360" cy="286560"/>
           </a:xfrm>
           <a:prstGeom prst="rect">
             <a:avLst/>
@@ -294,7 +294,7 @@
         <p:spPr>
           <a:xfrm>
             <a:off x="0" y="6213240"/>
-            <a:ext cx="12183840" cy="636480"/>
+            <a:ext cx="12183480" cy="636120"/>
           </a:xfrm>
           <a:prstGeom prst="rect">
             <a:avLst/>
@@ -456,7 +456,7 @@
         <p:spPr>
           <a:xfrm>
             <a:off x="11101680" y="6390000"/>
-            <a:ext cx="8280" cy="299160"/>
+            <a:ext cx="8640" cy="299520"/>
           </a:xfrm>
           <a:prstGeom prst="straightConnector1">
             <a:avLst/>
@@ -488,7 +488,7 @@
         <p:spPr>
           <a:xfrm>
             <a:off x="11286720" y="6387840"/>
-            <a:ext cx="711720" cy="286920"/>
+            <a:ext cx="711360" cy="286560"/>
           </a:xfrm>
           <a:prstGeom prst="rect">
             <a:avLst/>
@@ -512,7 +512,7 @@
         <p:spPr>
           <a:xfrm>
             <a:off x="609480" y="708120"/>
-            <a:ext cx="10971720" cy="274680"/>
+            <a:ext cx="10971360" cy="274680"/>
           </a:xfrm>
           <a:prstGeom prst="rect">
             <a:avLst/>
@@ -528,7 +528,13 @@
           </a:bodyPr>
           <a:p>
             <a:pPr indent="0">
+              <a:lnSpc>
+                <a:spcPct val="100000"/>
+              </a:lnSpc>
               <a:buNone/>
+              <a:tabLst>
+                <a:tab algn="l" pos="0"/>
+              </a:tabLst>
             </a:pPr>
             <a:r>
               <a:rPr b="0" lang="pt-BR" sz="1800" strike="noStrike" u="none">
@@ -565,7 +571,7 @@
         <p:spPr>
           <a:xfrm>
             <a:off x="609480" y="1604520"/>
-            <a:ext cx="10972080" cy="3976920"/>
+            <a:ext cx="10971720" cy="3976560"/>
           </a:xfrm>
           <a:prstGeom prst="rect">
             <a:avLst/>
@@ -581,6 +587,9 @@
           </a:bodyPr>
           <a:p>
             <a:pPr marL="432000" indent="-324000">
+              <a:lnSpc>
+                <a:spcPct val="100000"/>
+              </a:lnSpc>
               <a:spcBef>
                 <a:spcPts val="1417"/>
               </a:spcBef>
@@ -613,6 +622,9 @@
           </a:p>
           <a:p>
             <a:pPr lvl="1" marL="864000" indent="-324000">
+              <a:lnSpc>
+                <a:spcPct val="100000"/>
+              </a:lnSpc>
               <a:spcBef>
                 <a:spcPts val="1134"/>
               </a:spcBef>
@@ -645,6 +657,9 @@
           </a:p>
           <a:p>
             <a:pPr lvl="2" marL="1296000" indent="-288000">
+              <a:lnSpc>
+                <a:spcPct val="100000"/>
+              </a:lnSpc>
               <a:spcBef>
                 <a:spcPts val="850"/>
               </a:spcBef>
@@ -677,6 +692,9 @@
           </a:p>
           <a:p>
             <a:pPr lvl="3" marL="1728000" indent="-216000">
+              <a:lnSpc>
+                <a:spcPct val="100000"/>
+              </a:lnSpc>
               <a:spcBef>
                 <a:spcPts val="567"/>
               </a:spcBef>
@@ -709,6 +727,9 @@
           </a:p>
           <a:p>
             <a:pPr lvl="4" marL="2160000" indent="-216000">
+              <a:lnSpc>
+                <a:spcPct val="100000"/>
+              </a:lnSpc>
               <a:spcBef>
                 <a:spcPts val="283"/>
               </a:spcBef>
@@ -741,6 +762,9 @@
           </a:p>
           <a:p>
             <a:pPr lvl="5" marL="2592000" indent="-216000">
+              <a:lnSpc>
+                <a:spcPct val="100000"/>
+              </a:lnSpc>
               <a:spcBef>
                 <a:spcPts val="283"/>
               </a:spcBef>
@@ -773,6 +797,9 @@
           </a:p>
           <a:p>
             <a:pPr lvl="6" marL="3024000" indent="-216000">
+              <a:lnSpc>
+                <a:spcPct val="100000"/>
+              </a:lnSpc>
               <a:spcBef>
                 <a:spcPts val="283"/>
               </a:spcBef>
@@ -834,68 +861,135 @@
           <a:chExt cx="0" cy="0"/>
         </a:xfrm>
       </p:grpSpPr>
+      <p:grpSp>
+        <p:nvGrpSpPr>
+          <p:cNvPr id="10" name=""/>
+          <p:cNvGrpSpPr/>
+          <p:nvPr/>
+        </p:nvGrpSpPr>
+        <p:grpSpPr>
+          <a:xfrm>
+            <a:off x="0" y="6213240"/>
+            <a:ext cx="12183480" cy="636120"/>
+            <a:chOff x="0" y="6213240"/>
+            <a:chExt cx="12183480" cy="636120"/>
+          </a:xfrm>
+        </p:grpSpPr>
+        <p:sp>
+          <p:nvSpPr>
+            <p:cNvPr id="11" name="Retângulo 11"/>
+            <p:cNvSpPr/>
+            <p:nvPr/>
+          </p:nvSpPr>
+          <p:spPr>
+            <a:xfrm>
+              <a:off x="0" y="6213240"/>
+              <a:ext cx="12183480" cy="636120"/>
+            </a:xfrm>
+            <a:prstGeom prst="rect">
+              <a:avLst/>
+            </a:prstGeom>
+            <a:solidFill>
+              <a:srgbClr val="f8f7f6"/>
+            </a:solidFill>
+            <a:ln>
+              <a:noFill/>
+            </a:ln>
+          </p:spPr>
+          <p:style>
+            <a:lnRef idx="2">
+              <a:schemeClr val="accent1">
+                <a:shade val="15000"/>
+              </a:schemeClr>
+            </a:lnRef>
+            <a:fillRef idx="1">
+              <a:schemeClr val="accent1"/>
+            </a:fillRef>
+            <a:effectRef idx="0">
+              <a:schemeClr val="accent1"/>
+            </a:effectRef>
+            <a:fontRef idx="minor"/>
+          </p:style>
+          <p:txBody>
+            <a:bodyPr lIns="90000" rIns="90000" tIns="45000" bIns="45000" anchor="ctr">
+              <a:noAutofit/>
+            </a:bodyPr>
+            <a:p>
+              <a:pPr algn="ctr" defTabSz="914400">
+                <a:lnSpc>
+                  <a:spcPct val="100000"/>
+                </a:lnSpc>
+                <a:tabLst>
+                  <a:tab algn="l" pos="0"/>
+                </a:tabLst>
+              </a:pPr>
+              <a:endParaRPr b="0" lang="pt-BR" sz="1600" strike="noStrike" u="none">
+                <a:solidFill>
+                  <a:srgbClr val="ffffff"/>
+                </a:solidFill>
+                <a:effectLst/>
+                <a:uFillTx/>
+                <a:latin typeface="Aptos"/>
+              </a:endParaRPr>
+            </a:p>
+          </p:txBody>
+        </p:sp>
+        <p:cxnSp>
+          <p:nvCxnSpPr>
+            <p:cNvPr id="12" name="Conector reto 14"/>
+            <p:cNvCxnSpPr/>
+            <p:nvPr/>
+          </p:nvCxnSpPr>
+          <p:spPr>
+            <a:xfrm>
+              <a:off x="11101680" y="6390000"/>
+              <a:ext cx="8640" cy="299520"/>
+            </a:xfrm>
+            <a:prstGeom prst="straightConnector1">
+              <a:avLst/>
+            </a:prstGeom>
+            <a:ln w="12700">
+              <a:solidFill>
+                <a:srgbClr val="808080"/>
+              </a:solidFill>
+              <a:round/>
+            </a:ln>
+          </p:spPr>
+        </p:cxnSp>
+        <p:pic>
+          <p:nvPicPr>
+            <p:cNvPr id="13" name="Gráfico 15" descr=""/>
+            <p:cNvPicPr/>
+            <p:nvPr/>
+          </p:nvPicPr>
+          <p:blipFill>
+            <a:blip r:embed="rId2">
+              <a:extLst>
+                <a:ext uri="{96DAC541-7B7A-43D3-8B79-37D633B846F1}">
+                  <asvg:svgBlip xmlns:asvg="http://schemas.microsoft.com/office/drawing/2016/SVG/main" r:embed="rId3"/>
+                </a:ext>
+              </a:extLst>
+            </a:blip>
+            <a:stretch/>
+          </p:blipFill>
+          <p:spPr>
+            <a:xfrm>
+              <a:off x="11286720" y="6387840"/>
+              <a:ext cx="711360" cy="286560"/>
+            </a:xfrm>
+            <a:prstGeom prst="rect">
+              <a:avLst/>
+            </a:prstGeom>
+            <a:noFill/>
+            <a:ln w="0">
+              <a:noFill/>
+            </a:ln>
+          </p:spPr>
+        </p:pic>
+      </p:grpSp>
       <p:sp>
         <p:nvSpPr>
-          <p:cNvPr id="10" name="Retângulo 11"/>
-          <p:cNvSpPr/>
-          <p:nvPr/>
-        </p:nvSpPr>
-        <p:spPr>
-          <a:xfrm>
-            <a:off x="0" y="6213240"/>
-            <a:ext cx="12183840" cy="636480"/>
-          </a:xfrm>
-          <a:prstGeom prst="rect">
-            <a:avLst/>
-          </a:prstGeom>
-          <a:solidFill>
-            <a:srgbClr val="f8f7f6"/>
-          </a:solidFill>
-          <a:ln>
-            <a:noFill/>
-          </a:ln>
-        </p:spPr>
-        <p:style>
-          <a:lnRef idx="2">
-            <a:schemeClr val="accent1">
-              <a:shade val="15000"/>
-            </a:schemeClr>
-          </a:lnRef>
-          <a:fillRef idx="1">
-            <a:schemeClr val="accent1"/>
-          </a:fillRef>
-          <a:effectRef idx="0">
-            <a:schemeClr val="accent1"/>
-          </a:effectRef>
-          <a:fontRef idx="minor"/>
-        </p:style>
-        <p:txBody>
-          <a:bodyPr lIns="90000" rIns="90000" tIns="45000" bIns="45000" anchor="ctr">
-            <a:noAutofit/>
-          </a:bodyPr>
-          <a:p>
-            <a:pPr algn="ctr" defTabSz="914400">
-              <a:lnSpc>
-                <a:spcPct val="100000"/>
-              </a:lnSpc>
-              <a:tabLst>
-                <a:tab algn="l" pos="0"/>
-              </a:tabLst>
-            </a:pPr>
-            <a:endParaRPr b="0" lang="pt-BR" sz="1600" strike="noStrike" u="none">
-              <a:solidFill>
-                <a:srgbClr val="ffffff"/>
-              </a:solidFill>
-              <a:effectLst/>
-              <a:uFillTx/>
-              <a:latin typeface="Aptos"/>
-            </a:endParaRPr>
-          </a:p>
-        </p:txBody>
-      </p:sp>
-      <p:sp>
-        <p:nvSpPr>
-          <p:cNvPr id="11" name="CaixaDeTexto 13"/>
+          <p:cNvPr id="14" name="CaixaDeTexto 13"/>
           <p:cNvSpPr/>
           <p:nvPr/>
         </p:nvSpPr>
@@ -996,61 +1090,9 @@
           </a:p>
         </p:txBody>
       </p:sp>
-      <p:cxnSp>
-        <p:nvCxnSpPr>
-          <p:cNvPr id="12" name="Conector reto 14"/>
-          <p:cNvCxnSpPr/>
-          <p:nvPr/>
-        </p:nvCxnSpPr>
-        <p:spPr>
-          <a:xfrm>
-            <a:off x="11101680" y="6390000"/>
-            <a:ext cx="8280" cy="299160"/>
-          </a:xfrm>
-          <a:prstGeom prst="straightConnector1">
-            <a:avLst/>
-          </a:prstGeom>
-          <a:ln w="12700">
-            <a:solidFill>
-              <a:srgbClr val="808080"/>
-            </a:solidFill>
-            <a:round/>
-          </a:ln>
-        </p:spPr>
-      </p:cxnSp>
-      <p:pic>
-        <p:nvPicPr>
-          <p:cNvPr id="13" name="Gráfico 15" descr=""/>
-          <p:cNvPicPr/>
-          <p:nvPr/>
-        </p:nvPicPr>
-        <p:blipFill>
-          <a:blip r:embed="rId2">
-            <a:extLst>
-              <a:ext uri="{96DAC541-7B7A-43D3-8B79-37D633B846F1}">
-                <asvg:svgBlip xmlns:asvg="http://schemas.microsoft.com/office/drawing/2016/SVG/main" r:embed="rId3"/>
-              </a:ext>
-            </a:extLst>
-          </a:blip>
-          <a:stretch/>
-        </p:blipFill>
-        <p:spPr>
-          <a:xfrm>
-            <a:off x="11286720" y="6387840"/>
-            <a:ext cx="711720" cy="286920"/>
-          </a:xfrm>
-          <a:prstGeom prst="rect">
-            <a:avLst/>
-          </a:prstGeom>
-          <a:noFill/>
-          <a:ln w="0">
-            <a:noFill/>
-          </a:ln>
-        </p:spPr>
-      </p:pic>
       <p:sp>
         <p:nvSpPr>
-          <p:cNvPr id="14" name="PlaceHolder 1"/>
+          <p:cNvPr id="15" name="PlaceHolder 1"/>
           <p:cNvSpPr>
             <a:spLocks noGrp="1"/>
           </p:cNvSpPr>
@@ -1061,7 +1103,7 @@
         <p:spPr>
           <a:xfrm>
             <a:off x="609480" y="708120"/>
-            <a:ext cx="10971720" cy="274680"/>
+            <a:ext cx="10971360" cy="274680"/>
           </a:xfrm>
           <a:prstGeom prst="rect">
             <a:avLst/>
@@ -1077,7 +1119,13 @@
           </a:bodyPr>
           <a:p>
             <a:pPr indent="0">
+              <a:lnSpc>
+                <a:spcPct val="100000"/>
+              </a:lnSpc>
               <a:buNone/>
+              <a:tabLst>
+                <a:tab algn="l" pos="0"/>
+              </a:tabLst>
             </a:pPr>
             <a:r>
               <a:rPr b="0" lang="pt-BR" sz="1800" strike="noStrike" u="none">
@@ -1103,7 +1151,7 @@
       </p:sp>
       <p:sp>
         <p:nvSpPr>
-          <p:cNvPr id="15" name="PlaceHolder 2"/>
+          <p:cNvPr id="16" name="PlaceHolder 2"/>
           <p:cNvSpPr>
             <a:spLocks noGrp="1"/>
           </p:cNvSpPr>
@@ -1114,7 +1162,7 @@
         <p:spPr>
           <a:xfrm>
             <a:off x="609480" y="1604520"/>
-            <a:ext cx="10972440" cy="3977280"/>
+            <a:ext cx="10972080" cy="3976920"/>
           </a:xfrm>
           <a:prstGeom prst="rect">
             <a:avLst/>
@@ -1130,6 +1178,9 @@
           </a:bodyPr>
           <a:p>
             <a:pPr marL="432000" indent="-324000">
+              <a:lnSpc>
+                <a:spcPct val="100000"/>
+              </a:lnSpc>
               <a:spcBef>
                 <a:spcPts val="1417"/>
               </a:spcBef>
@@ -1162,6 +1213,9 @@
           </a:p>
           <a:p>
             <a:pPr lvl="1" marL="864000" indent="-324000">
+              <a:lnSpc>
+                <a:spcPct val="100000"/>
+              </a:lnSpc>
               <a:spcBef>
                 <a:spcPts val="1134"/>
               </a:spcBef>
@@ -1194,6 +1248,9 @@
           </a:p>
           <a:p>
             <a:pPr lvl="2" marL="1296000" indent="-288000">
+              <a:lnSpc>
+                <a:spcPct val="100000"/>
+              </a:lnSpc>
               <a:spcBef>
                 <a:spcPts val="850"/>
               </a:spcBef>
@@ -1226,6 +1283,9 @@
           </a:p>
           <a:p>
             <a:pPr lvl="3" marL="1728000" indent="-216000">
+              <a:lnSpc>
+                <a:spcPct val="100000"/>
+              </a:lnSpc>
               <a:spcBef>
                 <a:spcPts val="567"/>
               </a:spcBef>
@@ -1258,6 +1318,9 @@
           </a:p>
           <a:p>
             <a:pPr lvl="4" marL="2160000" indent="-216000">
+              <a:lnSpc>
+                <a:spcPct val="100000"/>
+              </a:lnSpc>
               <a:spcBef>
                 <a:spcPts val="283"/>
               </a:spcBef>
@@ -1290,6 +1353,9 @@
           </a:p>
           <a:p>
             <a:pPr lvl="5" marL="2592000" indent="-216000">
+              <a:lnSpc>
+                <a:spcPct val="100000"/>
+              </a:lnSpc>
               <a:spcBef>
                 <a:spcPts val="283"/>
               </a:spcBef>
@@ -1322,6 +1388,9 @@
           </a:p>
           <a:p>
             <a:pPr lvl="6" marL="3024000" indent="-216000">
+              <a:lnSpc>
+                <a:spcPct val="100000"/>
+              </a:lnSpc>
               <a:spcBef>
                 <a:spcPts val="283"/>
               </a:spcBef>
@@ -1378,7 +1447,7 @@
       </p:grpSpPr>
       <p:sp>
         <p:nvSpPr>
-          <p:cNvPr id="25" name="PlaceHolder 1"/>
+          <p:cNvPr id="26" name="PlaceHolder 1"/>
           <p:cNvSpPr>
             <a:spLocks noGrp="1"/>
           </p:cNvSpPr>
@@ -1389,7 +1458,7 @@
         <p:spPr>
           <a:xfrm>
             <a:off x="609480" y="532800"/>
-            <a:ext cx="10971720" cy="625320"/>
+            <a:ext cx="10971360" cy="625320"/>
           </a:xfrm>
           <a:prstGeom prst="rect">
             <a:avLst/>
@@ -1420,7 +1489,7 @@
       </p:sp>
       <p:sp>
         <p:nvSpPr>
-          <p:cNvPr id="26" name="PlaceHolder 2"/>
+          <p:cNvPr id="27" name="PlaceHolder 2"/>
           <p:cNvSpPr>
             <a:spLocks noGrp="1"/>
           </p:cNvSpPr>
@@ -1431,7 +1500,7 @@
         <p:spPr>
           <a:xfrm>
             <a:off x="609480" y="1604520"/>
-            <a:ext cx="10972440" cy="3977280"/>
+            <a:ext cx="10972080" cy="3976920"/>
           </a:xfrm>
           <a:prstGeom prst="rect">
             <a:avLst/>
@@ -1499,7 +1568,7 @@
         <p:txBody>
           <a:bodyPr/>
           <a:p>
-            <a:fld id="{2794A2B2-336D-4D73-9B66-109C9DAA49AE}" type="slidenum">
+            <a:fld id="{C7B4AB48-7CBA-421B-ADA7-C538ED54745C}" type="slidenum">
               <a:t>&lt;#&gt;</a:t>
             </a:fld>
           </a:p>
@@ -1529,7 +1598,7 @@
       </p:grpSpPr>
       <p:sp>
         <p:nvSpPr>
-          <p:cNvPr id="55" name="PlaceHolder 1"/>
+          <p:cNvPr id="56" name="PlaceHolder 1"/>
           <p:cNvSpPr>
             <a:spLocks noGrp="1"/>
           </p:cNvSpPr>
@@ -1540,7 +1609,7 @@
         <p:spPr>
           <a:xfrm>
             <a:off x="609480" y="532800"/>
-            <a:ext cx="10971720" cy="625320"/>
+            <a:ext cx="10971360" cy="625320"/>
           </a:xfrm>
           <a:prstGeom prst="rect">
             <a:avLst/>
@@ -1571,7 +1640,7 @@
       </p:sp>
       <p:sp>
         <p:nvSpPr>
-          <p:cNvPr id="56" name="PlaceHolder 2"/>
+          <p:cNvPr id="57" name="PlaceHolder 2"/>
           <p:cNvSpPr>
             <a:spLocks noGrp="1"/>
           </p:cNvSpPr>
@@ -1582,7 +1651,7 @@
         <p:spPr>
           <a:xfrm>
             <a:off x="609480" y="1604520"/>
-            <a:ext cx="10972440" cy="3977280"/>
+            <a:ext cx="10972080" cy="3976920"/>
           </a:xfrm>
           <a:prstGeom prst="rect">
             <a:avLst/>
@@ -1628,7 +1697,7 @@
         <p:txBody>
           <a:bodyPr/>
           <a:p>
-            <a:fld id="{3F9AE241-CF98-4EB9-BF54-1907E2636C1D}" type="slidenum">
+            <a:fld id="{93F37060-20BB-44C8-8579-9AECFAEC1349}" type="slidenum">
               <a:t>&lt;#&gt;</a:t>
             </a:fld>
           </a:p>
@@ -1693,28 +1762,28 @@
       </p:grpSpPr>
       <p:grpSp>
         <p:nvGrpSpPr>
-          <p:cNvPr id="16" name=""/>
+          <p:cNvPr id="17" name=""/>
           <p:cNvGrpSpPr/>
           <p:nvPr/>
         </p:nvGrpSpPr>
         <p:grpSpPr>
           <a:xfrm>
             <a:off x="0" y="6213240"/>
-            <a:ext cx="12183840" cy="636480"/>
+            <a:ext cx="12183480" cy="636120"/>
             <a:chOff x="0" y="6213240"/>
-            <a:chExt cx="12183840" cy="636480"/>
+            <a:chExt cx="12183480" cy="636120"/>
           </a:xfrm>
         </p:grpSpPr>
         <p:sp>
           <p:nvSpPr>
-            <p:cNvPr id="17" name="Retângulo 11"/>
+            <p:cNvPr id="18" name="Retângulo 11"/>
             <p:cNvSpPr/>
             <p:nvPr/>
           </p:nvSpPr>
           <p:spPr>
             <a:xfrm>
               <a:off x="0" y="6213240"/>
-              <a:ext cx="12183840" cy="636480"/>
+              <a:ext cx="12183480" cy="636120"/>
             </a:xfrm>
             <a:prstGeom prst="rect">
               <a:avLst/>
@@ -1766,28 +1835,28 @@
         </p:sp>
         <p:grpSp>
           <p:nvGrpSpPr>
-            <p:cNvPr id="18" name=""/>
+            <p:cNvPr id="19" name=""/>
             <p:cNvGrpSpPr/>
             <p:nvPr/>
           </p:nvGrpSpPr>
           <p:grpSpPr>
             <a:xfrm>
               <a:off x="11101680" y="6387840"/>
-              <a:ext cx="896760" cy="300960"/>
+              <a:ext cx="896400" cy="301320"/>
               <a:chOff x="11101680" y="6387840"/>
-              <a:chExt cx="896760" cy="300960"/>
+              <a:chExt cx="896400" cy="301320"/>
             </a:xfrm>
           </p:grpSpPr>
           <p:cxnSp>
             <p:nvCxnSpPr>
-              <p:cNvPr id="19" name="Conector reto 14"/>
+              <p:cNvPr id="20" name="Conector reto 14"/>
               <p:cNvCxnSpPr/>
               <p:nvPr/>
             </p:nvCxnSpPr>
             <p:spPr>
               <a:xfrm>
                 <a:off x="11101680" y="6390000"/>
-                <a:ext cx="8280" cy="299160"/>
+                <a:ext cx="8640" cy="299520"/>
               </a:xfrm>
               <a:prstGeom prst="straightConnector1">
                 <a:avLst/>
@@ -1802,7 +1871,7 @@
           </p:cxnSp>
           <p:pic>
             <p:nvPicPr>
-              <p:cNvPr id="20" name="Gráfico 15" descr=""/>
+              <p:cNvPr id="21" name="Gráfico 15" descr=""/>
               <p:cNvPicPr/>
               <p:nvPr/>
             </p:nvPicPr>
@@ -1819,7 +1888,7 @@
             <p:spPr>
               <a:xfrm>
                 <a:off x="11286720" y="6387840"/>
-                <a:ext cx="711720" cy="286920"/>
+                <a:ext cx="711360" cy="286560"/>
               </a:xfrm>
               <a:prstGeom prst="rect">
                 <a:avLst/>
@@ -1834,14 +1903,14 @@
       </p:grpSp>
       <p:sp>
         <p:nvSpPr>
-          <p:cNvPr id="21" name="PlaceHolder 3"/>
+          <p:cNvPr id="22" name="PlaceHolder 3"/>
           <p:cNvSpPr/>
           <p:nvPr/>
         </p:nvSpPr>
         <p:spPr>
           <a:xfrm>
             <a:off x="8173440" y="6354000"/>
-            <a:ext cx="2734920" cy="356760"/>
+            <a:ext cx="2734560" cy="356400"/>
           </a:xfrm>
           <a:prstGeom prst="rect">
             <a:avLst/>
@@ -1870,7 +1939,7 @@
                 <a:tab algn="l" pos="0"/>
               </a:tabLst>
             </a:pPr>
-            <a:fld id="{13E16C0A-1EE8-4795-8AE1-F9209F0A4AD5}" type="slidenum">
+            <a:fld id="{9E11B70A-B9E0-490C-A19B-AFA7CD9A8B6E}" type="slidenum">
               <a:rPr b="0" lang="pt-BR" sz="1200" strike="noStrike" u="none">
                 <a:solidFill>
                   <a:srgbClr val="808080"/>
@@ -1894,7 +1963,7 @@
       </p:sp>
       <p:sp>
         <p:nvSpPr>
-          <p:cNvPr id="22" name="CaixaDeTexto 13"/>
+          <p:cNvPr id="23" name="CaixaDeTexto 13"/>
           <p:cNvSpPr/>
           <p:nvPr/>
         </p:nvSpPr>
@@ -1997,7 +2066,7 @@
       </p:sp>
       <p:sp>
         <p:nvSpPr>
-          <p:cNvPr id="23" name="PlaceHolder 1"/>
+          <p:cNvPr id="24" name="PlaceHolder 1"/>
           <p:cNvSpPr>
             <a:spLocks noGrp="1"/>
           </p:cNvSpPr>
@@ -2007,8 +2076,8 @@
         </p:nvSpPr>
         <p:spPr>
           <a:xfrm>
-            <a:off x="609480" y="708120"/>
-            <a:ext cx="10971720" cy="274680"/>
+            <a:off x="609480" y="707760"/>
+            <a:ext cx="10971360" cy="274680"/>
           </a:xfrm>
           <a:prstGeom prst="rect">
             <a:avLst/>
@@ -2050,7 +2119,7 @@
       </p:sp>
       <p:sp>
         <p:nvSpPr>
-          <p:cNvPr id="24" name="PlaceHolder 2"/>
+          <p:cNvPr id="25" name="PlaceHolder 2"/>
           <p:cNvSpPr>
             <a:spLocks noGrp="1"/>
           </p:cNvSpPr>
@@ -2336,14 +2405,14 @@
       </p:grpSpPr>
       <p:sp>
         <p:nvSpPr>
-          <p:cNvPr id="27" name="Retângulo 11"/>
+          <p:cNvPr id="28" name="Retângulo 11"/>
           <p:cNvSpPr/>
           <p:nvPr/>
         </p:nvSpPr>
         <p:spPr>
           <a:xfrm>
             <a:off x="0" y="6213240"/>
-            <a:ext cx="12183840" cy="636480"/>
+            <a:ext cx="12183480" cy="636120"/>
           </a:xfrm>
           <a:prstGeom prst="rect">
             <a:avLst/>
@@ -2395,14 +2464,14 @@
       </p:sp>
       <p:sp>
         <p:nvSpPr>
-          <p:cNvPr id="28" name="CaixaDeTexto 13"/>
+          <p:cNvPr id="29" name="CaixaDeTexto 13"/>
           <p:cNvSpPr/>
           <p:nvPr/>
         </p:nvSpPr>
         <p:spPr>
           <a:xfrm>
             <a:off x="211680" y="6397200"/>
-            <a:ext cx="5764680" cy="270000"/>
+            <a:ext cx="5764320" cy="269640"/>
           </a:xfrm>
           <a:prstGeom prst="rect">
             <a:avLst/>
@@ -2498,14 +2567,14 @@
       </p:sp>
       <p:cxnSp>
         <p:nvCxnSpPr>
-          <p:cNvPr id="29" name="Conector reto 14"/>
+          <p:cNvPr id="30" name="Conector reto 14"/>
           <p:cNvCxnSpPr/>
           <p:nvPr/>
         </p:nvCxnSpPr>
         <p:spPr>
           <a:xfrm>
             <a:off x="11101680" y="6390000"/>
-            <a:ext cx="8280" cy="299160"/>
+            <a:ext cx="8640" cy="299520"/>
           </a:xfrm>
           <a:prstGeom prst="straightConnector1">
             <a:avLst/>
@@ -2520,7 +2589,7 @@
       </p:cxnSp>
       <p:pic>
         <p:nvPicPr>
-          <p:cNvPr id="30" name="Gráfico 15" descr=""/>
+          <p:cNvPr id="31" name="Gráfico 15" descr=""/>
           <p:cNvPicPr/>
           <p:nvPr/>
         </p:nvPicPr>
@@ -2537,7 +2606,7 @@
         <p:spPr>
           <a:xfrm>
             <a:off x="11286720" y="6387840"/>
-            <a:ext cx="711720" cy="286920"/>
+            <a:ext cx="711360" cy="286560"/>
           </a:xfrm>
           <a:prstGeom prst="rect">
             <a:avLst/>
@@ -2550,14 +2619,14 @@
       </p:pic>
       <p:sp>
         <p:nvSpPr>
-          <p:cNvPr id="31" name="Retângulo 3"/>
+          <p:cNvPr id="32" name="Retângulo 3"/>
           <p:cNvSpPr/>
           <p:nvPr/>
         </p:nvSpPr>
         <p:spPr>
           <a:xfrm>
             <a:off x="0" y="0"/>
-            <a:ext cx="12183840" cy="6849720"/>
+            <a:ext cx="12183480" cy="6849360"/>
           </a:xfrm>
           <a:prstGeom prst="rect">
             <a:avLst/>
@@ -2606,14 +2675,14 @@
       </p:sp>
       <p:sp>
         <p:nvSpPr>
-          <p:cNvPr id="32" name="Retângulo 4"/>
+          <p:cNvPr id="33" name="Retângulo 4"/>
           <p:cNvSpPr/>
           <p:nvPr/>
         </p:nvSpPr>
         <p:spPr>
           <a:xfrm>
             <a:off x="4025880" y="2707920"/>
-            <a:ext cx="531720" cy="531720"/>
+            <a:ext cx="531360" cy="531360"/>
           </a:xfrm>
           <a:prstGeom prst="rect">
             <a:avLst/>
@@ -2662,14 +2731,14 @@
       </p:sp>
       <p:sp>
         <p:nvSpPr>
-          <p:cNvPr id="33" name="Retângulo 5"/>
+          <p:cNvPr id="34" name="Retângulo 5"/>
           <p:cNvSpPr/>
           <p:nvPr/>
         </p:nvSpPr>
         <p:spPr>
           <a:xfrm>
             <a:off x="7625880" y="2707920"/>
-            <a:ext cx="531720" cy="531720"/>
+            <a:ext cx="531360" cy="531360"/>
           </a:xfrm>
           <a:prstGeom prst="rect">
             <a:avLst/>
@@ -2718,14 +2787,14 @@
       </p:sp>
       <p:sp>
         <p:nvSpPr>
-          <p:cNvPr id="34" name="Retângulo 6"/>
+          <p:cNvPr id="35" name="Retângulo 6"/>
           <p:cNvSpPr/>
           <p:nvPr/>
         </p:nvSpPr>
         <p:spPr>
           <a:xfrm>
             <a:off x="5825880" y="2707920"/>
-            <a:ext cx="531720" cy="531720"/>
+            <a:ext cx="531360" cy="531360"/>
           </a:xfrm>
           <a:prstGeom prst="rect">
             <a:avLst/>
@@ -2774,14 +2843,14 @@
       </p:sp>
       <p:sp>
         <p:nvSpPr>
-          <p:cNvPr id="35" name="Retângulo 7"/>
+          <p:cNvPr id="36" name="Retângulo 7"/>
           <p:cNvSpPr/>
           <p:nvPr/>
         </p:nvSpPr>
         <p:spPr>
           <a:xfrm>
             <a:off x="6725880" y="2707920"/>
-            <a:ext cx="531720" cy="531720"/>
+            <a:ext cx="531360" cy="531360"/>
           </a:xfrm>
           <a:prstGeom prst="rect">
             <a:avLst/>
@@ -2830,14 +2899,14 @@
       </p:sp>
       <p:sp>
         <p:nvSpPr>
-          <p:cNvPr id="36" name="Retângulo 8"/>
+          <p:cNvPr id="37" name="Retângulo 8"/>
           <p:cNvSpPr/>
           <p:nvPr/>
         </p:nvSpPr>
         <p:spPr>
           <a:xfrm>
             <a:off x="4925880" y="2707920"/>
-            <a:ext cx="531720" cy="531720"/>
+            <a:ext cx="531360" cy="531360"/>
           </a:xfrm>
           <a:prstGeom prst="rect">
             <a:avLst/>
@@ -2886,14 +2955,14 @@
       </p:sp>
       <p:sp>
         <p:nvSpPr>
-          <p:cNvPr id="37" name="Retângulo 9"/>
+          <p:cNvPr id="38" name="Retângulo 9"/>
           <p:cNvSpPr/>
           <p:nvPr/>
         </p:nvSpPr>
         <p:spPr>
           <a:xfrm>
             <a:off x="4025880" y="3610080"/>
-            <a:ext cx="531720" cy="531720"/>
+            <a:ext cx="531360" cy="531360"/>
           </a:xfrm>
           <a:prstGeom prst="rect">
             <a:avLst/>
@@ -2942,14 +3011,14 @@
       </p:sp>
       <p:sp>
         <p:nvSpPr>
-          <p:cNvPr id="38" name="Retângulo 10"/>
+          <p:cNvPr id="39" name="Retângulo 10"/>
           <p:cNvSpPr/>
           <p:nvPr/>
         </p:nvSpPr>
         <p:spPr>
           <a:xfrm>
             <a:off x="7625880" y="3610080"/>
-            <a:ext cx="531720" cy="531720"/>
+            <a:ext cx="531360" cy="531360"/>
           </a:xfrm>
           <a:prstGeom prst="rect">
             <a:avLst/>
@@ -2998,14 +3067,14 @@
       </p:sp>
       <p:sp>
         <p:nvSpPr>
-          <p:cNvPr id="39" name="Retângulo 11"/>
+          <p:cNvPr id="40" name="Retângulo 11"/>
           <p:cNvSpPr/>
           <p:nvPr/>
         </p:nvSpPr>
         <p:spPr>
           <a:xfrm>
             <a:off x="5825880" y="3610080"/>
-            <a:ext cx="531720" cy="531720"/>
+            <a:ext cx="531360" cy="531360"/>
           </a:xfrm>
           <a:prstGeom prst="rect">
             <a:avLst/>
@@ -3054,14 +3123,14 @@
       </p:sp>
       <p:sp>
         <p:nvSpPr>
-          <p:cNvPr id="40" name="Retângulo 12"/>
+          <p:cNvPr id="41" name="Retângulo 12"/>
           <p:cNvSpPr/>
           <p:nvPr/>
         </p:nvSpPr>
         <p:spPr>
           <a:xfrm>
             <a:off x="6725880" y="3610080"/>
-            <a:ext cx="531720" cy="531720"/>
+            <a:ext cx="531360" cy="531360"/>
           </a:xfrm>
           <a:prstGeom prst="rect">
             <a:avLst/>
@@ -3110,14 +3179,14 @@
       </p:sp>
       <p:sp>
         <p:nvSpPr>
-          <p:cNvPr id="41" name="Retângulo 13"/>
+          <p:cNvPr id="42" name="Retângulo 13"/>
           <p:cNvSpPr/>
           <p:nvPr/>
         </p:nvSpPr>
         <p:spPr>
           <a:xfrm>
             <a:off x="4925880" y="3610080"/>
-            <a:ext cx="531720" cy="531720"/>
+            <a:ext cx="531360" cy="531360"/>
           </a:xfrm>
           <a:prstGeom prst="rect">
             <a:avLst/>
@@ -3166,14 +3235,14 @@
       </p:sp>
       <p:sp>
         <p:nvSpPr>
-          <p:cNvPr id="42" name="Retângulo 14"/>
+          <p:cNvPr id="43" name="Retângulo 14"/>
           <p:cNvSpPr/>
           <p:nvPr/>
         </p:nvSpPr>
         <p:spPr>
           <a:xfrm>
             <a:off x="2045880" y="2707920"/>
-            <a:ext cx="531720" cy="531720"/>
+            <a:ext cx="531360" cy="531360"/>
           </a:xfrm>
           <a:prstGeom prst="rect">
             <a:avLst/>
@@ -3222,14 +3291,14 @@
       </p:sp>
       <p:sp>
         <p:nvSpPr>
-          <p:cNvPr id="43" name="Retângulo 15"/>
+          <p:cNvPr id="44" name="Retângulo 15"/>
           <p:cNvSpPr/>
           <p:nvPr/>
         </p:nvSpPr>
         <p:spPr>
           <a:xfrm>
             <a:off x="2045880" y="3610080"/>
-            <a:ext cx="531720" cy="531720"/>
+            <a:ext cx="531360" cy="531360"/>
           </a:xfrm>
           <a:prstGeom prst="rect">
             <a:avLst/>
@@ -3280,14 +3349,14 @@
       </p:sp>
       <p:sp>
         <p:nvSpPr>
-          <p:cNvPr id="44" name="Retângulo 16"/>
+          <p:cNvPr id="45" name="Retângulo 16"/>
           <p:cNvSpPr/>
           <p:nvPr/>
         </p:nvSpPr>
         <p:spPr>
           <a:xfrm>
             <a:off x="9605880" y="2707920"/>
-            <a:ext cx="531720" cy="531720"/>
+            <a:ext cx="531360" cy="531360"/>
           </a:xfrm>
           <a:prstGeom prst="rect">
             <a:avLst/>
@@ -3336,14 +3405,14 @@
       </p:sp>
       <p:sp>
         <p:nvSpPr>
-          <p:cNvPr id="45" name="Retângulo 17"/>
+          <p:cNvPr id="46" name="Retângulo 17"/>
           <p:cNvSpPr/>
           <p:nvPr/>
         </p:nvSpPr>
         <p:spPr>
           <a:xfrm>
             <a:off x="9605880" y="3610080"/>
-            <a:ext cx="531720" cy="531720"/>
+            <a:ext cx="531360" cy="531360"/>
           </a:xfrm>
           <a:prstGeom prst="rect">
             <a:avLst/>
@@ -3392,7 +3461,7 @@
       </p:sp>
       <p:sp>
         <p:nvSpPr>
-          <p:cNvPr id="46" name="PlaceHolder 1"/>
+          <p:cNvPr id="47" name="PlaceHolder 1"/>
           <p:cNvSpPr>
             <a:spLocks noGrp="1"/>
           </p:cNvSpPr>
@@ -3403,7 +3472,7 @@
         <p:spPr>
           <a:xfrm>
             <a:off x="8173440" y="6352920"/>
-            <a:ext cx="2734920" cy="356760"/>
+            <a:ext cx="2734560" cy="356400"/>
           </a:xfrm>
           <a:prstGeom prst="rect">
             <a:avLst/>
@@ -3446,7 +3515,7 @@
                 <a:tab algn="l" pos="0"/>
               </a:tabLst>
             </a:pPr>
-            <a:fld id="{117FB1FA-731B-4987-993C-FF621FE4D988}" type="slidenum">
+            <a:fld id="{DC348D56-C1A9-4029-990E-91AEFE174F71}" type="slidenum">
               <a:rPr b="0" lang="pt-BR" sz="1200" strike="noStrike" u="none">
                 <a:solidFill>
                   <a:srgbClr val="808080"/>
@@ -3503,28 +3572,28 @@
       </p:grpSpPr>
       <p:grpSp>
         <p:nvGrpSpPr>
-          <p:cNvPr id="47" name=""/>
+          <p:cNvPr id="48" name=""/>
           <p:cNvGrpSpPr/>
           <p:nvPr/>
         </p:nvGrpSpPr>
         <p:grpSpPr>
           <a:xfrm>
             <a:off x="0" y="6213240"/>
-            <a:ext cx="12191760" cy="644400"/>
+            <a:ext cx="12191400" cy="644040"/>
             <a:chOff x="0" y="6213240"/>
-            <a:chExt cx="12191760" cy="644400"/>
+            <a:chExt cx="12191400" cy="644040"/>
           </a:xfrm>
         </p:grpSpPr>
         <p:sp>
           <p:nvSpPr>
-            <p:cNvPr id="48" name="Retângulo 11"/>
+            <p:cNvPr id="49" name="Retângulo 11"/>
             <p:cNvSpPr/>
             <p:nvPr/>
           </p:nvSpPr>
           <p:spPr>
             <a:xfrm>
               <a:off x="0" y="6213240"/>
-              <a:ext cx="12191760" cy="644400"/>
+              <a:ext cx="12191400" cy="644040"/>
             </a:xfrm>
             <a:prstGeom prst="rect">
               <a:avLst/>
@@ -3555,6 +3624,11 @@
               <a:noAutofit/>
             </a:bodyPr>
             <a:p>
+              <a:pPr>
+                <a:lnSpc>
+                  <a:spcPct val="100000"/>
+                </a:lnSpc>
+              </a:pPr>
               <a:endParaRPr b="0" lang="pt-BR" sz="1600" strike="noStrike" u="none">
                 <a:solidFill>
                   <a:srgbClr val="ffffff"/>
@@ -3568,14 +3642,14 @@
         </p:sp>
         <p:sp>
           <p:nvSpPr>
-            <p:cNvPr id="49" name="CaixaDeTexto 13"/>
+            <p:cNvPr id="50" name="CaixaDeTexto 13"/>
             <p:cNvSpPr/>
             <p:nvPr/>
           </p:nvSpPr>
           <p:spPr>
             <a:xfrm>
               <a:off x="180000" y="6397200"/>
-              <a:ext cx="5770440" cy="275400"/>
+              <a:ext cx="5770080" cy="275040"/>
             </a:xfrm>
             <a:prstGeom prst="rect">
               <a:avLst/>
@@ -3671,14 +3745,14 @@
         </p:sp>
         <p:cxnSp>
           <p:nvCxnSpPr>
-            <p:cNvPr id="50" name="Conector reto 14"/>
+            <p:cNvPr id="51" name="Conector reto 14"/>
             <p:cNvCxnSpPr/>
             <p:nvPr/>
           </p:nvCxnSpPr>
           <p:spPr>
             <a:xfrm>
               <a:off x="11101680" y="6390000"/>
-              <a:ext cx="360" cy="291240"/>
+              <a:ext cx="720" cy="291600"/>
             </a:xfrm>
             <a:prstGeom prst="straightConnector1">
               <a:avLst/>
@@ -3687,12 +3761,13 @@
               <a:solidFill>
                 <a:srgbClr val="808080"/>
               </a:solidFill>
+              <a:round/>
             </a:ln>
           </p:spPr>
         </p:cxnSp>
         <p:pic>
           <p:nvPicPr>
-            <p:cNvPr id="51" name="Gráfico 15" descr=""/>
+            <p:cNvPr id="52" name="Gráfico 15" descr=""/>
             <p:cNvPicPr/>
             <p:nvPr/>
           </p:nvPicPr>
@@ -3709,7 +3784,7 @@
           <p:spPr>
             <a:xfrm>
               <a:off x="11286720" y="6387840"/>
-              <a:ext cx="719640" cy="294840"/>
+              <a:ext cx="719280" cy="294480"/>
             </a:xfrm>
             <a:prstGeom prst="rect">
               <a:avLst/>
@@ -3723,7 +3798,7 @@
       </p:grpSp>
       <p:sp>
         <p:nvSpPr>
-          <p:cNvPr id="52" name="PlaceHolder 1"/>
+          <p:cNvPr id="53" name="PlaceHolder 1"/>
           <p:cNvSpPr>
             <a:spLocks noGrp="1"/>
           </p:cNvSpPr>
@@ -3733,8 +3808,8 @@
         </p:nvSpPr>
         <p:spPr>
           <a:xfrm>
-            <a:off x="540000" y="540000"/>
-            <a:ext cx="10746360" cy="479880"/>
+            <a:off x="609480" y="707760"/>
+            <a:ext cx="10971360" cy="274680"/>
           </a:xfrm>
           <a:prstGeom prst="rect">
             <a:avLst/>
@@ -3745,41 +3820,38 @@
           </a:ln>
         </p:spPr>
         <p:txBody>
-          <a:bodyPr lIns="91440" rIns="91440" tIns="45720" bIns="45720" anchor="ctr">
-            <a:noAutofit/>
+          <a:bodyPr lIns="0" rIns="0" tIns="0" bIns="0" anchor="ctr">
+            <a:spAutoFit/>
           </a:bodyPr>
           <a:p>
-            <a:pPr indent="0" defTabSz="914400">
-              <a:lnSpc>
-                <a:spcPct val="90000"/>
-              </a:lnSpc>
+            <a:pPr indent="0">
               <a:buNone/>
             </a:pPr>
             <a:r>
-              <a:rPr b="1" lang="pt-BR" sz="2800" strike="noStrike" u="none">
-                <a:solidFill>
-                  <a:srgbClr val="171717"/>
-                </a:solidFill>
-                <a:effectLst/>
-                <a:uFillTx/>
-                <a:latin typeface="Arial"/>
-              </a:rPr>
-              <a:t>Clique para editar o título Mestre</a:t>
+              <a:rPr b="0" lang="pt-BR" sz="1800" strike="noStrike" u="none">
+                <a:solidFill>
+                  <a:srgbClr val="000000"/>
+                </a:solidFill>
+                <a:effectLst/>
+                <a:uFillTx/>
+                <a:latin typeface="Arial"/>
+              </a:rPr>
+              <a:t>Clique para editar o formato do texto do título</a:t>
             </a:r>
-            <a:endParaRPr b="0" lang="pt-BR" sz="2800" strike="noStrike" u="none">
-              <a:solidFill>
-                <a:schemeClr val="dk1"/>
-              </a:solidFill>
-              <a:effectLst/>
-              <a:uFillTx/>
-              <a:latin typeface="Aptos"/>
+            <a:endParaRPr b="0" lang="pt-BR" sz="1800" strike="noStrike" u="none">
+              <a:solidFill>
+                <a:srgbClr val="000000"/>
+              </a:solidFill>
+              <a:effectLst/>
+              <a:uFillTx/>
+              <a:latin typeface="Arial"/>
             </a:endParaRPr>
           </a:p>
         </p:txBody>
       </p:sp>
       <p:sp>
         <p:nvSpPr>
-          <p:cNvPr id="53" name="PlaceHolder 2"/>
+          <p:cNvPr id="54" name="PlaceHolder 2"/>
           <p:cNvSpPr>
             <a:spLocks noGrp="1"/>
           </p:cNvSpPr>
@@ -3789,8 +3861,8 @@
         </p:nvSpPr>
         <p:spPr>
           <a:xfrm>
-            <a:off x="540000" y="1380240"/>
-            <a:ext cx="10746360" cy="2009520"/>
+            <a:off x="609480" y="1604520"/>
+            <a:ext cx="10972080" cy="3976920"/>
           </a:xfrm>
           <a:prstGeom prst="rect">
             <a:avLst/>
@@ -3801,43 +3873,35 @@
           </a:ln>
         </p:spPr>
         <p:txBody>
-          <a:bodyPr lIns="91440" rIns="91440" tIns="45720" bIns="45720" anchor="t">
-            <a:noAutofit/>
+          <a:bodyPr lIns="0" rIns="0" tIns="0" bIns="0" anchor="t">
+            <a:normAutofit/>
           </a:bodyPr>
           <a:p>
-            <a:pPr marL="266760" indent="-266760" defTabSz="914400">
-              <a:lnSpc>
-                <a:spcPct val="90000"/>
-              </a:lnSpc>
-              <a:spcAft>
-                <a:spcPts val="1199"/>
-              </a:spcAft>
+            <a:pPr marL="432000" indent="-324000">
+              <a:spcBef>
+                <a:spcPts val="1417"/>
+              </a:spcBef>
               <a:buClr>
-                <a:srgbClr val="393938"/>
+                <a:srgbClr val="000000"/>
               </a:buClr>
-              <a:buFont typeface="Arial"/>
-              <a:buChar char="•"/>
+              <a:buSzPct val="45000"/>
+              <a:buFont typeface="Wingdings" charset="2"/>
+              <a:buChar char=""/>
             </a:pPr>
             <a:r>
               <a:rPr b="0" lang="pt-BR" sz="1800" strike="noStrike" u="none">
                 <a:solidFill>
-                  <a:schemeClr val="dk1">
-                    <a:lumMod val="90000"/>
-                    <a:lumOff val="10000"/>
-                  </a:schemeClr>
-                </a:solidFill>
-                <a:effectLst/>
-                <a:uFillTx/>
-                <a:latin typeface="Arial"/>
-              </a:rPr>
-              <a:t>Clique para editar os estilos de texto Mestres</a:t>
+                  <a:srgbClr val="000000"/>
+                </a:solidFill>
+                <a:effectLst/>
+                <a:uFillTx/>
+                <a:latin typeface="Arial"/>
+              </a:rPr>
+              <a:t>Clique para editar o formato de texto dos tópicos</a:t>
             </a:r>
             <a:endParaRPr b="0" lang="pt-BR" sz="1800" strike="noStrike" u="none">
               <a:solidFill>
-                <a:schemeClr val="dk1">
-                  <a:lumMod val="90000"/>
-                  <a:lumOff val="10000"/>
-                </a:schemeClr>
+                <a:srgbClr val="000000"/>
               </a:solidFill>
               <a:effectLst/>
               <a:uFillTx/>
@@ -3845,39 +3909,31 @@
             </a:endParaRPr>
           </a:p>
           <a:p>
-            <a:pPr lvl="1" marL="622440" indent="-266760" defTabSz="914400">
-              <a:lnSpc>
-                <a:spcPct val="90000"/>
-              </a:lnSpc>
-              <a:spcAft>
-                <a:spcPts val="1199"/>
-              </a:spcAft>
+            <a:pPr lvl="1" marL="864000" indent="-324000">
+              <a:spcBef>
+                <a:spcPts val="1134"/>
+              </a:spcBef>
               <a:buClr>
-                <a:srgbClr val="393938"/>
+                <a:srgbClr val="000000"/>
               </a:buClr>
-              <a:buFont typeface="Arial"/>
-              <a:buChar char="•"/>
+              <a:buSzPct val="75000"/>
+              <a:buFont typeface="Symbol" charset="2"/>
+              <a:buChar char=""/>
             </a:pPr>
             <a:r>
               <a:rPr b="0" lang="pt-BR" sz="1800" strike="noStrike" u="none">
                 <a:solidFill>
-                  <a:schemeClr val="dk1">
-                    <a:lumMod val="90000"/>
-                    <a:lumOff val="10000"/>
-                  </a:schemeClr>
-                </a:solidFill>
-                <a:effectLst/>
-                <a:uFillTx/>
-                <a:latin typeface="Arial"/>
-              </a:rPr>
-              <a:t>Segundo nível</a:t>
+                  <a:srgbClr val="000000"/>
+                </a:solidFill>
+                <a:effectLst/>
+                <a:uFillTx/>
+                <a:latin typeface="Arial"/>
+              </a:rPr>
+              <a:t>2.º nível de tópicos</a:t>
             </a:r>
             <a:endParaRPr b="0" lang="pt-BR" sz="1800" strike="noStrike" u="none">
               <a:solidFill>
-                <a:schemeClr val="dk1">
-                  <a:lumMod val="90000"/>
-                  <a:lumOff val="10000"/>
-                </a:schemeClr>
+                <a:srgbClr val="000000"/>
               </a:solidFill>
               <a:effectLst/>
               <a:uFillTx/>
@@ -3885,39 +3941,31 @@
             </a:endParaRPr>
           </a:p>
           <a:p>
-            <a:pPr lvl="2" marL="990720" indent="-266760" defTabSz="914400">
-              <a:lnSpc>
-                <a:spcPct val="90000"/>
-              </a:lnSpc>
-              <a:spcAft>
-                <a:spcPts val="1199"/>
-              </a:spcAft>
+            <a:pPr lvl="2" marL="1296000" indent="-288000">
+              <a:spcBef>
+                <a:spcPts val="850"/>
+              </a:spcBef>
               <a:buClr>
-                <a:srgbClr val="393938"/>
+                <a:srgbClr val="000000"/>
               </a:buClr>
-              <a:buFont typeface="Arial"/>
-              <a:buChar char="•"/>
+              <a:buSzPct val="45000"/>
+              <a:buFont typeface="Wingdings" charset="2"/>
+              <a:buChar char=""/>
             </a:pPr>
             <a:r>
               <a:rPr b="0" lang="pt-BR" sz="1800" strike="noStrike" u="none">
                 <a:solidFill>
-                  <a:schemeClr val="dk1">
-                    <a:lumMod val="90000"/>
-                    <a:lumOff val="10000"/>
-                  </a:schemeClr>
-                </a:solidFill>
-                <a:effectLst/>
-                <a:uFillTx/>
-                <a:latin typeface="Arial"/>
-              </a:rPr>
-              <a:t>Terceiro nível</a:t>
+                  <a:srgbClr val="000000"/>
+                </a:solidFill>
+                <a:effectLst/>
+                <a:uFillTx/>
+                <a:latin typeface="Arial"/>
+              </a:rPr>
+              <a:t>3.º nível de tópicos</a:t>
             </a:r>
             <a:endParaRPr b="0" lang="pt-BR" sz="1800" strike="noStrike" u="none">
               <a:solidFill>
-                <a:schemeClr val="dk1">
-                  <a:lumMod val="90000"/>
-                  <a:lumOff val="10000"/>
-                </a:schemeClr>
+                <a:srgbClr val="000000"/>
               </a:solidFill>
               <a:effectLst/>
               <a:uFillTx/>
@@ -3925,39 +3973,31 @@
             </a:endParaRPr>
           </a:p>
           <a:p>
-            <a:pPr lvl="3" marL="1346040" indent="-266760" defTabSz="914400">
-              <a:lnSpc>
-                <a:spcPct val="90000"/>
-              </a:lnSpc>
-              <a:spcAft>
-                <a:spcPts val="1199"/>
-              </a:spcAft>
+            <a:pPr lvl="3" marL="1728000" indent="-216000">
+              <a:spcBef>
+                <a:spcPts val="567"/>
+              </a:spcBef>
               <a:buClr>
-                <a:srgbClr val="393938"/>
+                <a:srgbClr val="000000"/>
               </a:buClr>
-              <a:buFont typeface="Arial"/>
-              <a:buChar char="•"/>
+              <a:buSzPct val="75000"/>
+              <a:buFont typeface="Symbol" charset="2"/>
+              <a:buChar char=""/>
             </a:pPr>
             <a:r>
               <a:rPr b="0" lang="pt-BR" sz="1800" strike="noStrike" u="none">
                 <a:solidFill>
-                  <a:schemeClr val="dk1">
-                    <a:lumMod val="90000"/>
-                    <a:lumOff val="10000"/>
-                  </a:schemeClr>
-                </a:solidFill>
-                <a:effectLst/>
-                <a:uFillTx/>
-                <a:latin typeface="Arial"/>
-              </a:rPr>
-              <a:t>Quarto nível</a:t>
+                  <a:srgbClr val="000000"/>
+                </a:solidFill>
+                <a:effectLst/>
+                <a:uFillTx/>
+                <a:latin typeface="Arial"/>
+              </a:rPr>
+              <a:t>4.º nível de tópicos</a:t>
             </a:r>
             <a:endParaRPr b="0" lang="pt-BR" sz="1800" strike="noStrike" u="none">
               <a:solidFill>
-                <a:schemeClr val="dk1">
-                  <a:lumMod val="90000"/>
-                  <a:lumOff val="10000"/>
-                </a:schemeClr>
+                <a:srgbClr val="000000"/>
               </a:solidFill>
               <a:effectLst/>
               <a:uFillTx/>
@@ -3965,39 +4005,95 @@
             </a:endParaRPr>
           </a:p>
           <a:p>
-            <a:pPr lvl="4" marL="1701720" indent="-266760" defTabSz="914400">
-              <a:lnSpc>
-                <a:spcPct val="90000"/>
-              </a:lnSpc>
-              <a:spcAft>
-                <a:spcPts val="1199"/>
-              </a:spcAft>
+            <a:pPr lvl="4" marL="2160000" indent="-216000">
+              <a:spcBef>
+                <a:spcPts val="283"/>
+              </a:spcBef>
               <a:buClr>
-                <a:srgbClr val="393938"/>
+                <a:srgbClr val="000000"/>
               </a:buClr>
-              <a:buFont typeface="Arial"/>
-              <a:buChar char="•"/>
+              <a:buSzPct val="45000"/>
+              <a:buFont typeface="Wingdings" charset="2"/>
+              <a:buChar char=""/>
             </a:pPr>
             <a:r>
               <a:rPr b="0" lang="pt-BR" sz="1800" strike="noStrike" u="none">
                 <a:solidFill>
-                  <a:schemeClr val="dk1">
-                    <a:lumMod val="90000"/>
-                    <a:lumOff val="10000"/>
-                  </a:schemeClr>
-                </a:solidFill>
-                <a:effectLst/>
-                <a:uFillTx/>
-                <a:latin typeface="Arial"/>
-              </a:rPr>
-              <a:t>Quinto nível</a:t>
+                  <a:srgbClr val="000000"/>
+                </a:solidFill>
+                <a:effectLst/>
+                <a:uFillTx/>
+                <a:latin typeface="Arial"/>
+              </a:rPr>
+              <a:t>5.º nível de tópicos</a:t>
             </a:r>
             <a:endParaRPr b="0" lang="pt-BR" sz="1800" strike="noStrike" u="none">
               <a:solidFill>
-                <a:schemeClr val="dk1">
-                  <a:lumMod val="90000"/>
-                  <a:lumOff val="10000"/>
-                </a:schemeClr>
+                <a:srgbClr val="000000"/>
+              </a:solidFill>
+              <a:effectLst/>
+              <a:uFillTx/>
+              <a:latin typeface="Arial"/>
+            </a:endParaRPr>
+          </a:p>
+          <a:p>
+            <a:pPr lvl="5" marL="2592000" indent="-216000">
+              <a:spcBef>
+                <a:spcPts val="283"/>
+              </a:spcBef>
+              <a:buClr>
+                <a:srgbClr val="000000"/>
+              </a:buClr>
+              <a:buSzPct val="45000"/>
+              <a:buFont typeface="Wingdings" charset="2"/>
+              <a:buChar char=""/>
+            </a:pPr>
+            <a:r>
+              <a:rPr b="0" lang="pt-BR" sz="1800" strike="noStrike" u="none">
+                <a:solidFill>
+                  <a:srgbClr val="000000"/>
+                </a:solidFill>
+                <a:effectLst/>
+                <a:uFillTx/>
+                <a:latin typeface="Arial"/>
+              </a:rPr>
+              <a:t>6.º nível de tópicos</a:t>
+            </a:r>
+            <a:endParaRPr b="0" lang="pt-BR" sz="1800" strike="noStrike" u="none">
+              <a:solidFill>
+                <a:srgbClr val="000000"/>
+              </a:solidFill>
+              <a:effectLst/>
+              <a:uFillTx/>
+              <a:latin typeface="Arial"/>
+            </a:endParaRPr>
+          </a:p>
+          <a:p>
+            <a:pPr lvl="6" marL="3024000" indent="-216000">
+              <a:spcBef>
+                <a:spcPts val="283"/>
+              </a:spcBef>
+              <a:buClr>
+                <a:srgbClr val="000000"/>
+              </a:buClr>
+              <a:buSzPct val="45000"/>
+              <a:buFont typeface="Wingdings" charset="2"/>
+              <a:buChar char=""/>
+            </a:pPr>
+            <a:r>
+              <a:rPr b="0" lang="pt-BR" sz="1800" strike="noStrike" u="none">
+                <a:solidFill>
+                  <a:srgbClr val="000000"/>
+                </a:solidFill>
+                <a:effectLst/>
+                <a:uFillTx/>
+                <a:latin typeface="Arial"/>
+              </a:rPr>
+              <a:t>7.º nível de tópicos</a:t>
+            </a:r>
+            <a:endParaRPr b="0" lang="pt-BR" sz="1800" strike="noStrike" u="none">
+              <a:solidFill>
+                <a:srgbClr val="000000"/>
               </a:solidFill>
               <a:effectLst/>
               <a:uFillTx/>
@@ -4008,7 +4104,7 @@
       </p:sp>
       <p:sp>
         <p:nvSpPr>
-          <p:cNvPr id="54" name="PlaceHolder 3"/>
+          <p:cNvPr id="55" name="PlaceHolder 3"/>
           <p:cNvSpPr>
             <a:spLocks noGrp="1"/>
           </p:cNvSpPr>
@@ -4019,7 +4115,7 @@
         <p:spPr>
           <a:xfrm>
             <a:off x="8173440" y="6354000"/>
-            <a:ext cx="2742840" cy="364680"/>
+            <a:ext cx="2742480" cy="364320"/>
           </a:xfrm>
           <a:prstGeom prst="rect">
             <a:avLst/>
@@ -4039,6 +4135,9 @@
                 <a:spcPct val="100000"/>
               </a:lnSpc>
               <a:buNone/>
+              <a:tabLst>
+                <a:tab algn="l" pos="0"/>
+              </a:tabLst>
               <a:defRPr b="0" lang="pt-BR" sz="1200" strike="noStrike" u="none">
                 <a:solidFill>
                   <a:srgbClr val="808080"/>
@@ -4055,8 +4154,11 @@
                 <a:spcPct val="100000"/>
               </a:lnSpc>
               <a:buNone/>
-            </a:pPr>
-            <a:fld id="{0181514D-E72B-4319-AFE0-814894968E63}" type="slidenum">
+              <a:tabLst>
+                <a:tab algn="l" pos="0"/>
+              </a:tabLst>
+            </a:pPr>
+            <a:fld id="{38854A4C-BBFB-4B6E-B07B-E21EB7D78A8F}" type="slidenum">
               <a:rPr b="0" lang="pt-BR" sz="1200" strike="noStrike" u="none">
                 <a:solidFill>
                   <a:srgbClr val="808080"/>
@@ -4106,14 +4208,14 @@
       </p:grpSpPr>
       <p:sp>
         <p:nvSpPr>
-          <p:cNvPr id="57" name="Retângulo 1"/>
+          <p:cNvPr id="58" name="Retângulo 1"/>
           <p:cNvSpPr/>
           <p:nvPr/>
         </p:nvSpPr>
         <p:spPr>
           <a:xfrm>
             <a:off x="1080" y="1080"/>
-            <a:ext cx="12183480" cy="6848280"/>
+            <a:ext cx="12183120" cy="6847920"/>
           </a:xfrm>
           <a:prstGeom prst="rect">
             <a:avLst/>
@@ -4162,7 +4264,7 @@
       </p:sp>
       <p:pic>
         <p:nvPicPr>
-          <p:cNvPr id="58" name="Gráfico 2" descr=""/>
+          <p:cNvPr id="59" name="Gráfico 2" descr=""/>
           <p:cNvPicPr/>
           <p:nvPr/>
         </p:nvPicPr>
@@ -4179,7 +4281,7 @@
         <p:spPr>
           <a:xfrm>
             <a:off x="9852120" y="5367600"/>
-            <a:ext cx="1434960" cy="585360"/>
+            <a:ext cx="1434600" cy="585000"/>
           </a:xfrm>
           <a:prstGeom prst="rect">
             <a:avLst/>
@@ -4192,14 +4294,14 @@
       </p:pic>
       <p:sp>
         <p:nvSpPr>
-          <p:cNvPr id="59" name="CaixaDeTexto 2"/>
+          <p:cNvPr id="60" name="CaixaDeTexto 2"/>
           <p:cNvSpPr/>
           <p:nvPr/>
         </p:nvSpPr>
         <p:spPr>
           <a:xfrm>
             <a:off x="6587280" y="2872080"/>
-            <a:ext cx="3774960" cy="974520"/>
+            <a:ext cx="3774600" cy="974520"/>
           </a:xfrm>
           <a:prstGeom prst="rect">
             <a:avLst/>
@@ -4299,14 +4401,14 @@
       </p:sp>
       <p:cxnSp>
         <p:nvCxnSpPr>
-          <p:cNvPr id="60" name="Conector reto 2"/>
+          <p:cNvPr id="61" name="Conector reto 2"/>
           <p:cNvCxnSpPr/>
           <p:nvPr/>
         </p:nvCxnSpPr>
         <p:spPr>
           <a:xfrm>
             <a:off x="5867280" y="2734200"/>
-            <a:ext cx="5040" cy="1394280"/>
+            <a:ext cx="5400" cy="1394640"/>
           </a:xfrm>
           <a:prstGeom prst="straightConnector1">
             <a:avLst/>
@@ -4320,14 +4422,14 @@
       </p:cxnSp>
       <p:sp>
         <p:nvSpPr>
-          <p:cNvPr id="61" name="Retângulo 44"/>
+          <p:cNvPr id="62" name="Retângulo 44"/>
           <p:cNvSpPr/>
           <p:nvPr/>
         </p:nvSpPr>
         <p:spPr>
           <a:xfrm>
             <a:off x="1692000" y="2550600"/>
-            <a:ext cx="3884400" cy="1184040"/>
+            <a:ext cx="3884040" cy="1183680"/>
           </a:xfrm>
           <a:prstGeom prst="rect">
             <a:avLst/>
@@ -4429,14 +4531,14 @@
       </p:grpSpPr>
       <p:sp>
         <p:nvSpPr>
-          <p:cNvPr id="62" name="Retângulo 2"/>
+          <p:cNvPr id="63" name="Retângulo 2"/>
           <p:cNvSpPr/>
           <p:nvPr/>
         </p:nvSpPr>
         <p:spPr>
           <a:xfrm>
             <a:off x="0" y="0"/>
-            <a:ext cx="12183840" cy="6849720"/>
+            <a:ext cx="12183480" cy="6849360"/>
           </a:xfrm>
           <a:prstGeom prst="rect">
             <a:avLst/>
@@ -4485,7 +4587,7 @@
       </p:sp>
       <p:pic>
         <p:nvPicPr>
-          <p:cNvPr id="63" name="Gráfico 1" descr=""/>
+          <p:cNvPr id="64" name="Gráfico 1" descr=""/>
           <p:cNvPicPr/>
           <p:nvPr/>
         </p:nvPicPr>
@@ -4502,7 +4604,7 @@
         <p:spPr>
           <a:xfrm>
             <a:off x="9852120" y="5367600"/>
-            <a:ext cx="1431720" cy="582120"/>
+            <a:ext cx="1431360" cy="581760"/>
           </a:xfrm>
           <a:prstGeom prst="rect">
             <a:avLst/>
@@ -4515,14 +4617,14 @@
       </p:pic>
       <p:sp>
         <p:nvSpPr>
-          <p:cNvPr id="64" name="CaixaDeTexto 1"/>
+          <p:cNvPr id="65" name="CaixaDeTexto 1"/>
           <p:cNvSpPr/>
           <p:nvPr/>
         </p:nvSpPr>
         <p:spPr>
           <a:xfrm>
             <a:off x="928440" y="2425680"/>
-            <a:ext cx="6438240" cy="1092240"/>
+            <a:ext cx="6437880" cy="1091880"/>
           </a:xfrm>
           <a:prstGeom prst="rect">
             <a:avLst/>
@@ -4662,7 +4764,7 @@
       </p:sp>
       <p:sp>
         <p:nvSpPr>
-          <p:cNvPr id="65" name="Retângulo: Cantos Arredondados 1">
+          <p:cNvPr id="66" name="Retângulo: Cantos Arredondados 1">
             <a:hlinkClick r:id="rId3"/>
           </p:cNvPr>
           <p:cNvSpPr/>
@@ -4671,7 +4773,7 @@
         <p:spPr>
           <a:xfrm>
             <a:off x="900000" y="4072320"/>
-            <a:ext cx="1469160" cy="351720"/>
+            <a:ext cx="1468800" cy="351360"/>
           </a:xfrm>
           <a:prstGeom prst="roundRect">
             <a:avLst>
@@ -4766,7 +4868,7 @@
       </p:grpSpPr>
       <p:sp>
         <p:nvSpPr>
-          <p:cNvPr id="66" name="PlaceHolder 1"/>
+          <p:cNvPr id="67" name="PlaceHolder 1"/>
           <p:cNvSpPr>
             <a:spLocks noGrp="1"/>
           </p:cNvSpPr>
@@ -4777,7 +4879,7 @@
         <p:spPr>
           <a:xfrm>
             <a:off x="540000" y="540000"/>
-            <a:ext cx="10746360" cy="479880"/>
+            <a:ext cx="10746000" cy="479520"/>
           </a:xfrm>
           <a:prstGeom prst="rect">
             <a:avLst/>
@@ -4792,12 +4894,12 @@
             <a:noAutofit/>
           </a:bodyPr>
           <a:p>
-            <a:pPr indent="0">
+            <a:pPr indent="0" algn="ctr">
               <a:buNone/>
             </a:pPr>
-            <a:endParaRPr b="1" lang="pt-BR" sz="2800" strike="noStrike" u="none">
-              <a:solidFill>
-                <a:srgbClr val="171717"/>
+            <a:endParaRPr b="0" lang="pt-BR" sz="1800" strike="noStrike" u="none">
+              <a:solidFill>
+                <a:srgbClr val="000000"/>
               </a:solidFill>
               <a:effectLst/>
               <a:uFillTx/>
@@ -4808,7 +4910,7 @@
       </p:sp>
       <p:sp>
         <p:nvSpPr>
-          <p:cNvPr id="67" name="PlaceHolder 2"/>
+          <p:cNvPr id="68" name="PlaceHolder 2"/>
           <p:cNvSpPr>
             <a:spLocks noGrp="1"/>
           </p:cNvSpPr>
@@ -4819,7 +4921,7 @@
         <p:spPr>
           <a:xfrm>
             <a:off x="540000" y="1380240"/>
-            <a:ext cx="10746360" cy="2009520"/>
+            <a:ext cx="10746000" cy="2009160"/>
           </a:xfrm>
           <a:prstGeom prst="rect">
             <a:avLst/>
@@ -4835,9 +4937,6 @@
           </a:bodyPr>
           <a:p>
             <a:pPr indent="0">
-              <a:lnSpc>
-                <a:spcPct val="90000"/>
-              </a:lnSpc>
               <a:spcBef>
                 <a:spcPts val="1417"/>
               </a:spcBef>
@@ -4845,10 +4944,7 @@
             </a:pPr>
             <a:endParaRPr b="0" lang="pt-BR" sz="1800" strike="noStrike" u="none">
               <a:solidFill>
-                <a:schemeClr val="dk1">
-                  <a:lumMod val="90000"/>
-                  <a:lumOff val="10000"/>
-                </a:schemeClr>
+                <a:srgbClr val="000000"/>
               </a:solidFill>
               <a:effectLst/>
               <a:uFillTx/>
@@ -4871,7 +4967,7 @@
         <p:txBody>
           <a:bodyPr/>
           <a:p>
-            <a:fld id="{CB8BADAC-188E-4C78-91EF-E95238639A81}" type="slidenum">
+            <a:fld id="{37B90588-8740-4220-8249-CCC4BB985434}" type="slidenum">
               <a:t>3</a:t>
             </a:fld>
           </a:p>
@@ -4909,14 +5005,14 @@
       </p:grpSpPr>
       <p:sp>
         <p:nvSpPr>
-          <p:cNvPr id="68" name="Retângulo 3"/>
+          <p:cNvPr id="69" name="Retângulo 3"/>
           <p:cNvSpPr/>
           <p:nvPr/>
         </p:nvSpPr>
         <p:spPr>
           <a:xfrm>
             <a:off x="0" y="0"/>
-            <a:ext cx="12183840" cy="6849720"/>
+            <a:ext cx="12183480" cy="6849360"/>
           </a:xfrm>
           <a:prstGeom prst="rect">
             <a:avLst/>
@@ -4965,7 +5061,7 @@
       </p:sp>
       <p:pic>
         <p:nvPicPr>
-          <p:cNvPr id="69" name="Gráfico 4" descr=""/>
+          <p:cNvPr id="70" name="Gráfico 4" descr=""/>
           <p:cNvPicPr/>
           <p:nvPr/>
         </p:nvPicPr>
@@ -4982,7 +5078,7 @@
         <p:spPr>
           <a:xfrm>
             <a:off x="5375880" y="5367600"/>
-            <a:ext cx="1431720" cy="582120"/>
+            <a:ext cx="1431360" cy="581760"/>
           </a:xfrm>
           <a:prstGeom prst="rect">
             <a:avLst/>
@@ -4995,7 +5091,7 @@
       </p:pic>
       <p:sp>
         <p:nvSpPr>
-          <p:cNvPr id="70" name="CaixaDeTexto 6"/>
+          <p:cNvPr id="71" name="CaixaDeTexto 6"/>
           <p:cNvSpPr/>
           <p:nvPr/>
         </p:nvSpPr>
@@ -5055,14 +5151,14 @@
       </p:sp>
       <p:sp>
         <p:nvSpPr>
-          <p:cNvPr id="71" name="Retângulo: Cantos Arredondados 7"/>
+          <p:cNvPr id="72" name="Retângulo: Cantos Arredondados 7"/>
           <p:cNvSpPr/>
           <p:nvPr/>
         </p:nvSpPr>
         <p:spPr>
           <a:xfrm>
             <a:off x="1314360" y="3474360"/>
-            <a:ext cx="9554760" cy="469080"/>
+            <a:ext cx="9554400" cy="468720"/>
           </a:xfrm>
           <a:prstGeom prst="roundRect">
             <a:avLst>

</xml_diff>

<commit_message>
Update Agradecimento e logos
</commit_message>
<xml_diff>
--- a/backend/Templates/Template.pptx
+++ b/backend/Templates/Template.pptx
@@ -51,7 +51,7 @@
         <p:spPr>
           <a:xfrm>
             <a:off x="0" y="6213240"/>
-            <a:ext cx="12183480" cy="636120"/>
+            <a:ext cx="12182760" cy="635400"/>
           </a:xfrm>
           <a:prstGeom prst="rect">
             <a:avLst/>
@@ -213,7 +213,7 @@
         <p:spPr>
           <a:xfrm>
             <a:off x="11101680" y="6390000"/>
-            <a:ext cx="8640" cy="299520"/>
+            <a:ext cx="9360" cy="300240"/>
           </a:xfrm>
           <a:prstGeom prst="straightConnector1">
             <a:avLst/>
@@ -245,7 +245,7 @@
         <p:spPr>
           <a:xfrm>
             <a:off x="11286720" y="6387840"/>
-            <a:ext cx="711360" cy="286560"/>
+            <a:ext cx="710640" cy="285840"/>
           </a:xfrm>
           <a:prstGeom prst="rect">
             <a:avLst/>
@@ -294,7 +294,7 @@
         <p:spPr>
           <a:xfrm>
             <a:off x="0" y="6213240"/>
-            <a:ext cx="12183480" cy="636120"/>
+            <a:ext cx="12182760" cy="635400"/>
           </a:xfrm>
           <a:prstGeom prst="rect">
             <a:avLst/>
@@ -456,7 +456,7 @@
         <p:spPr>
           <a:xfrm>
             <a:off x="11101680" y="6390000"/>
-            <a:ext cx="8640" cy="299520"/>
+            <a:ext cx="9360" cy="300240"/>
           </a:xfrm>
           <a:prstGeom prst="straightConnector1">
             <a:avLst/>
@@ -488,7 +488,7 @@
         <p:spPr>
           <a:xfrm>
             <a:off x="11286720" y="6387840"/>
-            <a:ext cx="711360" cy="286560"/>
+            <a:ext cx="710640" cy="285840"/>
           </a:xfrm>
           <a:prstGeom prst="rect">
             <a:avLst/>
@@ -512,7 +512,7 @@
         <p:spPr>
           <a:xfrm>
             <a:off x="609480" y="708120"/>
-            <a:ext cx="10971360" cy="274680"/>
+            <a:ext cx="10970640" cy="274680"/>
           </a:xfrm>
           <a:prstGeom prst="rect">
             <a:avLst/>
@@ -571,7 +571,7 @@
         <p:spPr>
           <a:xfrm>
             <a:off x="609480" y="1604520"/>
-            <a:ext cx="10971720" cy="3976560"/>
+            <a:ext cx="10971000" cy="3975840"/>
           </a:xfrm>
           <a:prstGeom prst="rect">
             <a:avLst/>
@@ -870,9 +870,9 @@
         <p:grpSpPr>
           <a:xfrm>
             <a:off x="0" y="6213240"/>
-            <a:ext cx="12183480" cy="636120"/>
+            <a:ext cx="12182760" cy="635400"/>
             <a:chOff x="0" y="6213240"/>
-            <a:chExt cx="12183480" cy="636120"/>
+            <a:chExt cx="12182760" cy="635400"/>
           </a:xfrm>
         </p:grpSpPr>
         <p:sp>
@@ -884,7 +884,7 @@
           <p:spPr>
             <a:xfrm>
               <a:off x="0" y="6213240"/>
-              <a:ext cx="12183480" cy="636120"/>
+              <a:ext cx="12182760" cy="635400"/>
             </a:xfrm>
             <a:prstGeom prst="rect">
               <a:avLst/>
@@ -943,7 +943,7 @@
           <p:spPr>
             <a:xfrm>
               <a:off x="11101680" y="6390000"/>
-              <a:ext cx="8640" cy="299520"/>
+              <a:ext cx="9360" cy="300240"/>
             </a:xfrm>
             <a:prstGeom prst="straightConnector1">
               <a:avLst/>
@@ -975,7 +975,7 @@
           <p:spPr>
             <a:xfrm>
               <a:off x="11286720" y="6387840"/>
-              <a:ext cx="711360" cy="286560"/>
+              <a:ext cx="710640" cy="285840"/>
             </a:xfrm>
             <a:prstGeom prst="rect">
               <a:avLst/>
@@ -1103,7 +1103,7 @@
         <p:spPr>
           <a:xfrm>
             <a:off x="609480" y="708120"/>
-            <a:ext cx="10971360" cy="274680"/>
+            <a:ext cx="10970640" cy="274680"/>
           </a:xfrm>
           <a:prstGeom prst="rect">
             <a:avLst/>
@@ -1162,7 +1162,7 @@
         <p:spPr>
           <a:xfrm>
             <a:off x="609480" y="1604520"/>
-            <a:ext cx="10972080" cy="3976920"/>
+            <a:ext cx="10971360" cy="3976200"/>
           </a:xfrm>
           <a:prstGeom prst="rect">
             <a:avLst/>
@@ -1458,7 +1458,7 @@
         <p:spPr>
           <a:xfrm>
             <a:off x="609480" y="532800"/>
-            <a:ext cx="10971360" cy="625320"/>
+            <a:ext cx="10970640" cy="625320"/>
           </a:xfrm>
           <a:prstGeom prst="rect">
             <a:avLst/>
@@ -1500,7 +1500,7 @@
         <p:spPr>
           <a:xfrm>
             <a:off x="609480" y="1604520"/>
-            <a:ext cx="10972080" cy="3976920"/>
+            <a:ext cx="10971360" cy="3976200"/>
           </a:xfrm>
           <a:prstGeom prst="rect">
             <a:avLst/>
@@ -1568,7 +1568,7 @@
         <p:txBody>
           <a:bodyPr/>
           <a:p>
-            <a:fld id="{C7B4AB48-7CBA-421B-ADA7-C538ED54745C}" type="slidenum">
+            <a:fld id="{5A3592BD-0B6F-42D8-BBEA-CFE24DE6E330}" type="slidenum">
               <a:t>&lt;#&gt;</a:t>
             </a:fld>
           </a:p>
@@ -1609,7 +1609,7 @@
         <p:spPr>
           <a:xfrm>
             <a:off x="609480" y="532800"/>
-            <a:ext cx="10971360" cy="625320"/>
+            <a:ext cx="10970640" cy="625320"/>
           </a:xfrm>
           <a:prstGeom prst="rect">
             <a:avLst/>
@@ -1651,7 +1651,7 @@
         <p:spPr>
           <a:xfrm>
             <a:off x="609480" y="1604520"/>
-            <a:ext cx="10972080" cy="3976920"/>
+            <a:ext cx="10971360" cy="3976200"/>
           </a:xfrm>
           <a:prstGeom prst="rect">
             <a:avLst/>
@@ -1697,7 +1697,7 @@
         <p:txBody>
           <a:bodyPr/>
           <a:p>
-            <a:fld id="{93F37060-20BB-44C8-8579-9AECFAEC1349}" type="slidenum">
+            <a:fld id="{2E0B54C0-0392-4509-ADD2-0921BE8283F6}" type="slidenum">
               <a:t>&lt;#&gt;</a:t>
             </a:fld>
           </a:p>
@@ -1769,9 +1769,9 @@
         <p:grpSpPr>
           <a:xfrm>
             <a:off x="0" y="6213240"/>
-            <a:ext cx="12183480" cy="636120"/>
+            <a:ext cx="12182760" cy="635400"/>
             <a:chOff x="0" y="6213240"/>
-            <a:chExt cx="12183480" cy="636120"/>
+            <a:chExt cx="12182760" cy="635400"/>
           </a:xfrm>
         </p:grpSpPr>
         <p:sp>
@@ -1783,7 +1783,7 @@
           <p:spPr>
             <a:xfrm>
               <a:off x="0" y="6213240"/>
-              <a:ext cx="12183480" cy="636120"/>
+              <a:ext cx="12182760" cy="635400"/>
             </a:xfrm>
             <a:prstGeom prst="rect">
               <a:avLst/>
@@ -1842,9 +1842,9 @@
           <p:grpSpPr>
             <a:xfrm>
               <a:off x="11101680" y="6387840"/>
-              <a:ext cx="896400" cy="301320"/>
+              <a:ext cx="895680" cy="302040"/>
               <a:chOff x="11101680" y="6387840"/>
-              <a:chExt cx="896400" cy="301320"/>
+              <a:chExt cx="895680" cy="302040"/>
             </a:xfrm>
           </p:grpSpPr>
           <p:cxnSp>
@@ -1856,7 +1856,7 @@
             <p:spPr>
               <a:xfrm>
                 <a:off x="11101680" y="6390000"/>
-                <a:ext cx="8640" cy="299520"/>
+                <a:ext cx="9360" cy="300240"/>
               </a:xfrm>
               <a:prstGeom prst="straightConnector1">
                 <a:avLst/>
@@ -1888,7 +1888,7 @@
             <p:spPr>
               <a:xfrm>
                 <a:off x="11286720" y="6387840"/>
-                <a:ext cx="711360" cy="286560"/>
+                <a:ext cx="710640" cy="285840"/>
               </a:xfrm>
               <a:prstGeom prst="rect">
                 <a:avLst/>
@@ -1910,7 +1910,7 @@
         <p:spPr>
           <a:xfrm>
             <a:off x="8173440" y="6354000"/>
-            <a:ext cx="2734560" cy="356400"/>
+            <a:ext cx="2733840" cy="355680"/>
           </a:xfrm>
           <a:prstGeom prst="rect">
             <a:avLst/>
@@ -1939,7 +1939,7 @@
                 <a:tab algn="l" pos="0"/>
               </a:tabLst>
             </a:pPr>
-            <a:fld id="{9E11B70A-B9E0-490C-A19B-AFA7CD9A8B6E}" type="slidenum">
+            <a:fld id="{BD9420B0-6219-4F69-BDCD-98682CCE83B5}" type="slidenum">
               <a:rPr b="0" lang="pt-BR" sz="1200" strike="noStrike" u="none">
                 <a:solidFill>
                   <a:srgbClr val="808080"/>
@@ -2077,7 +2077,7 @@
         <p:spPr>
           <a:xfrm>
             <a:off x="609480" y="707760"/>
-            <a:ext cx="10971360" cy="274680"/>
+            <a:ext cx="10970640" cy="274680"/>
           </a:xfrm>
           <a:prstGeom prst="rect">
             <a:avLst/>
@@ -2130,7 +2130,7 @@
         <p:spPr>
           <a:xfrm>
             <a:off x="609480" y="1604520"/>
-            <a:ext cx="10972080" cy="3976920"/>
+            <a:ext cx="10971360" cy="3976200"/>
           </a:xfrm>
           <a:prstGeom prst="rect">
             <a:avLst/>
@@ -2412,7 +2412,7 @@
         <p:spPr>
           <a:xfrm>
             <a:off x="0" y="6213240"/>
-            <a:ext cx="12183480" cy="636120"/>
+            <a:ext cx="12182760" cy="635400"/>
           </a:xfrm>
           <a:prstGeom prst="rect">
             <a:avLst/>
@@ -2471,7 +2471,7 @@
         <p:spPr>
           <a:xfrm>
             <a:off x="211680" y="6397200"/>
-            <a:ext cx="5764320" cy="269640"/>
+            <a:ext cx="5763600" cy="268920"/>
           </a:xfrm>
           <a:prstGeom prst="rect">
             <a:avLst/>
@@ -2574,7 +2574,7 @@
         <p:spPr>
           <a:xfrm>
             <a:off x="11101680" y="6390000"/>
-            <a:ext cx="8640" cy="299520"/>
+            <a:ext cx="9360" cy="300240"/>
           </a:xfrm>
           <a:prstGeom prst="straightConnector1">
             <a:avLst/>
@@ -2606,7 +2606,7 @@
         <p:spPr>
           <a:xfrm>
             <a:off x="11286720" y="6387840"/>
-            <a:ext cx="711360" cy="286560"/>
+            <a:ext cx="710640" cy="285840"/>
           </a:xfrm>
           <a:prstGeom prst="rect">
             <a:avLst/>
@@ -2626,7 +2626,7 @@
         <p:spPr>
           <a:xfrm>
             <a:off x="0" y="0"/>
-            <a:ext cx="12183480" cy="6849360"/>
+            <a:ext cx="12182760" cy="6848640"/>
           </a:xfrm>
           <a:prstGeom prst="rect">
             <a:avLst/>
@@ -2682,7 +2682,7 @@
         <p:spPr>
           <a:xfrm>
             <a:off x="4025880" y="2707920"/>
-            <a:ext cx="531360" cy="531360"/>
+            <a:ext cx="530640" cy="530640"/>
           </a:xfrm>
           <a:prstGeom prst="rect">
             <a:avLst/>
@@ -2738,7 +2738,7 @@
         <p:spPr>
           <a:xfrm>
             <a:off x="7625880" y="2707920"/>
-            <a:ext cx="531360" cy="531360"/>
+            <a:ext cx="530640" cy="530640"/>
           </a:xfrm>
           <a:prstGeom prst="rect">
             <a:avLst/>
@@ -2794,7 +2794,7 @@
         <p:spPr>
           <a:xfrm>
             <a:off x="5825880" y="2707920"/>
-            <a:ext cx="531360" cy="531360"/>
+            <a:ext cx="530640" cy="530640"/>
           </a:xfrm>
           <a:prstGeom prst="rect">
             <a:avLst/>
@@ -2850,7 +2850,7 @@
         <p:spPr>
           <a:xfrm>
             <a:off x="6725880" y="2707920"/>
-            <a:ext cx="531360" cy="531360"/>
+            <a:ext cx="530640" cy="530640"/>
           </a:xfrm>
           <a:prstGeom prst="rect">
             <a:avLst/>
@@ -2906,7 +2906,7 @@
         <p:spPr>
           <a:xfrm>
             <a:off x="4925880" y="2707920"/>
-            <a:ext cx="531360" cy="531360"/>
+            <a:ext cx="530640" cy="530640"/>
           </a:xfrm>
           <a:prstGeom prst="rect">
             <a:avLst/>
@@ -2962,7 +2962,7 @@
         <p:spPr>
           <a:xfrm>
             <a:off x="4025880" y="3610080"/>
-            <a:ext cx="531360" cy="531360"/>
+            <a:ext cx="530640" cy="530640"/>
           </a:xfrm>
           <a:prstGeom prst="rect">
             <a:avLst/>
@@ -3018,7 +3018,7 @@
         <p:spPr>
           <a:xfrm>
             <a:off x="7625880" y="3610080"/>
-            <a:ext cx="531360" cy="531360"/>
+            <a:ext cx="530640" cy="530640"/>
           </a:xfrm>
           <a:prstGeom prst="rect">
             <a:avLst/>
@@ -3074,7 +3074,7 @@
         <p:spPr>
           <a:xfrm>
             <a:off x="5825880" y="3610080"/>
-            <a:ext cx="531360" cy="531360"/>
+            <a:ext cx="530640" cy="530640"/>
           </a:xfrm>
           <a:prstGeom prst="rect">
             <a:avLst/>
@@ -3130,7 +3130,7 @@
         <p:spPr>
           <a:xfrm>
             <a:off x="6725880" y="3610080"/>
-            <a:ext cx="531360" cy="531360"/>
+            <a:ext cx="530640" cy="530640"/>
           </a:xfrm>
           <a:prstGeom prst="rect">
             <a:avLst/>
@@ -3186,7 +3186,7 @@
         <p:spPr>
           <a:xfrm>
             <a:off x="4925880" y="3610080"/>
-            <a:ext cx="531360" cy="531360"/>
+            <a:ext cx="530640" cy="530640"/>
           </a:xfrm>
           <a:prstGeom prst="rect">
             <a:avLst/>
@@ -3242,7 +3242,7 @@
         <p:spPr>
           <a:xfrm>
             <a:off x="2045880" y="2707920"/>
-            <a:ext cx="531360" cy="531360"/>
+            <a:ext cx="530640" cy="530640"/>
           </a:xfrm>
           <a:prstGeom prst="rect">
             <a:avLst/>
@@ -3298,7 +3298,7 @@
         <p:spPr>
           <a:xfrm>
             <a:off x="2045880" y="3610080"/>
-            <a:ext cx="531360" cy="531360"/>
+            <a:ext cx="530640" cy="530640"/>
           </a:xfrm>
           <a:prstGeom prst="rect">
             <a:avLst/>
@@ -3356,7 +3356,7 @@
         <p:spPr>
           <a:xfrm>
             <a:off x="9605880" y="2707920"/>
-            <a:ext cx="531360" cy="531360"/>
+            <a:ext cx="530640" cy="530640"/>
           </a:xfrm>
           <a:prstGeom prst="rect">
             <a:avLst/>
@@ -3412,7 +3412,7 @@
         <p:spPr>
           <a:xfrm>
             <a:off x="9605880" y="3610080"/>
-            <a:ext cx="531360" cy="531360"/>
+            <a:ext cx="530640" cy="530640"/>
           </a:xfrm>
           <a:prstGeom prst="rect">
             <a:avLst/>
@@ -3472,7 +3472,7 @@
         <p:spPr>
           <a:xfrm>
             <a:off x="8173440" y="6352920"/>
-            <a:ext cx="2734560" cy="356400"/>
+            <a:ext cx="2733840" cy="355680"/>
           </a:xfrm>
           <a:prstGeom prst="rect">
             <a:avLst/>
@@ -3515,7 +3515,7 @@
                 <a:tab algn="l" pos="0"/>
               </a:tabLst>
             </a:pPr>
-            <a:fld id="{DC348D56-C1A9-4029-990E-91AEFE174F71}" type="slidenum">
+            <a:fld id="{5A01539B-4D47-4FCC-8EBA-FBC0159F86D2}" type="slidenum">
               <a:rPr b="0" lang="pt-BR" sz="1200" strike="noStrike" u="none">
                 <a:solidFill>
                   <a:srgbClr val="808080"/>
@@ -3579,9 +3579,9 @@
         <p:grpSpPr>
           <a:xfrm>
             <a:off x="0" y="6213240"/>
-            <a:ext cx="12191400" cy="644040"/>
+            <a:ext cx="12190680" cy="643320"/>
             <a:chOff x="0" y="6213240"/>
-            <a:chExt cx="12191400" cy="644040"/>
+            <a:chExt cx="12190680" cy="643320"/>
           </a:xfrm>
         </p:grpSpPr>
         <p:sp>
@@ -3593,7 +3593,7 @@
           <p:spPr>
             <a:xfrm>
               <a:off x="0" y="6213240"/>
-              <a:ext cx="12191400" cy="644040"/>
+              <a:ext cx="12190680" cy="643320"/>
             </a:xfrm>
             <a:prstGeom prst="rect">
               <a:avLst/>
@@ -3649,7 +3649,7 @@
           <p:spPr>
             <a:xfrm>
               <a:off x="180000" y="6397200"/>
-              <a:ext cx="5770080" cy="275040"/>
+              <a:ext cx="5769720" cy="274680"/>
             </a:xfrm>
             <a:prstGeom prst="rect">
               <a:avLst/>
@@ -3752,7 +3752,7 @@
           <p:spPr>
             <a:xfrm>
               <a:off x="11101680" y="6390000"/>
-              <a:ext cx="720" cy="291600"/>
+              <a:ext cx="1440" cy="292320"/>
             </a:xfrm>
             <a:prstGeom prst="straightConnector1">
               <a:avLst/>
@@ -3784,7 +3784,7 @@
           <p:spPr>
             <a:xfrm>
               <a:off x="11286720" y="6387840"/>
-              <a:ext cx="719280" cy="294480"/>
+              <a:ext cx="718560" cy="293760"/>
             </a:xfrm>
             <a:prstGeom prst="rect">
               <a:avLst/>
@@ -3809,7 +3809,7 @@
         <p:spPr>
           <a:xfrm>
             <a:off x="609480" y="707760"/>
-            <a:ext cx="10971360" cy="274680"/>
+            <a:ext cx="10970640" cy="274680"/>
           </a:xfrm>
           <a:prstGeom prst="rect">
             <a:avLst/>
@@ -3862,7 +3862,7 @@
         <p:spPr>
           <a:xfrm>
             <a:off x="609480" y="1604520"/>
-            <a:ext cx="10972080" cy="3976920"/>
+            <a:ext cx="10971360" cy="3976200"/>
           </a:xfrm>
           <a:prstGeom prst="rect">
             <a:avLst/>
@@ -4115,7 +4115,7 @@
         <p:spPr>
           <a:xfrm>
             <a:off x="8173440" y="6354000"/>
-            <a:ext cx="2742480" cy="364320"/>
+            <a:ext cx="2741760" cy="363600"/>
           </a:xfrm>
           <a:prstGeom prst="rect">
             <a:avLst/>
@@ -4158,7 +4158,7 @@
                 <a:tab algn="l" pos="0"/>
               </a:tabLst>
             </a:pPr>
-            <a:fld id="{38854A4C-BBFB-4B6E-B07B-E21EB7D78A8F}" type="slidenum">
+            <a:fld id="{81429264-3D41-40FB-AB7D-68AE1AC1FBDA}" type="slidenum">
               <a:rPr b="0" lang="pt-BR" sz="1200" strike="noStrike" u="none">
                 <a:solidFill>
                   <a:srgbClr val="808080"/>
@@ -4206,82 +4206,20 @@
           <a:chExt cx="0" cy="0"/>
         </a:xfrm>
       </p:grpSpPr>
-      <p:sp>
-        <p:nvSpPr>
-          <p:cNvPr id="58" name="Retângulo 1"/>
-          <p:cNvSpPr/>
-          <p:nvPr/>
-        </p:nvSpPr>
-        <p:spPr>
-          <a:xfrm>
-            <a:off x="1080" y="1080"/>
-            <a:ext cx="12183120" cy="6847920"/>
-          </a:xfrm>
-          <a:prstGeom prst="rect">
-            <a:avLst/>
-          </a:prstGeom>
-          <a:solidFill>
-            <a:srgbClr val="fcfcfc"/>
-          </a:solidFill>
-          <a:ln>
-            <a:noFill/>
-          </a:ln>
-        </p:spPr>
-        <p:style>
-          <a:lnRef idx="2">
-            <a:schemeClr val="accent1">
-              <a:shade val="15000"/>
-            </a:schemeClr>
-          </a:lnRef>
-          <a:fillRef idx="1">
-            <a:schemeClr val="accent1"/>
-          </a:fillRef>
-          <a:effectRef idx="0">
-            <a:schemeClr val="accent1"/>
-          </a:effectRef>
-          <a:fontRef idx="minor"/>
-        </p:style>
-        <p:txBody>
-          <a:bodyPr lIns="90000" rIns="90000" tIns="45000" bIns="45000" anchor="ctr">
-            <a:noAutofit/>
-          </a:bodyPr>
-          <a:p>
-            <a:pPr defTabSz="914400">
-              <a:lnSpc>
-                <a:spcPct val="100000"/>
-              </a:lnSpc>
-            </a:pPr>
-            <a:endParaRPr b="0" lang="pt-BR" sz="1800" strike="noStrike" u="none">
-              <a:solidFill>
-                <a:schemeClr val="lt1"/>
-              </a:solidFill>
-              <a:effectLst/>
-              <a:uFillTx/>
-              <a:latin typeface="Aptos"/>
-            </a:endParaRPr>
-          </a:p>
-        </p:txBody>
-      </p:sp>
       <p:pic>
         <p:nvPicPr>
-          <p:cNvPr id="59" name="Gráfico 2" descr=""/>
+          <p:cNvPr id="58" name="" descr=""/>
           <p:cNvPicPr/>
           <p:nvPr/>
         </p:nvPicPr>
         <p:blipFill>
-          <a:blip r:embed="rId1">
-            <a:extLst>
-              <a:ext uri="{96DAC541-7B7A-43D3-8B79-37D633B846F1}">
-                <asvg:svgBlip xmlns:asvg="http://schemas.microsoft.com/office/drawing/2016/SVG/main" r:embed="rId2"/>
-              </a:ext>
-            </a:extLst>
-          </a:blip>
+          <a:blip r:embed="rId1"/>
           <a:stretch/>
         </p:blipFill>
         <p:spPr>
           <a:xfrm>
-            <a:off x="9852120" y="5367600"/>
-            <a:ext cx="1434600" cy="585000"/>
+            <a:off x="0" y="0"/>
+            <a:ext cx="12183480" cy="6847200"/>
           </a:xfrm>
           <a:prstGeom prst="rect">
             <a:avLst/>
@@ -4294,14 +4232,14 @@
       </p:pic>
       <p:sp>
         <p:nvSpPr>
-          <p:cNvPr id="60" name="CaixaDeTexto 2"/>
+          <p:cNvPr id="59" name="CaixaDeTexto 2"/>
           <p:cNvSpPr/>
           <p:nvPr/>
         </p:nvSpPr>
         <p:spPr>
           <a:xfrm>
-            <a:off x="6587280" y="2872080"/>
-            <a:ext cx="3774600" cy="974520"/>
+            <a:off x="6588000" y="2944800"/>
+            <a:ext cx="3779640" cy="974520"/>
           </a:xfrm>
           <a:prstGeom prst="rect">
             <a:avLst/>
@@ -4399,37 +4337,16 @@
           </a:p>
         </p:txBody>
       </p:sp>
-      <p:cxnSp>
-        <p:nvCxnSpPr>
-          <p:cNvPr id="61" name="Conector reto 2"/>
-          <p:cNvCxnSpPr/>
-          <p:nvPr/>
-        </p:nvCxnSpPr>
-        <p:spPr>
-          <a:xfrm>
-            <a:off x="5867280" y="2734200"/>
-            <a:ext cx="5400" cy="1394640"/>
-          </a:xfrm>
-          <a:prstGeom prst="straightConnector1">
-            <a:avLst/>
-          </a:prstGeom>
-          <a:ln cap="rnd" w="0">
-            <a:solidFill>
-              <a:srgbClr val="c9c9c7"/>
-            </a:solidFill>
-          </a:ln>
-        </p:spPr>
-      </p:cxnSp>
       <p:sp>
         <p:nvSpPr>
-          <p:cNvPr id="62" name="Retângulo 44"/>
+          <p:cNvPr id="60" name="Retângulo 44"/>
           <p:cNvSpPr/>
           <p:nvPr/>
         </p:nvSpPr>
         <p:spPr>
           <a:xfrm>
-            <a:off x="1692000" y="2550600"/>
-            <a:ext cx="3884040" cy="1183680"/>
+            <a:off x="1825200" y="2837520"/>
+            <a:ext cx="3883320" cy="1182960"/>
           </a:xfrm>
           <a:prstGeom prst="rect">
             <a:avLst/>
@@ -4529,82 +4446,20 @@
           <a:chExt cx="0" cy="0"/>
         </a:xfrm>
       </p:grpSpPr>
-      <p:sp>
-        <p:nvSpPr>
-          <p:cNvPr id="63" name="Retângulo 2"/>
-          <p:cNvSpPr/>
-          <p:nvPr/>
-        </p:nvSpPr>
-        <p:spPr>
-          <a:xfrm>
-            <a:off x="0" y="0"/>
-            <a:ext cx="12183480" cy="6849360"/>
-          </a:xfrm>
-          <a:prstGeom prst="rect">
-            <a:avLst/>
-          </a:prstGeom>
-          <a:solidFill>
-            <a:srgbClr val="fcfcfc"/>
-          </a:solidFill>
-          <a:ln>
-            <a:noFill/>
-          </a:ln>
-        </p:spPr>
-        <p:style>
-          <a:lnRef idx="2">
-            <a:schemeClr val="accent1">
-              <a:shade val="15000"/>
-            </a:schemeClr>
-          </a:lnRef>
-          <a:fillRef idx="1">
-            <a:schemeClr val="accent1"/>
-          </a:fillRef>
-          <a:effectRef idx="0">
-            <a:schemeClr val="accent1"/>
-          </a:effectRef>
-          <a:fontRef idx="minor"/>
-        </p:style>
-        <p:txBody>
-          <a:bodyPr lIns="90000" rIns="90000" tIns="45000" bIns="45000" anchor="ctr">
-            <a:noAutofit/>
-          </a:bodyPr>
-          <a:p>
-            <a:pPr algn="ctr" defTabSz="914400">
-              <a:lnSpc>
-                <a:spcPct val="100000"/>
-              </a:lnSpc>
-            </a:pPr>
-            <a:endParaRPr b="0" lang="pt-BR" sz="1800" strike="noStrike" u="none">
-              <a:solidFill>
-                <a:schemeClr val="lt1"/>
-              </a:solidFill>
-              <a:effectLst/>
-              <a:uFillTx/>
-              <a:latin typeface="Aptos"/>
-            </a:endParaRPr>
-          </a:p>
-        </p:txBody>
-      </p:sp>
       <p:pic>
         <p:nvPicPr>
-          <p:cNvPr id="64" name="Gráfico 1" descr=""/>
+          <p:cNvPr id="61" name="" descr=""/>
           <p:cNvPicPr/>
           <p:nvPr/>
         </p:nvPicPr>
         <p:blipFill>
-          <a:blip r:embed="rId1">
-            <a:extLst>
-              <a:ext uri="{96DAC541-7B7A-43D3-8B79-37D633B846F1}">
-                <asvg:svgBlip xmlns:asvg="http://schemas.microsoft.com/office/drawing/2016/SVG/main" r:embed="rId2"/>
-              </a:ext>
-            </a:extLst>
-          </a:blip>
+          <a:blip r:embed="rId1"/>
           <a:stretch/>
         </p:blipFill>
         <p:spPr>
           <a:xfrm>
-            <a:off x="9852120" y="5367600"/>
-            <a:ext cx="1431360" cy="581760"/>
+            <a:off x="0" y="0"/>
+            <a:ext cx="12183480" cy="6849000"/>
           </a:xfrm>
           <a:prstGeom prst="rect">
             <a:avLst/>
@@ -4617,14 +4472,14 @@
       </p:pic>
       <p:sp>
         <p:nvSpPr>
-          <p:cNvPr id="65" name="CaixaDeTexto 1"/>
+          <p:cNvPr id="62" name="CaixaDeTexto 1"/>
           <p:cNvSpPr/>
           <p:nvPr/>
         </p:nvSpPr>
         <p:spPr>
           <a:xfrm>
-            <a:off x="928440" y="2425680"/>
-            <a:ext cx="6437880" cy="1091880"/>
+            <a:off x="900000" y="2426400"/>
+            <a:ext cx="6443280" cy="1097280"/>
           </a:xfrm>
           <a:prstGeom prst="rect">
             <a:avLst/>
@@ -4764,16 +4619,16 @@
       </p:sp>
       <p:sp>
         <p:nvSpPr>
-          <p:cNvPr id="66" name="Retângulo: Cantos Arredondados 1">
-            <a:hlinkClick r:id="rId3"/>
+          <p:cNvPr id="63" name="Retângulo: Cantos Arredondados 1">
+            <a:hlinkClick r:id="rId2"/>
           </p:cNvPr>
           <p:cNvSpPr/>
           <p:nvPr/>
         </p:nvSpPr>
         <p:spPr>
           <a:xfrm>
-            <a:off x="900000" y="4072320"/>
-            <a:ext cx="1468800" cy="351360"/>
+            <a:off x="900000" y="4070160"/>
+            <a:ext cx="1475640" cy="359640"/>
           </a:xfrm>
           <a:prstGeom prst="roundRect">
             <a:avLst>
@@ -4868,7 +4723,7 @@
       </p:grpSpPr>
       <p:sp>
         <p:nvSpPr>
-          <p:cNvPr id="67" name="PlaceHolder 1"/>
+          <p:cNvPr id="64" name="PlaceHolder 1"/>
           <p:cNvSpPr>
             <a:spLocks noGrp="1"/>
           </p:cNvSpPr>
@@ -4879,7 +4734,7 @@
         <p:spPr>
           <a:xfrm>
             <a:off x="540000" y="540000"/>
-            <a:ext cx="10746000" cy="479520"/>
+            <a:ext cx="10745280" cy="478800"/>
           </a:xfrm>
           <a:prstGeom prst="rect">
             <a:avLst/>
@@ -4910,7 +4765,7 @@
       </p:sp>
       <p:sp>
         <p:nvSpPr>
-          <p:cNvPr id="68" name="PlaceHolder 2"/>
+          <p:cNvPr id="65" name="PlaceHolder 2"/>
           <p:cNvSpPr>
             <a:spLocks noGrp="1"/>
           </p:cNvSpPr>
@@ -4921,7 +4776,7 @@
         <p:spPr>
           <a:xfrm>
             <a:off x="540000" y="1380240"/>
-            <a:ext cx="10746000" cy="2009160"/>
+            <a:ext cx="10745280" cy="2008440"/>
           </a:xfrm>
           <a:prstGeom prst="rect">
             <a:avLst/>
@@ -4967,7 +4822,7 @@
         <p:txBody>
           <a:bodyPr/>
           <a:p>
-            <a:fld id="{37B90588-8740-4220-8249-CCC4BB985434}" type="slidenum">
+            <a:fld id="{90F4E106-5A12-4CB0-A10D-A07CAEDCBA06}" type="slidenum">
               <a:t>3</a:t>
             </a:fld>
           </a:p>
@@ -5003,82 +4858,20 @@
           <a:chExt cx="0" cy="0"/>
         </a:xfrm>
       </p:grpSpPr>
-      <p:sp>
-        <p:nvSpPr>
-          <p:cNvPr id="69" name="Retângulo 3"/>
-          <p:cNvSpPr/>
-          <p:nvPr/>
-        </p:nvSpPr>
-        <p:spPr>
-          <a:xfrm>
-            <a:off x="0" y="0"/>
-            <a:ext cx="12183480" cy="6849360"/>
-          </a:xfrm>
-          <a:prstGeom prst="rect">
-            <a:avLst/>
-          </a:prstGeom>
-          <a:solidFill>
-            <a:srgbClr val="fcfcfc"/>
-          </a:solidFill>
-          <a:ln>
-            <a:noFill/>
-          </a:ln>
-        </p:spPr>
-        <p:style>
-          <a:lnRef idx="2">
-            <a:schemeClr val="accent1">
-              <a:shade val="15000"/>
-            </a:schemeClr>
-          </a:lnRef>
-          <a:fillRef idx="1">
-            <a:schemeClr val="accent1"/>
-          </a:fillRef>
-          <a:effectRef idx="0">
-            <a:schemeClr val="accent1"/>
-          </a:effectRef>
-          <a:fontRef idx="minor"/>
-        </p:style>
-        <p:txBody>
-          <a:bodyPr lIns="90000" rIns="90000" tIns="45000" bIns="45000" anchor="ctr">
-            <a:noAutofit/>
-          </a:bodyPr>
-          <a:p>
-            <a:pPr algn="ctr" defTabSz="914400">
-              <a:lnSpc>
-                <a:spcPct val="100000"/>
-              </a:lnSpc>
-            </a:pPr>
-            <a:endParaRPr b="0" lang="pt-BR" sz="1800" strike="noStrike" u="none">
-              <a:solidFill>
-                <a:schemeClr val="lt1"/>
-              </a:solidFill>
-              <a:effectLst/>
-              <a:uFillTx/>
-              <a:latin typeface="Aptos"/>
-            </a:endParaRPr>
-          </a:p>
-        </p:txBody>
-      </p:sp>
       <p:pic>
         <p:nvPicPr>
-          <p:cNvPr id="70" name="Gráfico 4" descr=""/>
+          <p:cNvPr id="66" name="" descr=""/>
           <p:cNvPicPr/>
           <p:nvPr/>
         </p:nvPicPr>
         <p:blipFill>
-          <a:blip r:embed="rId1">
-            <a:extLst>
-              <a:ext uri="{96DAC541-7B7A-43D3-8B79-37D633B846F1}">
-                <asvg:svgBlip xmlns:asvg="http://schemas.microsoft.com/office/drawing/2016/SVG/main" r:embed="rId2"/>
-              </a:ext>
-            </a:extLst>
-          </a:blip>
+          <a:blip r:embed="rId1"/>
           <a:stretch/>
         </p:blipFill>
         <p:spPr>
           <a:xfrm>
-            <a:off x="5375880" y="5367600"/>
-            <a:ext cx="1431360" cy="581760"/>
+            <a:off x="0" y="0"/>
+            <a:ext cx="12183480" cy="6849000"/>
           </a:xfrm>
           <a:prstGeom prst="rect">
             <a:avLst/>
@@ -5091,14 +4884,14 @@
       </p:pic>
       <p:sp>
         <p:nvSpPr>
-          <p:cNvPr id="71" name="CaixaDeTexto 6"/>
+          <p:cNvPr id="67" name="CaixaDeTexto 6"/>
           <p:cNvSpPr/>
           <p:nvPr/>
         </p:nvSpPr>
         <p:spPr>
           <a:xfrm>
-            <a:off x="4728960" y="2352240"/>
-            <a:ext cx="2733840" cy="577440"/>
+            <a:off x="4525200" y="2350800"/>
+            <a:ext cx="3141720" cy="577440"/>
           </a:xfrm>
           <a:prstGeom prst="rect">
             <a:avLst/>
@@ -5136,7 +4929,7 @@
                 <a:uFillTx/>
                 <a:latin typeface="Arial"/>
               </a:rPr>
-              <a:t>Obrigado(a)! </a:t>
+              <a:t>Agradecimento</a:t>
             </a:r>
             <a:endParaRPr b="0" lang="pt-BR" sz="3200" strike="noStrike" u="none">
               <a:solidFill>
@@ -5151,14 +4944,14 @@
       </p:sp>
       <p:sp>
         <p:nvSpPr>
-          <p:cNvPr id="72" name="Retângulo: Cantos Arredondados 7"/>
+          <p:cNvPr id="68" name="Retângulo: Cantos Arredondados 7"/>
           <p:cNvSpPr/>
           <p:nvPr/>
         </p:nvSpPr>
         <p:spPr>
           <a:xfrm>
-            <a:off x="1314360" y="3474360"/>
-            <a:ext cx="9554400" cy="468720"/>
+            <a:off x="1314360" y="3438000"/>
+            <a:ext cx="9553680" cy="468000"/>
           </a:xfrm>
           <a:prstGeom prst="roundRect">
             <a:avLst>

</xml_diff>